<commit_message>
Created gravitational and rocket motor load libraries - JB
</commit_message>
<xml_diff>
--- a/Documentation/rocketDiagrams.pptx
+++ b/Documentation/rocketDiagrams.pptx
@@ -6,6 +6,7 @@
   </p:sldMasterIdLst>
   <p:sldIdLst>
     <p:sldId id="257" r:id="rId2"/>
+    <p:sldId id="258" r:id="rId3"/>
   </p:sldIdLst>
   <p:sldSz cx="12192000" cy="6858000"/>
   <p:notesSz cx="6858000" cy="9144000"/>
@@ -104,6 +105,11 @@
       </a:defRPr>
     </a:lvl9pPr>
   </p:defaultTextStyle>
+  <p:extLst>
+    <p:ext uri="{EFAFB233-063F-42B5-8137-9DF3F51BA10A}">
+      <p15:sldGuideLst xmlns:p15="http://schemas.microsoft.com/office/powerpoint/2012/main"/>
+    </p:ext>
+  </p:extLst>
 </p:presentation>
 </file>
 
@@ -254,7 +260,7 @@
           <a:p>
             <a:fld id="{06D363D2-934C-43C0-9ECF-5C42BB9FE542}" type="datetimeFigureOut">
               <a:rPr lang="en-US" smtClean="0"/>
-              <a:t>12/4/2020</a:t>
+              <a:t>12/7/2020</a:t>
             </a:fld>
             <a:endParaRPr lang="en-US"/>
           </a:p>
@@ -452,7 +458,7 @@
           <a:p>
             <a:fld id="{06D363D2-934C-43C0-9ECF-5C42BB9FE542}" type="datetimeFigureOut">
               <a:rPr lang="en-US" smtClean="0"/>
-              <a:t>12/4/2020</a:t>
+              <a:t>12/7/2020</a:t>
             </a:fld>
             <a:endParaRPr lang="en-US"/>
           </a:p>
@@ -660,7 +666,7 @@
           <a:p>
             <a:fld id="{06D363D2-934C-43C0-9ECF-5C42BB9FE542}" type="datetimeFigureOut">
               <a:rPr lang="en-US" smtClean="0"/>
-              <a:t>12/4/2020</a:t>
+              <a:t>12/7/2020</a:t>
             </a:fld>
             <a:endParaRPr lang="en-US"/>
           </a:p>
@@ -858,7 +864,7 @@
           <a:p>
             <a:fld id="{06D363D2-934C-43C0-9ECF-5C42BB9FE542}" type="datetimeFigureOut">
               <a:rPr lang="en-US" smtClean="0"/>
-              <a:t>12/4/2020</a:t>
+              <a:t>12/7/2020</a:t>
             </a:fld>
             <a:endParaRPr lang="en-US"/>
           </a:p>
@@ -1133,7 +1139,7 @@
           <a:p>
             <a:fld id="{06D363D2-934C-43C0-9ECF-5C42BB9FE542}" type="datetimeFigureOut">
               <a:rPr lang="en-US" smtClean="0"/>
-              <a:t>12/4/2020</a:t>
+              <a:t>12/7/2020</a:t>
             </a:fld>
             <a:endParaRPr lang="en-US"/>
           </a:p>
@@ -1398,7 +1404,7 @@
           <a:p>
             <a:fld id="{06D363D2-934C-43C0-9ECF-5C42BB9FE542}" type="datetimeFigureOut">
               <a:rPr lang="en-US" smtClean="0"/>
-              <a:t>12/4/2020</a:t>
+              <a:t>12/7/2020</a:t>
             </a:fld>
             <a:endParaRPr lang="en-US"/>
           </a:p>
@@ -1810,7 +1816,7 @@
           <a:p>
             <a:fld id="{06D363D2-934C-43C0-9ECF-5C42BB9FE542}" type="datetimeFigureOut">
               <a:rPr lang="en-US" smtClean="0"/>
-              <a:t>12/4/2020</a:t>
+              <a:t>12/7/2020</a:t>
             </a:fld>
             <a:endParaRPr lang="en-US"/>
           </a:p>
@@ -1951,7 +1957,7 @@
           <a:p>
             <a:fld id="{06D363D2-934C-43C0-9ECF-5C42BB9FE542}" type="datetimeFigureOut">
               <a:rPr lang="en-US" smtClean="0"/>
-              <a:t>12/4/2020</a:t>
+              <a:t>12/7/2020</a:t>
             </a:fld>
             <a:endParaRPr lang="en-US"/>
           </a:p>
@@ -2064,7 +2070,7 @@
           <a:p>
             <a:fld id="{06D363D2-934C-43C0-9ECF-5C42BB9FE542}" type="datetimeFigureOut">
               <a:rPr lang="en-US" smtClean="0"/>
-              <a:t>12/4/2020</a:t>
+              <a:t>12/7/2020</a:t>
             </a:fld>
             <a:endParaRPr lang="en-US"/>
           </a:p>
@@ -2375,7 +2381,7 @@
           <a:p>
             <a:fld id="{06D363D2-934C-43C0-9ECF-5C42BB9FE542}" type="datetimeFigureOut">
               <a:rPr lang="en-US" smtClean="0"/>
-              <a:t>12/4/2020</a:t>
+              <a:t>12/7/2020</a:t>
             </a:fld>
             <a:endParaRPr lang="en-US"/>
           </a:p>
@@ -2663,7 +2669,7 @@
           <a:p>
             <a:fld id="{06D363D2-934C-43C0-9ECF-5C42BB9FE542}" type="datetimeFigureOut">
               <a:rPr lang="en-US" smtClean="0"/>
-              <a:t>12/4/2020</a:t>
+              <a:t>12/7/2020</a:t>
             </a:fld>
             <a:endParaRPr lang="en-US"/>
           </a:p>
@@ -2904,7 +2910,7 @@
           <a:p>
             <a:fld id="{06D363D2-934C-43C0-9ECF-5C42BB9FE542}" type="datetimeFigureOut">
               <a:rPr lang="en-US" smtClean="0"/>
-              <a:t>12/4/2020</a:t>
+              <a:t>12/7/2020</a:t>
             </a:fld>
             <a:endParaRPr lang="en-US"/>
           </a:p>
@@ -3476,8 +3482,8 @@
             </a:fontRef>
           </p:style>
         </p:cxnSp>
-        <mc:AlternateContent xmlns:mc="http://schemas.openxmlformats.org/markup-compatibility/2006">
-          <mc:Choice xmlns:a14="http://schemas.microsoft.com/office/drawing/2010/main" Requires="a14">
+        <mc:AlternateContent xmlns:mc="http://schemas.openxmlformats.org/markup-compatibility/2006" xmlns:a14="http://schemas.microsoft.com/office/drawing/2010/main">
+          <mc:Choice Requires="a14">
             <p:sp>
               <p:nvSpPr>
                 <p:cNvPr id="22" name="TextBox 21">
@@ -3506,6 +3512,7 @@
                 </a:bodyPr>
                 <a:lstStyle/>
                 <a:p>
+                  <a:pPr/>
                   <a14:m>
                     <m:oMathPara xmlns:m="http://schemas.openxmlformats.org/officeDocument/2006/math">
                       <m:oMathParaPr>
@@ -3545,7 +3552,7 @@
               </p:txBody>
             </p:sp>
           </mc:Choice>
-          <mc:Fallback>
+          <mc:Fallback xmlns="">
             <p:sp>
               <p:nvSpPr>
                 <p:cNvPr id="22" name="TextBox 21">
@@ -3590,8 +3597,8 @@
             </p:sp>
           </mc:Fallback>
         </mc:AlternateContent>
-        <mc:AlternateContent xmlns:mc="http://schemas.openxmlformats.org/markup-compatibility/2006">
-          <mc:Choice xmlns:a14="http://schemas.microsoft.com/office/drawing/2010/main" Requires="a14">
+        <mc:AlternateContent xmlns:mc="http://schemas.openxmlformats.org/markup-compatibility/2006" xmlns:a14="http://schemas.microsoft.com/office/drawing/2010/main">
+          <mc:Choice Requires="a14">
             <p:sp>
               <p:nvSpPr>
                 <p:cNvPr id="23" name="TextBox 22">
@@ -3620,6 +3627,7 @@
                 </a:bodyPr>
                 <a:lstStyle/>
                 <a:p>
+                  <a:pPr/>
                   <a14:m>
                     <m:oMathPara xmlns:m="http://schemas.openxmlformats.org/officeDocument/2006/math">
                       <m:oMathParaPr>
@@ -3659,7 +3667,7 @@
               </p:txBody>
             </p:sp>
           </mc:Choice>
-          <mc:Fallback>
+          <mc:Fallback xmlns="">
             <p:sp>
               <p:nvSpPr>
                 <p:cNvPr id="23" name="TextBox 22">
@@ -3704,8 +3712,8 @@
             </p:sp>
           </mc:Fallback>
         </mc:AlternateContent>
-        <mc:AlternateContent xmlns:mc="http://schemas.openxmlformats.org/markup-compatibility/2006">
-          <mc:Choice xmlns:a14="http://schemas.microsoft.com/office/drawing/2010/main" Requires="a14">
+        <mc:AlternateContent xmlns:mc="http://schemas.openxmlformats.org/markup-compatibility/2006" xmlns:a14="http://schemas.microsoft.com/office/drawing/2010/main">
+          <mc:Choice Requires="a14">
             <p:sp>
               <p:nvSpPr>
                 <p:cNvPr id="24" name="TextBox 23">
@@ -3734,6 +3742,7 @@
                 </a:bodyPr>
                 <a:lstStyle/>
                 <a:p>
+                  <a:pPr/>
                   <a14:m>
                     <m:oMathPara xmlns:m="http://schemas.openxmlformats.org/officeDocument/2006/math">
                       <m:oMathParaPr>
@@ -3773,7 +3782,7 @@
               </p:txBody>
             </p:sp>
           </mc:Choice>
-          <mc:Fallback>
+          <mc:Fallback xmlns="">
             <p:sp>
               <p:nvSpPr>
                 <p:cNvPr id="24" name="TextBox 23">
@@ -3823,6 +3832,2255 @@
     <p:extLst>
       <p:ext uri="{BB962C8B-B14F-4D97-AF65-F5344CB8AC3E}">
         <p14:creationId xmlns:p14="http://schemas.microsoft.com/office/powerpoint/2010/main" val="527280620"/>
+      </p:ext>
+    </p:extLst>
+  </p:cSld>
+  <p:clrMapOvr>
+    <a:masterClrMapping/>
+  </p:clrMapOvr>
+</p:sld>
+</file>
+
+<file path=ppt/slides/slide2.xml><?xml version="1.0" encoding="utf-8"?>
+<p:sld xmlns:a="http://schemas.openxmlformats.org/drawingml/2006/main" xmlns:r="http://schemas.openxmlformats.org/officeDocument/2006/relationships" xmlns:p="http://schemas.openxmlformats.org/presentationml/2006/main">
+  <p:cSld>
+    <p:spTree>
+      <p:nvGrpSpPr>
+        <p:cNvPr id="1" name=""/>
+        <p:cNvGrpSpPr/>
+        <p:nvPr/>
+      </p:nvGrpSpPr>
+      <p:grpSpPr>
+        <a:xfrm>
+          <a:off x="0" y="0"/>
+          <a:ext cx="0" cy="0"/>
+          <a:chOff x="0" y="0"/>
+          <a:chExt cx="0" cy="0"/>
+        </a:xfrm>
+      </p:grpSpPr>
+      <p:grpSp>
+        <p:nvGrpSpPr>
+          <p:cNvPr id="43" name="Group 42">
+            <a:extLst>
+              <a:ext uri="{FF2B5EF4-FFF2-40B4-BE49-F238E27FC236}">
+                <a16:creationId xmlns:a16="http://schemas.microsoft.com/office/drawing/2014/main" id="{C1B0013E-42D1-4D3C-8716-6C9C18D6BAB4}"/>
+              </a:ext>
+            </a:extLst>
+          </p:cNvPr>
+          <p:cNvGrpSpPr/>
+          <p:nvPr/>
+        </p:nvGrpSpPr>
+        <p:grpSpPr>
+          <a:xfrm>
+            <a:off x="1129940" y="1090561"/>
+            <a:ext cx="1963825" cy="1898249"/>
+            <a:chOff x="2299317" y="1272269"/>
+            <a:chExt cx="1963825" cy="1898249"/>
+          </a:xfrm>
+        </p:grpSpPr>
+        <p:sp>
+          <p:nvSpPr>
+            <p:cNvPr id="30" name="Freeform: Shape 29">
+              <a:extLst>
+                <a:ext uri="{FF2B5EF4-FFF2-40B4-BE49-F238E27FC236}">
+                  <a16:creationId xmlns:a16="http://schemas.microsoft.com/office/drawing/2014/main" id="{00238834-D478-41FA-A3E4-E87E1035C038}"/>
+                </a:ext>
+              </a:extLst>
+            </p:cNvPr>
+            <p:cNvSpPr/>
+            <p:nvPr/>
+          </p:nvSpPr>
+          <p:spPr>
+            <a:xfrm flipV="1">
+              <a:off x="3240350" y="1976337"/>
+              <a:ext cx="287788" cy="84206"/>
+            </a:xfrm>
+            <a:custGeom>
+              <a:avLst/>
+              <a:gdLst>
+                <a:gd name="connsiteX0" fmla="*/ 166441 w 166441"/>
+                <a:gd name="connsiteY0" fmla="*/ 0 h 34932"/>
+                <a:gd name="connsiteX1" fmla="*/ 0 w 166441"/>
+                <a:gd name="connsiteY1" fmla="*/ 34932 h 34932"/>
+              </a:gdLst>
+              <a:ahLst/>
+              <a:cxnLst>
+                <a:cxn ang="0">
+                  <a:pos x="connsiteX0" y="connsiteY0"/>
+                </a:cxn>
+                <a:cxn ang="0">
+                  <a:pos x="connsiteX1" y="connsiteY1"/>
+                </a:cxn>
+              </a:cxnLst>
+              <a:rect l="l" t="t" r="r" b="b"/>
+              <a:pathLst>
+                <a:path w="166441" h="34932">
+                  <a:moveTo>
+                    <a:pt x="166441" y="0"/>
+                  </a:moveTo>
+                  <a:cubicBezTo>
+                    <a:pt x="133564" y="15411"/>
+                    <a:pt x="100687" y="30822"/>
+                    <a:pt x="0" y="34932"/>
+                  </a:cubicBezTo>
+                </a:path>
+              </a:pathLst>
+            </a:custGeom>
+            <a:noFill/>
+            <a:ln w="3175">
+              <a:solidFill>
+                <a:srgbClr val="0000FF"/>
+              </a:solidFill>
+            </a:ln>
+          </p:spPr>
+          <p:style>
+            <a:lnRef idx="2">
+              <a:schemeClr val="accent1">
+                <a:shade val="50000"/>
+              </a:schemeClr>
+            </a:lnRef>
+            <a:fillRef idx="1">
+              <a:schemeClr val="accent1"/>
+            </a:fillRef>
+            <a:effectRef idx="0">
+              <a:schemeClr val="accent1"/>
+            </a:effectRef>
+            <a:fontRef idx="minor">
+              <a:schemeClr val="lt1"/>
+            </a:fontRef>
+          </p:style>
+          <p:txBody>
+            <a:bodyPr rtlCol="0" anchor="ctr"/>
+            <a:lstStyle/>
+            <a:p>
+              <a:pPr algn="ctr"/>
+              <a:endParaRPr lang="en-US"/>
+            </a:p>
+          </p:txBody>
+        </p:sp>
+        <p:cxnSp>
+          <p:nvCxnSpPr>
+            <p:cNvPr id="3" name="Straight Arrow Connector 2">
+              <a:extLst>
+                <a:ext uri="{FF2B5EF4-FFF2-40B4-BE49-F238E27FC236}">
+                  <a16:creationId xmlns:a16="http://schemas.microsoft.com/office/drawing/2014/main" id="{FA7CB1A5-4D3D-4854-AEAE-81E326B366B7}"/>
+                </a:ext>
+              </a:extLst>
+            </p:cNvPr>
+            <p:cNvCxnSpPr>
+              <a:cxnSpLocks/>
+            </p:cNvCxnSpPr>
+            <p:nvPr/>
+          </p:nvCxnSpPr>
+          <p:spPr>
+            <a:xfrm flipH="1">
+              <a:off x="2299317" y="2610035"/>
+              <a:ext cx="941034" cy="452761"/>
+            </a:xfrm>
+            <a:prstGeom prst="straightConnector1">
+              <a:avLst/>
+            </a:prstGeom>
+            <a:ln>
+              <a:solidFill>
+                <a:schemeClr val="tx1"/>
+              </a:solidFill>
+              <a:tailEnd type="triangle"/>
+            </a:ln>
+          </p:spPr>
+          <p:style>
+            <a:lnRef idx="1">
+              <a:schemeClr val="accent1"/>
+            </a:lnRef>
+            <a:fillRef idx="0">
+              <a:schemeClr val="accent1"/>
+            </a:fillRef>
+            <a:effectRef idx="0">
+              <a:schemeClr val="accent1"/>
+            </a:effectRef>
+            <a:fontRef idx="minor">
+              <a:schemeClr val="tx1"/>
+            </a:fontRef>
+          </p:style>
+        </p:cxnSp>
+        <p:cxnSp>
+          <p:nvCxnSpPr>
+            <p:cNvPr id="5" name="Straight Arrow Connector 4">
+              <a:extLst>
+                <a:ext uri="{FF2B5EF4-FFF2-40B4-BE49-F238E27FC236}">
+                  <a16:creationId xmlns:a16="http://schemas.microsoft.com/office/drawing/2014/main" id="{586A6230-A948-4C57-84E1-CEE2A0CA8298}"/>
+                </a:ext>
+              </a:extLst>
+            </p:cNvPr>
+            <p:cNvCxnSpPr/>
+            <p:nvPr/>
+          </p:nvCxnSpPr>
+          <p:spPr>
+            <a:xfrm>
+              <a:off x="3240350" y="2610035"/>
+              <a:ext cx="1020932" cy="452761"/>
+            </a:xfrm>
+            <a:prstGeom prst="straightConnector1">
+              <a:avLst/>
+            </a:prstGeom>
+            <a:ln>
+              <a:solidFill>
+                <a:schemeClr val="tx1"/>
+              </a:solidFill>
+              <a:tailEnd type="triangle"/>
+            </a:ln>
+          </p:spPr>
+          <p:style>
+            <a:lnRef idx="1">
+              <a:schemeClr val="accent1"/>
+            </a:lnRef>
+            <a:fillRef idx="0">
+              <a:schemeClr val="accent1"/>
+            </a:fillRef>
+            <a:effectRef idx="0">
+              <a:schemeClr val="accent1"/>
+            </a:effectRef>
+            <a:fontRef idx="minor">
+              <a:schemeClr val="tx1"/>
+            </a:fontRef>
+          </p:style>
+        </p:cxnSp>
+        <p:cxnSp>
+          <p:nvCxnSpPr>
+            <p:cNvPr id="7" name="Straight Arrow Connector 6">
+              <a:extLst>
+                <a:ext uri="{FF2B5EF4-FFF2-40B4-BE49-F238E27FC236}">
+                  <a16:creationId xmlns:a16="http://schemas.microsoft.com/office/drawing/2014/main" id="{E6800B35-3012-43BB-8C30-1901FB018CC5}"/>
+                </a:ext>
+              </a:extLst>
+            </p:cNvPr>
+            <p:cNvCxnSpPr/>
+            <p:nvPr/>
+          </p:nvCxnSpPr>
+          <p:spPr>
+            <a:xfrm flipV="1">
+              <a:off x="3240350" y="1349406"/>
+              <a:ext cx="0" cy="1260629"/>
+            </a:xfrm>
+            <a:prstGeom prst="straightConnector1">
+              <a:avLst/>
+            </a:prstGeom>
+            <a:ln>
+              <a:solidFill>
+                <a:schemeClr val="tx1"/>
+              </a:solidFill>
+              <a:tailEnd type="triangle"/>
+            </a:ln>
+          </p:spPr>
+          <p:style>
+            <a:lnRef idx="1">
+              <a:schemeClr val="accent1"/>
+            </a:lnRef>
+            <a:fillRef idx="0">
+              <a:schemeClr val="accent1"/>
+            </a:fillRef>
+            <a:effectRef idx="0">
+              <a:schemeClr val="accent1"/>
+            </a:effectRef>
+            <a:fontRef idx="minor">
+              <a:schemeClr val="tx1"/>
+            </a:fontRef>
+          </p:style>
+        </p:cxnSp>
+        <p:cxnSp>
+          <p:nvCxnSpPr>
+            <p:cNvPr id="14" name="Straight Connector 13">
+              <a:extLst>
+                <a:ext uri="{FF2B5EF4-FFF2-40B4-BE49-F238E27FC236}">
+                  <a16:creationId xmlns:a16="http://schemas.microsoft.com/office/drawing/2014/main" id="{5337FE55-FCA7-48B4-A707-0C27B52FE6BA}"/>
+                </a:ext>
+              </a:extLst>
+            </p:cNvPr>
+            <p:cNvCxnSpPr>
+              <a:cxnSpLocks/>
+            </p:cNvCxnSpPr>
+            <p:nvPr/>
+          </p:nvCxnSpPr>
+          <p:spPr>
+            <a:xfrm>
+              <a:off x="3240350" y="1611630"/>
+              <a:ext cx="413440" cy="186690"/>
+            </a:xfrm>
+            <a:prstGeom prst="line">
+              <a:avLst/>
+            </a:prstGeom>
+            <a:ln>
+              <a:solidFill>
+                <a:schemeClr val="tx1"/>
+              </a:solidFill>
+              <a:prstDash val="dash"/>
+            </a:ln>
+          </p:spPr>
+          <p:style>
+            <a:lnRef idx="1">
+              <a:schemeClr val="accent1"/>
+            </a:lnRef>
+            <a:fillRef idx="0">
+              <a:schemeClr val="accent1"/>
+            </a:fillRef>
+            <a:effectRef idx="0">
+              <a:schemeClr val="accent1"/>
+            </a:effectRef>
+            <a:fontRef idx="minor">
+              <a:schemeClr val="tx1"/>
+            </a:fontRef>
+          </p:style>
+        </p:cxnSp>
+        <p:cxnSp>
+          <p:nvCxnSpPr>
+            <p:cNvPr id="19" name="Straight Arrow Connector 18">
+              <a:extLst>
+                <a:ext uri="{FF2B5EF4-FFF2-40B4-BE49-F238E27FC236}">
+                  <a16:creationId xmlns:a16="http://schemas.microsoft.com/office/drawing/2014/main" id="{A4CD9C68-C1B6-4940-A71B-3CAB0784F5D1}"/>
+                </a:ext>
+              </a:extLst>
+            </p:cNvPr>
+            <p:cNvCxnSpPr>
+              <a:cxnSpLocks/>
+            </p:cNvCxnSpPr>
+            <p:nvPr/>
+          </p:nvCxnSpPr>
+          <p:spPr>
+            <a:xfrm flipH="1">
+              <a:off x="2975610" y="1611630"/>
+              <a:ext cx="264741" cy="125730"/>
+            </a:xfrm>
+            <a:prstGeom prst="straightConnector1">
+              <a:avLst/>
+            </a:prstGeom>
+            <a:ln>
+              <a:solidFill>
+                <a:schemeClr val="tx1"/>
+              </a:solidFill>
+              <a:prstDash val="dash"/>
+              <a:headEnd type="none" w="med" len="med"/>
+              <a:tailEnd type="none" w="med" len="med"/>
+            </a:ln>
+          </p:spPr>
+          <p:style>
+            <a:lnRef idx="1">
+              <a:schemeClr val="accent1"/>
+            </a:lnRef>
+            <a:fillRef idx="0">
+              <a:schemeClr val="accent1"/>
+            </a:fillRef>
+            <a:effectRef idx="0">
+              <a:schemeClr val="accent1"/>
+            </a:effectRef>
+            <a:fontRef idx="minor">
+              <a:schemeClr val="tx1"/>
+            </a:fontRef>
+          </p:style>
+        </p:cxnSp>
+        <p:cxnSp>
+          <p:nvCxnSpPr>
+            <p:cNvPr id="23" name="Straight Connector 22">
+              <a:extLst>
+                <a:ext uri="{FF2B5EF4-FFF2-40B4-BE49-F238E27FC236}">
+                  <a16:creationId xmlns:a16="http://schemas.microsoft.com/office/drawing/2014/main" id="{7ECE29AD-F95E-444A-B478-A27AA78404E1}"/>
+                </a:ext>
+              </a:extLst>
+            </p:cNvPr>
+            <p:cNvCxnSpPr>
+              <a:cxnSpLocks/>
+            </p:cNvCxnSpPr>
+            <p:nvPr/>
+          </p:nvCxnSpPr>
+          <p:spPr>
+            <a:xfrm>
+              <a:off x="2975610" y="1737360"/>
+              <a:ext cx="413440" cy="186690"/>
+            </a:xfrm>
+            <a:prstGeom prst="line">
+              <a:avLst/>
+            </a:prstGeom>
+            <a:ln>
+              <a:solidFill>
+                <a:schemeClr val="tx1"/>
+              </a:solidFill>
+              <a:prstDash val="dash"/>
+            </a:ln>
+          </p:spPr>
+          <p:style>
+            <a:lnRef idx="1">
+              <a:schemeClr val="accent1"/>
+            </a:lnRef>
+            <a:fillRef idx="0">
+              <a:schemeClr val="accent1"/>
+            </a:fillRef>
+            <a:effectRef idx="0">
+              <a:schemeClr val="accent1"/>
+            </a:effectRef>
+            <a:fontRef idx="minor">
+              <a:schemeClr val="tx1"/>
+            </a:fontRef>
+          </p:style>
+        </p:cxnSp>
+        <p:cxnSp>
+          <p:nvCxnSpPr>
+            <p:cNvPr id="24" name="Straight Arrow Connector 23">
+              <a:extLst>
+                <a:ext uri="{FF2B5EF4-FFF2-40B4-BE49-F238E27FC236}">
+                  <a16:creationId xmlns:a16="http://schemas.microsoft.com/office/drawing/2014/main" id="{70B9CD7C-9356-47DF-B144-BFD04CCF9535}"/>
+                </a:ext>
+              </a:extLst>
+            </p:cNvPr>
+            <p:cNvCxnSpPr>
+              <a:cxnSpLocks/>
+            </p:cNvCxnSpPr>
+            <p:nvPr/>
+          </p:nvCxnSpPr>
+          <p:spPr>
+            <a:xfrm flipH="1">
+              <a:off x="3389049" y="1798320"/>
+              <a:ext cx="264741" cy="125730"/>
+            </a:xfrm>
+            <a:prstGeom prst="straightConnector1">
+              <a:avLst/>
+            </a:prstGeom>
+            <a:ln>
+              <a:solidFill>
+                <a:schemeClr val="tx1"/>
+              </a:solidFill>
+              <a:prstDash val="dash"/>
+              <a:headEnd type="none" w="med" len="med"/>
+              <a:tailEnd type="none" w="med" len="med"/>
+            </a:ln>
+          </p:spPr>
+          <p:style>
+            <a:lnRef idx="1">
+              <a:schemeClr val="accent1"/>
+            </a:lnRef>
+            <a:fillRef idx="0">
+              <a:schemeClr val="accent1"/>
+            </a:fillRef>
+            <a:effectRef idx="0">
+              <a:schemeClr val="accent1"/>
+            </a:effectRef>
+            <a:fontRef idx="minor">
+              <a:schemeClr val="tx1"/>
+            </a:fontRef>
+          </p:style>
+        </p:cxnSp>
+        <mc:AlternateContent xmlns:mc="http://schemas.openxmlformats.org/markup-compatibility/2006">
+          <mc:Choice xmlns:a14="http://schemas.microsoft.com/office/drawing/2010/main" Requires="a14">
+            <p:sp>
+              <p:nvSpPr>
+                <p:cNvPr id="27" name="TextBox 26">
+                  <a:extLst>
+                    <a:ext uri="{FF2B5EF4-FFF2-40B4-BE49-F238E27FC236}">
+                      <a16:creationId xmlns:a16="http://schemas.microsoft.com/office/drawing/2014/main" id="{246E1669-D861-4B73-8C96-DF20A4018AD3}"/>
+                    </a:ext>
+                  </a:extLst>
+                </p:cNvPr>
+                <p:cNvSpPr txBox="1"/>
+                <p:nvPr/>
+              </p:nvSpPr>
+              <p:spPr>
+                <a:xfrm>
+                  <a:off x="2997341" y="1839944"/>
+                  <a:ext cx="304506" cy="215444"/>
+                </a:xfrm>
+                <a:prstGeom prst="rect">
+                  <a:avLst/>
+                </a:prstGeom>
+                <a:noFill/>
+              </p:spPr>
+              <p:txBody>
+                <a:bodyPr wrap="none" rtlCol="0">
+                  <a:spAutoFit/>
+                </a:bodyPr>
+                <a:lstStyle/>
+                <a:p>
+                  <a14:m>
+                    <m:oMathPara xmlns:m="http://schemas.openxmlformats.org/officeDocument/2006/math">
+                      <m:oMathParaPr>
+                        <m:jc m:val="centerGroup"/>
+                      </m:oMathParaPr>
+                      <m:oMath xmlns:m="http://schemas.openxmlformats.org/officeDocument/2006/math">
+                        <m:sSub>
+                          <m:sSubPr>
+                            <m:ctrlPr>
+                              <a:rPr lang="en-US" sz="800" b="0" i="1" smtClean="0">
+                                <a:solidFill>
+                                  <a:srgbClr val="00FF00"/>
+                                </a:solidFill>
+                                <a:latin typeface="Cambria Math" panose="02040503050406030204" pitchFamily="18" charset="0"/>
+                              </a:rPr>
+                            </m:ctrlPr>
+                          </m:sSubPr>
+                          <m:e>
+                            <m:r>
+                              <a:rPr lang="en-US" sz="800" b="0" i="1" smtClean="0">
+                                <a:solidFill>
+                                  <a:srgbClr val="00FF00"/>
+                                </a:solidFill>
+                                <a:latin typeface="Cambria Math" panose="02040503050406030204" pitchFamily="18" charset="0"/>
+                              </a:rPr>
+                              <m:t>𝛿</m:t>
+                            </m:r>
+                          </m:e>
+                          <m:sub>
+                            <m:r>
+                              <m:rPr>
+                                <m:sty m:val="p"/>
+                              </m:rPr>
+                              <a:rPr lang="en-US" sz="800" b="0" i="0" smtClean="0">
+                                <a:solidFill>
+                                  <a:srgbClr val="00FF00"/>
+                                </a:solidFill>
+                                <a:latin typeface="Cambria Math" panose="02040503050406030204" pitchFamily="18" charset="0"/>
+                              </a:rPr>
+                              <m:t>x</m:t>
+                            </m:r>
+                          </m:sub>
+                        </m:sSub>
+                      </m:oMath>
+                    </m:oMathPara>
+                  </a14:m>
+                  <a:endParaRPr lang="en-US" sz="800" dirty="0">
+                    <a:solidFill>
+                      <a:srgbClr val="00FF00"/>
+                    </a:solidFill>
+                  </a:endParaRPr>
+                </a:p>
+              </p:txBody>
+            </p:sp>
+          </mc:Choice>
+          <mc:Fallback>
+            <p:sp>
+              <p:nvSpPr>
+                <p:cNvPr id="27" name="TextBox 26">
+                  <a:extLst>
+                    <a:ext uri="{FF2B5EF4-FFF2-40B4-BE49-F238E27FC236}">
+                      <a16:creationId xmlns:a16="http://schemas.microsoft.com/office/drawing/2014/main" id="{246E1669-D861-4B73-8C96-DF20A4018AD3}"/>
+                    </a:ext>
+                  </a:extLst>
+                </p:cNvPr>
+                <p:cNvSpPr txBox="1">
+                  <a:spLocks noRot="1" noChangeAspect="1" noMove="1" noResize="1" noEditPoints="1" noAdjustHandles="1" noChangeArrowheads="1" noChangeShapeType="1" noTextEdit="1"/>
+                </p:cNvSpPr>
+                <p:nvPr/>
+              </p:nvSpPr>
+              <p:spPr>
+                <a:xfrm>
+                  <a:off x="2997341" y="1839944"/>
+                  <a:ext cx="304506" cy="215444"/>
+                </a:xfrm>
+                <a:prstGeom prst="rect">
+                  <a:avLst/>
+                </a:prstGeom>
+                <a:blipFill>
+                  <a:blip r:embed="rId2"/>
+                  <a:stretch>
+                    <a:fillRect/>
+                  </a:stretch>
+                </a:blipFill>
+              </p:spPr>
+              <p:txBody>
+                <a:bodyPr/>
+                <a:lstStyle/>
+                <a:p>
+                  <a:r>
+                    <a:rPr lang="en-US">
+                      <a:noFill/>
+                    </a:rPr>
+                    <a:t> </a:t>
+                  </a:r>
+                </a:p>
+              </p:txBody>
+            </p:sp>
+          </mc:Fallback>
+        </mc:AlternateContent>
+        <mc:AlternateContent xmlns:mc="http://schemas.openxmlformats.org/markup-compatibility/2006">
+          <mc:Choice xmlns:a14="http://schemas.microsoft.com/office/drawing/2010/main" Requires="a14">
+            <p:sp>
+              <p:nvSpPr>
+                <p:cNvPr id="28" name="TextBox 27">
+                  <a:extLst>
+                    <a:ext uri="{FF2B5EF4-FFF2-40B4-BE49-F238E27FC236}">
+                      <a16:creationId xmlns:a16="http://schemas.microsoft.com/office/drawing/2014/main" id="{636CC1BA-FC47-4BBA-B42F-BE75AF0D2A21}"/>
+                    </a:ext>
+                  </a:extLst>
+                </p:cNvPr>
+                <p:cNvSpPr txBox="1"/>
+                <p:nvPr/>
+              </p:nvSpPr>
+              <p:spPr>
+                <a:xfrm>
+                  <a:off x="3331913" y="1847915"/>
+                  <a:ext cx="306109" cy="226857"/>
+                </a:xfrm>
+                <a:prstGeom prst="rect">
+                  <a:avLst/>
+                </a:prstGeom>
+                <a:noFill/>
+              </p:spPr>
+              <p:txBody>
+                <a:bodyPr wrap="none" rtlCol="0">
+                  <a:spAutoFit/>
+                </a:bodyPr>
+                <a:lstStyle/>
+                <a:p>
+                  <a14:m>
+                    <m:oMathPara xmlns:m="http://schemas.openxmlformats.org/officeDocument/2006/math">
+                      <m:oMathParaPr>
+                        <m:jc m:val="centerGroup"/>
+                      </m:oMathParaPr>
+                      <m:oMath xmlns:m="http://schemas.openxmlformats.org/officeDocument/2006/math">
+                        <m:sSub>
+                          <m:sSubPr>
+                            <m:ctrlPr>
+                              <a:rPr lang="en-US" sz="800" b="0" i="1" smtClean="0">
+                                <a:solidFill>
+                                  <a:srgbClr val="0000FF"/>
+                                </a:solidFill>
+                                <a:latin typeface="Cambria Math" panose="02040503050406030204" pitchFamily="18" charset="0"/>
+                              </a:rPr>
+                            </m:ctrlPr>
+                          </m:sSubPr>
+                          <m:e>
+                            <m:r>
+                              <a:rPr lang="en-US" sz="800" b="0" i="1" smtClean="0">
+                                <a:solidFill>
+                                  <a:srgbClr val="0000FF"/>
+                                </a:solidFill>
+                                <a:latin typeface="Cambria Math" panose="02040503050406030204" pitchFamily="18" charset="0"/>
+                              </a:rPr>
+                              <m:t>𝛿</m:t>
+                            </m:r>
+                          </m:e>
+                          <m:sub>
+                            <m:r>
+                              <m:rPr>
+                                <m:sty m:val="p"/>
+                              </m:rPr>
+                              <a:rPr lang="en-US" sz="800" b="0" i="0" smtClean="0">
+                                <a:solidFill>
+                                  <a:srgbClr val="0000FF"/>
+                                </a:solidFill>
+                                <a:latin typeface="Cambria Math" panose="02040503050406030204" pitchFamily="18" charset="0"/>
+                              </a:rPr>
+                              <m:t>y</m:t>
+                            </m:r>
+                          </m:sub>
+                        </m:sSub>
+                      </m:oMath>
+                    </m:oMathPara>
+                  </a14:m>
+                  <a:endParaRPr lang="en-US" sz="800" dirty="0">
+                    <a:solidFill>
+                      <a:srgbClr val="0000FF"/>
+                    </a:solidFill>
+                  </a:endParaRPr>
+                </a:p>
+              </p:txBody>
+            </p:sp>
+          </mc:Choice>
+          <mc:Fallback>
+            <p:sp>
+              <p:nvSpPr>
+                <p:cNvPr id="28" name="TextBox 27">
+                  <a:extLst>
+                    <a:ext uri="{FF2B5EF4-FFF2-40B4-BE49-F238E27FC236}">
+                      <a16:creationId xmlns:a16="http://schemas.microsoft.com/office/drawing/2014/main" id="{636CC1BA-FC47-4BBA-B42F-BE75AF0D2A21}"/>
+                    </a:ext>
+                  </a:extLst>
+                </p:cNvPr>
+                <p:cNvSpPr txBox="1">
+                  <a:spLocks noRot="1" noChangeAspect="1" noMove="1" noResize="1" noEditPoints="1" noAdjustHandles="1" noChangeArrowheads="1" noChangeShapeType="1" noTextEdit="1"/>
+                </p:cNvSpPr>
+                <p:nvPr/>
+              </p:nvSpPr>
+              <p:spPr>
+                <a:xfrm>
+                  <a:off x="3331913" y="1847915"/>
+                  <a:ext cx="306109" cy="226857"/>
+                </a:xfrm>
+                <a:prstGeom prst="rect">
+                  <a:avLst/>
+                </a:prstGeom>
+                <a:blipFill>
+                  <a:blip r:embed="rId3"/>
+                  <a:stretch>
+                    <a:fillRect/>
+                  </a:stretch>
+                </a:blipFill>
+              </p:spPr>
+              <p:txBody>
+                <a:bodyPr/>
+                <a:lstStyle/>
+                <a:p>
+                  <a:r>
+                    <a:rPr lang="en-US">
+                      <a:noFill/>
+                    </a:rPr>
+                    <a:t> </a:t>
+                  </a:r>
+                </a:p>
+              </p:txBody>
+            </p:sp>
+          </mc:Fallback>
+        </mc:AlternateContent>
+        <p:sp>
+          <p:nvSpPr>
+            <p:cNvPr id="29" name="Freeform: Shape 28">
+              <a:extLst>
+                <a:ext uri="{FF2B5EF4-FFF2-40B4-BE49-F238E27FC236}">
+                  <a16:creationId xmlns:a16="http://schemas.microsoft.com/office/drawing/2014/main" id="{F115E3C2-B8E4-453E-AD21-D6D5BACD0F8A}"/>
+                </a:ext>
+              </a:extLst>
+            </p:cNvPr>
+            <p:cNvSpPr/>
+            <p:nvPr/>
+          </p:nvSpPr>
+          <p:spPr>
+            <a:xfrm flipH="1" flipV="1">
+              <a:off x="3071973" y="2007570"/>
+              <a:ext cx="166441" cy="34932"/>
+            </a:xfrm>
+            <a:custGeom>
+              <a:avLst/>
+              <a:gdLst>
+                <a:gd name="connsiteX0" fmla="*/ 166441 w 166441"/>
+                <a:gd name="connsiteY0" fmla="*/ 0 h 34932"/>
+                <a:gd name="connsiteX1" fmla="*/ 0 w 166441"/>
+                <a:gd name="connsiteY1" fmla="*/ 34932 h 34932"/>
+              </a:gdLst>
+              <a:ahLst/>
+              <a:cxnLst>
+                <a:cxn ang="0">
+                  <a:pos x="connsiteX0" y="connsiteY0"/>
+                </a:cxn>
+                <a:cxn ang="0">
+                  <a:pos x="connsiteX1" y="connsiteY1"/>
+                </a:cxn>
+              </a:cxnLst>
+              <a:rect l="l" t="t" r="r" b="b"/>
+              <a:pathLst>
+                <a:path w="166441" h="34932">
+                  <a:moveTo>
+                    <a:pt x="166441" y="0"/>
+                  </a:moveTo>
+                  <a:cubicBezTo>
+                    <a:pt x="133564" y="15411"/>
+                    <a:pt x="100687" y="30822"/>
+                    <a:pt x="0" y="34932"/>
+                  </a:cubicBezTo>
+                </a:path>
+              </a:pathLst>
+            </a:custGeom>
+            <a:noFill/>
+            <a:ln w="3175">
+              <a:solidFill>
+                <a:srgbClr val="00FF00"/>
+              </a:solidFill>
+            </a:ln>
+          </p:spPr>
+          <p:style>
+            <a:lnRef idx="2">
+              <a:schemeClr val="accent1">
+                <a:shade val="50000"/>
+              </a:schemeClr>
+            </a:lnRef>
+            <a:fillRef idx="1">
+              <a:schemeClr val="accent1"/>
+            </a:fillRef>
+            <a:effectRef idx="0">
+              <a:schemeClr val="accent1"/>
+            </a:effectRef>
+            <a:fontRef idx="minor">
+              <a:schemeClr val="lt1"/>
+            </a:fontRef>
+          </p:style>
+          <p:txBody>
+            <a:bodyPr rtlCol="0" anchor="ctr"/>
+            <a:lstStyle/>
+            <a:p>
+              <a:pPr algn="ctr"/>
+              <a:endParaRPr lang="en-US"/>
+            </a:p>
+          </p:txBody>
+        </p:sp>
+        <mc:AlternateContent xmlns:mc="http://schemas.openxmlformats.org/markup-compatibility/2006">
+          <mc:Choice xmlns:a14="http://schemas.microsoft.com/office/drawing/2010/main" Requires="a14">
+            <p:sp>
+              <p:nvSpPr>
+                <p:cNvPr id="31" name="TextBox 30">
+                  <a:extLst>
+                    <a:ext uri="{FF2B5EF4-FFF2-40B4-BE49-F238E27FC236}">
+                      <a16:creationId xmlns:a16="http://schemas.microsoft.com/office/drawing/2014/main" id="{285D60EA-2C20-4954-AC66-BBEE776DA389}"/>
+                    </a:ext>
+                  </a:extLst>
+                </p:cNvPr>
+                <p:cNvSpPr txBox="1"/>
+                <p:nvPr/>
+              </p:nvSpPr>
+              <p:spPr>
+                <a:xfrm>
+                  <a:off x="2303190" y="2955074"/>
+                  <a:ext cx="264688" cy="215444"/>
+                </a:xfrm>
+                <a:prstGeom prst="rect">
+                  <a:avLst/>
+                </a:prstGeom>
+                <a:noFill/>
+              </p:spPr>
+              <p:txBody>
+                <a:bodyPr wrap="none" rtlCol="0">
+                  <a:spAutoFit/>
+                </a:bodyPr>
+                <a:lstStyle/>
+                <a:p>
+                  <a14:m>
+                    <m:oMathPara xmlns:m="http://schemas.openxmlformats.org/officeDocument/2006/math">
+                      <m:oMathParaPr>
+                        <m:jc m:val="centerGroup"/>
+                      </m:oMathParaPr>
+                      <m:oMath xmlns:m="http://schemas.openxmlformats.org/officeDocument/2006/math">
+                        <m:r>
+                          <a:rPr lang="en-US" sz="800" b="0" i="1" smtClean="0">
+                            <a:solidFill>
+                              <a:schemeClr val="tx1"/>
+                            </a:solidFill>
+                            <a:latin typeface="Cambria Math" panose="02040503050406030204" pitchFamily="18" charset="0"/>
+                          </a:rPr>
+                          <m:t>𝑥</m:t>
+                        </m:r>
+                      </m:oMath>
+                    </m:oMathPara>
+                  </a14:m>
+                  <a:endParaRPr lang="en-US" sz="800" dirty="0">
+                    <a:solidFill>
+                      <a:schemeClr val="tx1"/>
+                    </a:solidFill>
+                  </a:endParaRPr>
+                </a:p>
+              </p:txBody>
+            </p:sp>
+          </mc:Choice>
+          <mc:Fallback>
+            <p:sp>
+              <p:nvSpPr>
+                <p:cNvPr id="31" name="TextBox 30">
+                  <a:extLst>
+                    <a:ext uri="{FF2B5EF4-FFF2-40B4-BE49-F238E27FC236}">
+                      <a16:creationId xmlns:a16="http://schemas.microsoft.com/office/drawing/2014/main" id="{285D60EA-2C20-4954-AC66-BBEE776DA389}"/>
+                    </a:ext>
+                  </a:extLst>
+                </p:cNvPr>
+                <p:cNvSpPr txBox="1">
+                  <a:spLocks noRot="1" noChangeAspect="1" noMove="1" noResize="1" noEditPoints="1" noAdjustHandles="1" noChangeArrowheads="1" noChangeShapeType="1" noTextEdit="1"/>
+                </p:cNvSpPr>
+                <p:nvPr/>
+              </p:nvSpPr>
+              <p:spPr>
+                <a:xfrm>
+                  <a:off x="2303190" y="2955074"/>
+                  <a:ext cx="264688" cy="215444"/>
+                </a:xfrm>
+                <a:prstGeom prst="rect">
+                  <a:avLst/>
+                </a:prstGeom>
+                <a:blipFill>
+                  <a:blip r:embed="rId4"/>
+                  <a:stretch>
+                    <a:fillRect/>
+                  </a:stretch>
+                </a:blipFill>
+              </p:spPr>
+              <p:txBody>
+                <a:bodyPr/>
+                <a:lstStyle/>
+                <a:p>
+                  <a:r>
+                    <a:rPr lang="en-US">
+                      <a:noFill/>
+                    </a:rPr>
+                    <a:t> </a:t>
+                  </a:r>
+                </a:p>
+              </p:txBody>
+            </p:sp>
+          </mc:Fallback>
+        </mc:AlternateContent>
+        <mc:AlternateContent xmlns:mc="http://schemas.openxmlformats.org/markup-compatibility/2006">
+          <mc:Choice xmlns:a14="http://schemas.microsoft.com/office/drawing/2010/main" Requires="a14">
+            <p:sp>
+              <p:nvSpPr>
+                <p:cNvPr id="32" name="TextBox 31">
+                  <a:extLst>
+                    <a:ext uri="{FF2B5EF4-FFF2-40B4-BE49-F238E27FC236}">
+                      <a16:creationId xmlns:a16="http://schemas.microsoft.com/office/drawing/2014/main" id="{2963BDB4-02C4-4727-9D71-D0E12032403F}"/>
+                    </a:ext>
+                  </a:extLst>
+                </p:cNvPr>
+                <p:cNvSpPr txBox="1"/>
+                <p:nvPr/>
+              </p:nvSpPr>
+              <p:spPr>
+                <a:xfrm>
+                  <a:off x="3996594" y="2955074"/>
+                  <a:ext cx="266548" cy="215444"/>
+                </a:xfrm>
+                <a:prstGeom prst="rect">
+                  <a:avLst/>
+                </a:prstGeom>
+                <a:noFill/>
+              </p:spPr>
+              <p:txBody>
+                <a:bodyPr wrap="none" rtlCol="0">
+                  <a:spAutoFit/>
+                </a:bodyPr>
+                <a:lstStyle/>
+                <a:p>
+                  <a14:m>
+                    <m:oMathPara xmlns:m="http://schemas.openxmlformats.org/officeDocument/2006/math">
+                      <m:oMathParaPr>
+                        <m:jc m:val="centerGroup"/>
+                      </m:oMathParaPr>
+                      <m:oMath xmlns:m="http://schemas.openxmlformats.org/officeDocument/2006/math">
+                        <m:r>
+                          <a:rPr lang="en-US" sz="800" b="0" i="1" smtClean="0">
+                            <a:solidFill>
+                              <a:schemeClr val="tx1"/>
+                            </a:solidFill>
+                            <a:latin typeface="Cambria Math" panose="02040503050406030204" pitchFamily="18" charset="0"/>
+                          </a:rPr>
+                          <m:t>𝑦</m:t>
+                        </m:r>
+                      </m:oMath>
+                    </m:oMathPara>
+                  </a14:m>
+                  <a:endParaRPr lang="en-US" sz="800" dirty="0">
+                    <a:solidFill>
+                      <a:schemeClr val="tx1"/>
+                    </a:solidFill>
+                  </a:endParaRPr>
+                </a:p>
+              </p:txBody>
+            </p:sp>
+          </mc:Choice>
+          <mc:Fallback>
+            <p:sp>
+              <p:nvSpPr>
+                <p:cNvPr id="32" name="TextBox 31">
+                  <a:extLst>
+                    <a:ext uri="{FF2B5EF4-FFF2-40B4-BE49-F238E27FC236}">
+                      <a16:creationId xmlns:a16="http://schemas.microsoft.com/office/drawing/2014/main" id="{2963BDB4-02C4-4727-9D71-D0E12032403F}"/>
+                    </a:ext>
+                  </a:extLst>
+                </p:cNvPr>
+                <p:cNvSpPr txBox="1">
+                  <a:spLocks noRot="1" noChangeAspect="1" noMove="1" noResize="1" noEditPoints="1" noAdjustHandles="1" noChangeArrowheads="1" noChangeShapeType="1" noTextEdit="1"/>
+                </p:cNvSpPr>
+                <p:nvPr/>
+              </p:nvSpPr>
+              <p:spPr>
+                <a:xfrm>
+                  <a:off x="3996594" y="2955074"/>
+                  <a:ext cx="266548" cy="215444"/>
+                </a:xfrm>
+                <a:prstGeom prst="rect">
+                  <a:avLst/>
+                </a:prstGeom>
+                <a:blipFill>
+                  <a:blip r:embed="rId5"/>
+                  <a:stretch>
+                    <a:fillRect/>
+                  </a:stretch>
+                </a:blipFill>
+              </p:spPr>
+              <p:txBody>
+                <a:bodyPr/>
+                <a:lstStyle/>
+                <a:p>
+                  <a:r>
+                    <a:rPr lang="en-US">
+                      <a:noFill/>
+                    </a:rPr>
+                    <a:t> </a:t>
+                  </a:r>
+                </a:p>
+              </p:txBody>
+            </p:sp>
+          </mc:Fallback>
+        </mc:AlternateContent>
+        <mc:AlternateContent xmlns:mc="http://schemas.openxmlformats.org/markup-compatibility/2006">
+          <mc:Choice xmlns:a14="http://schemas.microsoft.com/office/drawing/2010/main" Requires="a14">
+            <p:sp>
+              <p:nvSpPr>
+                <p:cNvPr id="33" name="TextBox 32">
+                  <a:extLst>
+                    <a:ext uri="{FF2B5EF4-FFF2-40B4-BE49-F238E27FC236}">
+                      <a16:creationId xmlns:a16="http://schemas.microsoft.com/office/drawing/2014/main" id="{37DE34C1-CA7E-476D-94D9-F898EAAA3D97}"/>
+                    </a:ext>
+                  </a:extLst>
+                </p:cNvPr>
+                <p:cNvSpPr txBox="1"/>
+                <p:nvPr/>
+              </p:nvSpPr>
+              <p:spPr>
+                <a:xfrm>
+                  <a:off x="3016320" y="1272269"/>
+                  <a:ext cx="258532" cy="215444"/>
+                </a:xfrm>
+                <a:prstGeom prst="rect">
+                  <a:avLst/>
+                </a:prstGeom>
+                <a:noFill/>
+              </p:spPr>
+              <p:txBody>
+                <a:bodyPr wrap="none" rtlCol="0">
+                  <a:spAutoFit/>
+                </a:bodyPr>
+                <a:lstStyle/>
+                <a:p>
+                  <a14:m>
+                    <m:oMathPara xmlns:m="http://schemas.openxmlformats.org/officeDocument/2006/math">
+                      <m:oMathParaPr>
+                        <m:jc m:val="centerGroup"/>
+                      </m:oMathParaPr>
+                      <m:oMath xmlns:m="http://schemas.openxmlformats.org/officeDocument/2006/math">
+                        <m:r>
+                          <a:rPr lang="en-US" sz="800" b="0" i="1" smtClean="0">
+                            <a:solidFill>
+                              <a:schemeClr val="tx1"/>
+                            </a:solidFill>
+                            <a:latin typeface="Cambria Math" panose="02040503050406030204" pitchFamily="18" charset="0"/>
+                          </a:rPr>
+                          <m:t>𝑧</m:t>
+                        </m:r>
+                      </m:oMath>
+                    </m:oMathPara>
+                  </a14:m>
+                  <a:endParaRPr lang="en-US" sz="800" dirty="0">
+                    <a:solidFill>
+                      <a:schemeClr val="tx1"/>
+                    </a:solidFill>
+                  </a:endParaRPr>
+                </a:p>
+              </p:txBody>
+            </p:sp>
+          </mc:Choice>
+          <mc:Fallback>
+            <p:sp>
+              <p:nvSpPr>
+                <p:cNvPr id="33" name="TextBox 32">
+                  <a:extLst>
+                    <a:ext uri="{FF2B5EF4-FFF2-40B4-BE49-F238E27FC236}">
+                      <a16:creationId xmlns:a16="http://schemas.microsoft.com/office/drawing/2014/main" id="{37DE34C1-CA7E-476D-94D9-F898EAAA3D97}"/>
+                    </a:ext>
+                  </a:extLst>
+                </p:cNvPr>
+                <p:cNvSpPr txBox="1">
+                  <a:spLocks noRot="1" noChangeAspect="1" noMove="1" noResize="1" noEditPoints="1" noAdjustHandles="1" noChangeArrowheads="1" noChangeShapeType="1" noTextEdit="1"/>
+                </p:cNvSpPr>
+                <p:nvPr/>
+              </p:nvSpPr>
+              <p:spPr>
+                <a:xfrm>
+                  <a:off x="3016320" y="1272269"/>
+                  <a:ext cx="258532" cy="215444"/>
+                </a:xfrm>
+                <a:prstGeom prst="rect">
+                  <a:avLst/>
+                </a:prstGeom>
+                <a:blipFill>
+                  <a:blip r:embed="rId6"/>
+                  <a:stretch>
+                    <a:fillRect/>
+                  </a:stretch>
+                </a:blipFill>
+              </p:spPr>
+              <p:txBody>
+                <a:bodyPr/>
+                <a:lstStyle/>
+                <a:p>
+                  <a:r>
+                    <a:rPr lang="en-US">
+                      <a:noFill/>
+                    </a:rPr>
+                    <a:t> </a:t>
+                  </a:r>
+                </a:p>
+              </p:txBody>
+            </p:sp>
+          </mc:Fallback>
+        </mc:AlternateContent>
+        <p:cxnSp>
+          <p:nvCxnSpPr>
+            <p:cNvPr id="35" name="Straight Connector 34">
+              <a:extLst>
+                <a:ext uri="{FF2B5EF4-FFF2-40B4-BE49-F238E27FC236}">
+                  <a16:creationId xmlns:a16="http://schemas.microsoft.com/office/drawing/2014/main" id="{E068B620-D60A-4D89-B676-A6927146082E}"/>
+                </a:ext>
+              </a:extLst>
+            </p:cNvPr>
+            <p:cNvCxnSpPr/>
+            <p:nvPr/>
+          </p:nvCxnSpPr>
+          <p:spPr>
+            <a:xfrm flipV="1">
+              <a:off x="3389049" y="1924050"/>
+              <a:ext cx="0" cy="998405"/>
+            </a:xfrm>
+            <a:prstGeom prst="line">
+              <a:avLst/>
+            </a:prstGeom>
+            <a:ln>
+              <a:solidFill>
+                <a:schemeClr val="tx1"/>
+              </a:solidFill>
+              <a:prstDash val="dash"/>
+            </a:ln>
+          </p:spPr>
+          <p:style>
+            <a:lnRef idx="1">
+              <a:schemeClr val="accent1"/>
+            </a:lnRef>
+            <a:fillRef idx="0">
+              <a:schemeClr val="accent1"/>
+            </a:fillRef>
+            <a:effectRef idx="0">
+              <a:schemeClr val="accent1"/>
+            </a:effectRef>
+            <a:fontRef idx="minor">
+              <a:schemeClr val="tx1"/>
+            </a:fontRef>
+          </p:style>
+        </p:cxnSp>
+        <p:cxnSp>
+          <p:nvCxnSpPr>
+            <p:cNvPr id="36" name="Straight Arrow Connector 35">
+              <a:extLst>
+                <a:ext uri="{FF2B5EF4-FFF2-40B4-BE49-F238E27FC236}">
+                  <a16:creationId xmlns:a16="http://schemas.microsoft.com/office/drawing/2014/main" id="{CFF91D07-6BD8-4DEC-B5E8-10DF34A0C075}"/>
+                </a:ext>
+              </a:extLst>
+            </p:cNvPr>
+            <p:cNvCxnSpPr>
+              <a:cxnSpLocks/>
+            </p:cNvCxnSpPr>
+            <p:nvPr/>
+          </p:nvCxnSpPr>
+          <p:spPr>
+            <a:xfrm flipH="1">
+              <a:off x="3389049" y="2796725"/>
+              <a:ext cx="264741" cy="125730"/>
+            </a:xfrm>
+            <a:prstGeom prst="straightConnector1">
+              <a:avLst/>
+            </a:prstGeom>
+            <a:ln>
+              <a:solidFill>
+                <a:schemeClr val="tx1"/>
+              </a:solidFill>
+              <a:prstDash val="dash"/>
+              <a:headEnd type="none" w="med" len="med"/>
+              <a:tailEnd type="none" w="med" len="med"/>
+            </a:ln>
+          </p:spPr>
+          <p:style>
+            <a:lnRef idx="1">
+              <a:schemeClr val="accent1"/>
+            </a:lnRef>
+            <a:fillRef idx="0">
+              <a:schemeClr val="accent1"/>
+            </a:fillRef>
+            <a:effectRef idx="0">
+              <a:schemeClr val="accent1"/>
+            </a:effectRef>
+            <a:fontRef idx="minor">
+              <a:schemeClr val="tx1"/>
+            </a:fontRef>
+          </p:style>
+        </p:cxnSp>
+        <p:cxnSp>
+          <p:nvCxnSpPr>
+            <p:cNvPr id="37" name="Straight Connector 36">
+              <a:extLst>
+                <a:ext uri="{FF2B5EF4-FFF2-40B4-BE49-F238E27FC236}">
+                  <a16:creationId xmlns:a16="http://schemas.microsoft.com/office/drawing/2014/main" id="{222B24E6-FB1A-4BDC-BB44-24EE6D1D522A}"/>
+                </a:ext>
+              </a:extLst>
+            </p:cNvPr>
+            <p:cNvCxnSpPr>
+              <a:cxnSpLocks/>
+            </p:cNvCxnSpPr>
+            <p:nvPr/>
+          </p:nvCxnSpPr>
+          <p:spPr>
+            <a:xfrm>
+              <a:off x="2975609" y="2735765"/>
+              <a:ext cx="413440" cy="186690"/>
+            </a:xfrm>
+            <a:prstGeom prst="line">
+              <a:avLst/>
+            </a:prstGeom>
+            <a:ln>
+              <a:solidFill>
+                <a:schemeClr val="tx1"/>
+              </a:solidFill>
+              <a:prstDash val="dash"/>
+            </a:ln>
+          </p:spPr>
+          <p:style>
+            <a:lnRef idx="1">
+              <a:schemeClr val="accent1"/>
+            </a:lnRef>
+            <a:fillRef idx="0">
+              <a:schemeClr val="accent1"/>
+            </a:fillRef>
+            <a:effectRef idx="0">
+              <a:schemeClr val="accent1"/>
+            </a:effectRef>
+            <a:fontRef idx="minor">
+              <a:schemeClr val="tx1"/>
+            </a:fontRef>
+          </p:style>
+        </p:cxnSp>
+        <p:cxnSp>
+          <p:nvCxnSpPr>
+            <p:cNvPr id="38" name="Straight Connector 37">
+              <a:extLst>
+                <a:ext uri="{FF2B5EF4-FFF2-40B4-BE49-F238E27FC236}">
+                  <a16:creationId xmlns:a16="http://schemas.microsoft.com/office/drawing/2014/main" id="{E281BFA4-FB02-4CF2-B4C1-D07EB6D0F3A6}"/>
+                </a:ext>
+              </a:extLst>
+            </p:cNvPr>
+            <p:cNvCxnSpPr/>
+            <p:nvPr/>
+          </p:nvCxnSpPr>
+          <p:spPr>
+            <a:xfrm flipV="1">
+              <a:off x="3653790" y="1798320"/>
+              <a:ext cx="0" cy="998405"/>
+            </a:xfrm>
+            <a:prstGeom prst="line">
+              <a:avLst/>
+            </a:prstGeom>
+            <a:ln>
+              <a:solidFill>
+                <a:schemeClr val="tx1"/>
+              </a:solidFill>
+              <a:prstDash val="dash"/>
+            </a:ln>
+          </p:spPr>
+          <p:style>
+            <a:lnRef idx="1">
+              <a:schemeClr val="accent1"/>
+            </a:lnRef>
+            <a:fillRef idx="0">
+              <a:schemeClr val="accent1"/>
+            </a:fillRef>
+            <a:effectRef idx="0">
+              <a:schemeClr val="accent1"/>
+            </a:effectRef>
+            <a:fontRef idx="minor">
+              <a:schemeClr val="tx1"/>
+            </a:fontRef>
+          </p:style>
+        </p:cxnSp>
+        <p:cxnSp>
+          <p:nvCxnSpPr>
+            <p:cNvPr id="39" name="Straight Connector 38">
+              <a:extLst>
+                <a:ext uri="{FF2B5EF4-FFF2-40B4-BE49-F238E27FC236}">
+                  <a16:creationId xmlns:a16="http://schemas.microsoft.com/office/drawing/2014/main" id="{2418B965-AE17-4B95-AF03-A2123BC6A0EF}"/>
+                </a:ext>
+              </a:extLst>
+            </p:cNvPr>
+            <p:cNvCxnSpPr/>
+            <p:nvPr/>
+          </p:nvCxnSpPr>
+          <p:spPr>
+            <a:xfrm flipV="1">
+              <a:off x="2975610" y="1737360"/>
+              <a:ext cx="0" cy="998405"/>
+            </a:xfrm>
+            <a:prstGeom prst="line">
+              <a:avLst/>
+            </a:prstGeom>
+            <a:ln>
+              <a:solidFill>
+                <a:schemeClr val="tx1"/>
+              </a:solidFill>
+              <a:prstDash val="dash"/>
+            </a:ln>
+          </p:spPr>
+          <p:style>
+            <a:lnRef idx="1">
+              <a:schemeClr val="accent1"/>
+            </a:lnRef>
+            <a:fillRef idx="0">
+              <a:schemeClr val="accent1"/>
+            </a:fillRef>
+            <a:effectRef idx="0">
+              <a:schemeClr val="accent1"/>
+            </a:effectRef>
+            <a:fontRef idx="minor">
+              <a:schemeClr val="tx1"/>
+            </a:fontRef>
+          </p:style>
+        </p:cxnSp>
+        <p:cxnSp>
+          <p:nvCxnSpPr>
+            <p:cNvPr id="10" name="Straight Arrow Connector 9">
+              <a:extLst>
+                <a:ext uri="{FF2B5EF4-FFF2-40B4-BE49-F238E27FC236}">
+                  <a16:creationId xmlns:a16="http://schemas.microsoft.com/office/drawing/2014/main" id="{FFB8079A-6D44-4772-A500-A0B003FFB2E4}"/>
+                </a:ext>
+              </a:extLst>
+            </p:cNvPr>
+            <p:cNvCxnSpPr>
+              <a:cxnSpLocks/>
+            </p:cNvCxnSpPr>
+            <p:nvPr/>
+          </p:nvCxnSpPr>
+          <p:spPr>
+            <a:xfrm flipV="1">
+              <a:off x="3240350" y="1798320"/>
+              <a:ext cx="413440" cy="811716"/>
+            </a:xfrm>
+            <a:prstGeom prst="straightConnector1">
+              <a:avLst/>
+            </a:prstGeom>
+            <a:ln>
+              <a:solidFill>
+                <a:srgbClr val="0000FF"/>
+              </a:solidFill>
+              <a:prstDash val="dash"/>
+              <a:tailEnd type="triangle"/>
+            </a:ln>
+          </p:spPr>
+          <p:style>
+            <a:lnRef idx="1">
+              <a:schemeClr val="accent1"/>
+            </a:lnRef>
+            <a:fillRef idx="0">
+              <a:schemeClr val="accent1"/>
+            </a:fillRef>
+            <a:effectRef idx="0">
+              <a:schemeClr val="accent1"/>
+            </a:effectRef>
+            <a:fontRef idx="minor">
+              <a:schemeClr val="tx1"/>
+            </a:fontRef>
+          </p:style>
+        </p:cxnSp>
+        <p:cxnSp>
+          <p:nvCxnSpPr>
+            <p:cNvPr id="18" name="Straight Arrow Connector 17">
+              <a:extLst>
+                <a:ext uri="{FF2B5EF4-FFF2-40B4-BE49-F238E27FC236}">
+                  <a16:creationId xmlns:a16="http://schemas.microsoft.com/office/drawing/2014/main" id="{CBF2A12F-1BCB-4E92-B34D-3AE6AA1093C9}"/>
+                </a:ext>
+              </a:extLst>
+            </p:cNvPr>
+            <p:cNvCxnSpPr>
+              <a:cxnSpLocks/>
+            </p:cNvCxnSpPr>
+            <p:nvPr/>
+          </p:nvCxnSpPr>
+          <p:spPr>
+            <a:xfrm flipH="1" flipV="1">
+              <a:off x="2975610" y="1737360"/>
+              <a:ext cx="264740" cy="872676"/>
+            </a:xfrm>
+            <a:prstGeom prst="straightConnector1">
+              <a:avLst/>
+            </a:prstGeom>
+            <a:ln>
+              <a:solidFill>
+                <a:srgbClr val="00FF00"/>
+              </a:solidFill>
+              <a:prstDash val="dash"/>
+              <a:tailEnd type="triangle"/>
+            </a:ln>
+          </p:spPr>
+          <p:style>
+            <a:lnRef idx="1">
+              <a:schemeClr val="accent1"/>
+            </a:lnRef>
+            <a:fillRef idx="0">
+              <a:schemeClr val="accent1"/>
+            </a:fillRef>
+            <a:effectRef idx="0">
+              <a:schemeClr val="accent1"/>
+            </a:effectRef>
+            <a:fontRef idx="minor">
+              <a:schemeClr val="tx1"/>
+            </a:fontRef>
+          </p:style>
+        </p:cxnSp>
+        <p:cxnSp>
+          <p:nvCxnSpPr>
+            <p:cNvPr id="26" name="Straight Arrow Connector 25">
+              <a:extLst>
+                <a:ext uri="{FF2B5EF4-FFF2-40B4-BE49-F238E27FC236}">
+                  <a16:creationId xmlns:a16="http://schemas.microsoft.com/office/drawing/2014/main" id="{DC076DD9-F38D-4524-A84F-C997905B2894}"/>
+                </a:ext>
+              </a:extLst>
+            </p:cNvPr>
+            <p:cNvCxnSpPr/>
+            <p:nvPr/>
+          </p:nvCxnSpPr>
+          <p:spPr>
+            <a:xfrm flipV="1">
+              <a:off x="3240350" y="1924050"/>
+              <a:ext cx="148699" cy="685985"/>
+            </a:xfrm>
+            <a:prstGeom prst="straightConnector1">
+              <a:avLst/>
+            </a:prstGeom>
+            <a:ln>
+              <a:solidFill>
+                <a:srgbClr val="FF0000"/>
+              </a:solidFill>
+              <a:prstDash val="solid"/>
+              <a:tailEnd type="triangle"/>
+            </a:ln>
+          </p:spPr>
+          <p:style>
+            <a:lnRef idx="1">
+              <a:schemeClr val="accent1"/>
+            </a:lnRef>
+            <a:fillRef idx="0">
+              <a:schemeClr val="accent1"/>
+            </a:fillRef>
+            <a:effectRef idx="0">
+              <a:schemeClr val="accent1"/>
+            </a:effectRef>
+            <a:fontRef idx="minor">
+              <a:schemeClr val="tx1"/>
+            </a:fontRef>
+          </p:style>
+        </p:cxnSp>
+      </p:grpSp>
+      <mc:AlternateContent xmlns:mc="http://schemas.openxmlformats.org/markup-compatibility/2006">
+        <mc:Choice xmlns:a14="http://schemas.microsoft.com/office/drawing/2010/main" Requires="a14">
+          <p:sp>
+            <p:nvSpPr>
+              <p:cNvPr id="42" name="TextBox 41">
+                <a:extLst>
+                  <a:ext uri="{FF2B5EF4-FFF2-40B4-BE49-F238E27FC236}">
+                    <a16:creationId xmlns:a16="http://schemas.microsoft.com/office/drawing/2014/main" id="{D19DFC22-3DEF-4CDD-9C4E-86F9D1C1EF89}"/>
+                  </a:ext>
+                </a:extLst>
+              </p:cNvPr>
+              <p:cNvSpPr txBox="1"/>
+              <p:nvPr/>
+            </p:nvSpPr>
+            <p:spPr>
+              <a:xfrm>
+                <a:off x="2633111" y="1088257"/>
+                <a:ext cx="1758815" cy="748475"/>
+              </a:xfrm>
+              <a:prstGeom prst="rect">
+                <a:avLst/>
+              </a:prstGeom>
+              <a:noFill/>
+            </p:spPr>
+            <p:txBody>
+              <a:bodyPr wrap="none" rtlCol="0">
+                <a:spAutoFit/>
+              </a:bodyPr>
+              <a:lstStyle/>
+              <a:p>
+                <a:r>
+                  <a:rPr lang="en-US" sz="900" dirty="0">
+                    <a:latin typeface="Times New Roman" panose="02020603050405020304" pitchFamily="18" charset="0"/>
+                    <a:cs typeface="Times New Roman" panose="02020603050405020304" pitchFamily="18" charset="0"/>
+                  </a:rPr>
+                  <a:t>Given:</a:t>
+                </a:r>
+                <a:endParaRPr lang="en-US" sz="1000" dirty="0">
+                  <a:latin typeface="Times New Roman" panose="02020603050405020304" pitchFamily="18" charset="0"/>
+                  <a:cs typeface="Times New Roman" panose="02020603050405020304" pitchFamily="18" charset="0"/>
+                </a:endParaRPr>
+              </a:p>
+              <a:p>
+                <a:pPr marL="171450" indent="-171450">
+                  <a:buFont typeface="Arial" panose="020B0604020202020204" pitchFamily="34" charset="0"/>
+                  <a:buChar char="•"/>
+                </a:pPr>
+                <a:r>
+                  <a:rPr lang="en-US" sz="800" dirty="0">
+                    <a:latin typeface="Times New Roman" panose="02020603050405020304" pitchFamily="18" charset="0"/>
+                    <a:cs typeface="Times New Roman" panose="02020603050405020304" pitchFamily="18" charset="0"/>
+                  </a:rPr>
+                  <a:t>Magnitude of red vector</a:t>
+                </a:r>
+              </a:p>
+              <a:p>
+                <a:pPr marL="171450" indent="-171450">
+                  <a:buFont typeface="Arial" panose="020B0604020202020204" pitchFamily="34" charset="0"/>
+                  <a:buChar char="•"/>
+                </a:pPr>
+                <a14:m>
+                  <m:oMath xmlns:m="http://schemas.openxmlformats.org/officeDocument/2006/math">
+                    <m:sSub>
+                      <m:sSubPr>
+                        <m:ctrlPr>
+                          <a:rPr lang="en-US" sz="800" b="0" i="1" smtClean="0">
+                            <a:latin typeface="Cambria Math" panose="02040503050406030204" pitchFamily="18" charset="0"/>
+                            <a:cs typeface="Times New Roman" panose="02020603050405020304" pitchFamily="18" charset="0"/>
+                          </a:rPr>
+                        </m:ctrlPr>
+                      </m:sSubPr>
+                      <m:e>
+                        <m:r>
+                          <a:rPr lang="en-US" sz="800" b="0" i="1" smtClean="0">
+                            <a:latin typeface="Cambria Math" panose="02040503050406030204" pitchFamily="18" charset="0"/>
+                            <a:cs typeface="Times New Roman" panose="02020603050405020304" pitchFamily="18" charset="0"/>
+                          </a:rPr>
+                          <m:t>𝛿</m:t>
+                        </m:r>
+                      </m:e>
+                      <m:sub>
+                        <m:r>
+                          <a:rPr lang="en-US" sz="800" b="0" i="1" smtClean="0">
+                            <a:latin typeface="Cambria Math" panose="02040503050406030204" pitchFamily="18" charset="0"/>
+                            <a:cs typeface="Times New Roman" panose="02020603050405020304" pitchFamily="18" charset="0"/>
+                          </a:rPr>
+                          <m:t>𝑥</m:t>
+                        </m:r>
+                      </m:sub>
+                    </m:sSub>
+                  </m:oMath>
+                </a14:m>
+                <a:r>
+                  <a:rPr lang="en-US" sz="800" dirty="0">
+                    <a:latin typeface="Times New Roman" panose="02020603050405020304" pitchFamily="18" charset="0"/>
+                    <a:cs typeface="Times New Roman" panose="02020603050405020304" pitchFamily="18" charset="0"/>
+                  </a:rPr>
+                  <a:t> and </a:t>
+                </a:r>
+                <a14:m>
+                  <m:oMath xmlns:m="http://schemas.openxmlformats.org/officeDocument/2006/math">
+                    <m:sSub>
+                      <m:sSubPr>
+                        <m:ctrlPr>
+                          <a:rPr lang="en-US" sz="800" b="0" i="1" smtClean="0">
+                            <a:latin typeface="Cambria Math" panose="02040503050406030204" pitchFamily="18" charset="0"/>
+                            <a:cs typeface="Times New Roman" panose="02020603050405020304" pitchFamily="18" charset="0"/>
+                          </a:rPr>
+                        </m:ctrlPr>
+                      </m:sSubPr>
+                      <m:e>
+                        <m:r>
+                          <a:rPr lang="en-US" sz="800" b="0" i="1" smtClean="0">
+                            <a:latin typeface="Cambria Math" panose="02040503050406030204" pitchFamily="18" charset="0"/>
+                            <a:cs typeface="Times New Roman" panose="02020603050405020304" pitchFamily="18" charset="0"/>
+                          </a:rPr>
+                          <m:t>𝛿</m:t>
+                        </m:r>
+                      </m:e>
+                      <m:sub>
+                        <m:r>
+                          <a:rPr lang="en-US" sz="800" b="0" i="1" smtClean="0">
+                            <a:latin typeface="Cambria Math" panose="02040503050406030204" pitchFamily="18" charset="0"/>
+                            <a:cs typeface="Times New Roman" panose="02020603050405020304" pitchFamily="18" charset="0"/>
+                          </a:rPr>
+                          <m:t>𝑦</m:t>
+                        </m:r>
+                      </m:sub>
+                    </m:sSub>
+                  </m:oMath>
+                </a14:m>
+                <a:endParaRPr lang="en-US" sz="800" dirty="0">
+                  <a:latin typeface="Times New Roman" panose="02020603050405020304" pitchFamily="18" charset="0"/>
+                  <a:cs typeface="Times New Roman" panose="02020603050405020304" pitchFamily="18" charset="0"/>
+                </a:endParaRPr>
+              </a:p>
+              <a:p>
+                <a:r>
+                  <a:rPr lang="en-US" sz="900" dirty="0">
+                    <a:latin typeface="Times New Roman" panose="02020603050405020304" pitchFamily="18" charset="0"/>
+                    <a:cs typeface="Times New Roman" panose="02020603050405020304" pitchFamily="18" charset="0"/>
+                  </a:rPr>
+                  <a:t>Find: </a:t>
+                </a:r>
+              </a:p>
+              <a:p>
+                <a:pPr marL="171450" indent="-171450">
+                  <a:buFont typeface="Arial" panose="020B0604020202020204" pitchFamily="34" charset="0"/>
+                  <a:buChar char="•"/>
+                </a:pPr>
+                <a:r>
+                  <a:rPr lang="en-US" sz="800" dirty="0">
+                    <a:latin typeface="Times New Roman" panose="02020603050405020304" pitchFamily="18" charset="0"/>
+                    <a:cs typeface="Times New Roman" panose="02020603050405020304" pitchFamily="18" charset="0"/>
+                  </a:rPr>
+                  <a:t>Component makeup of red vector</a:t>
+                </a:r>
+              </a:p>
+            </p:txBody>
+          </p:sp>
+        </mc:Choice>
+        <mc:Fallback>
+          <p:sp>
+            <p:nvSpPr>
+              <p:cNvPr id="42" name="TextBox 41">
+                <a:extLst>
+                  <a:ext uri="{FF2B5EF4-FFF2-40B4-BE49-F238E27FC236}">
+                    <a16:creationId xmlns:a16="http://schemas.microsoft.com/office/drawing/2014/main" id="{D19DFC22-3DEF-4CDD-9C4E-86F9D1C1EF89}"/>
+                  </a:ext>
+                </a:extLst>
+              </p:cNvPr>
+              <p:cNvSpPr txBox="1">
+                <a:spLocks noRot="1" noChangeAspect="1" noMove="1" noResize="1" noEditPoints="1" noAdjustHandles="1" noChangeArrowheads="1" noChangeShapeType="1" noTextEdit="1"/>
+              </p:cNvSpPr>
+              <p:nvPr/>
+            </p:nvSpPr>
+            <p:spPr>
+              <a:xfrm>
+                <a:off x="2633111" y="1088257"/>
+                <a:ext cx="1758815" cy="748475"/>
+              </a:xfrm>
+              <a:prstGeom prst="rect">
+                <a:avLst/>
+              </a:prstGeom>
+              <a:blipFill>
+                <a:blip r:embed="rId7"/>
+                <a:stretch>
+                  <a:fillRect b="-2459"/>
+                </a:stretch>
+              </a:blipFill>
+            </p:spPr>
+            <p:txBody>
+              <a:bodyPr/>
+              <a:lstStyle/>
+              <a:p>
+                <a:r>
+                  <a:rPr lang="en-US">
+                    <a:noFill/>
+                  </a:rPr>
+                  <a:t> </a:t>
+                </a:r>
+              </a:p>
+            </p:txBody>
+          </p:sp>
+        </mc:Fallback>
+      </mc:AlternateContent>
+      <mc:AlternateContent xmlns:mc="http://schemas.openxmlformats.org/markup-compatibility/2006">
+        <mc:Choice xmlns:a14="http://schemas.microsoft.com/office/drawing/2010/main" Requires="a14">
+          <p:sp>
+            <p:nvSpPr>
+              <p:cNvPr id="44" name="TextBox 43">
+                <a:extLst>
+                  <a:ext uri="{FF2B5EF4-FFF2-40B4-BE49-F238E27FC236}">
+                    <a16:creationId xmlns:a16="http://schemas.microsoft.com/office/drawing/2014/main" id="{5D2FE379-F4A9-4C5F-A714-E1870FA4C4AF}"/>
+                  </a:ext>
+                </a:extLst>
+              </p:cNvPr>
+              <p:cNvSpPr txBox="1"/>
+              <p:nvPr/>
+            </p:nvSpPr>
+            <p:spPr>
+              <a:xfrm>
+                <a:off x="2943828" y="1825862"/>
+                <a:ext cx="2968954" cy="368947"/>
+              </a:xfrm>
+              <a:prstGeom prst="rect">
+                <a:avLst/>
+              </a:prstGeom>
+              <a:noFill/>
+            </p:spPr>
+            <p:txBody>
+              <a:bodyPr wrap="none" rtlCol="0">
+                <a:spAutoFit/>
+              </a:bodyPr>
+              <a:lstStyle/>
+              <a:p>
+                <a:pPr/>
+                <a14:m>
+                  <m:oMathPara xmlns:m="http://schemas.openxmlformats.org/officeDocument/2006/math">
+                    <m:oMathParaPr>
+                      <m:jc m:val="left"/>
+                    </m:oMathParaPr>
+                    <m:oMath xmlns:m="http://schemas.openxmlformats.org/officeDocument/2006/math">
+                      <m:r>
+                        <a:rPr lang="en-US" sz="800" b="0" i="1" smtClean="0">
+                          <a:latin typeface="Cambria Math" panose="02040503050406030204" pitchFamily="18" charset="0"/>
+                          <a:cs typeface="Times New Roman" panose="02020603050405020304" pitchFamily="18" charset="0"/>
+                        </a:rPr>
+                        <m:t>𝑉</m:t>
+                      </m:r>
+                      <m:r>
+                        <a:rPr lang="en-US" sz="800" b="0" i="1" smtClean="0">
+                          <a:latin typeface="Cambria Math" panose="02040503050406030204" pitchFamily="18" charset="0"/>
+                          <a:cs typeface="Times New Roman" panose="02020603050405020304" pitchFamily="18" charset="0"/>
+                        </a:rPr>
+                        <m:t>=</m:t>
+                      </m:r>
+                      <m:sSup>
+                        <m:sSupPr>
+                          <m:ctrlPr>
+                            <a:rPr lang="en-US" sz="800" b="0" i="1" smtClean="0">
+                              <a:latin typeface="Cambria Math" panose="02040503050406030204" pitchFamily="18" charset="0"/>
+                              <a:cs typeface="Times New Roman" panose="02020603050405020304" pitchFamily="18" charset="0"/>
+                            </a:rPr>
+                          </m:ctrlPr>
+                        </m:sSupPr>
+                        <m:e>
+                          <m:d>
+                            <m:dPr>
+                              <m:begChr m:val="["/>
+                              <m:endChr m:val="]"/>
+                              <m:ctrlPr>
+                                <a:rPr lang="en-US" sz="800" b="0" i="1" smtClean="0">
+                                  <a:latin typeface="Cambria Math" panose="02040503050406030204" pitchFamily="18" charset="0"/>
+                                  <a:cs typeface="Times New Roman" panose="02020603050405020304" pitchFamily="18" charset="0"/>
+                                </a:rPr>
+                              </m:ctrlPr>
+                            </m:dPr>
+                            <m:e>
+                              <m:m>
+                                <m:mPr>
+                                  <m:plcHide m:val="on"/>
+                                  <m:mcs>
+                                    <m:mc>
+                                      <m:mcPr>
+                                        <m:count m:val="3"/>
+                                        <m:mcJc m:val="center"/>
+                                      </m:mcPr>
+                                    </m:mc>
+                                  </m:mcs>
+                                  <m:ctrlPr>
+                                    <a:rPr lang="en-US" sz="800" b="0" i="1" smtClean="0">
+                                      <a:latin typeface="Cambria Math" panose="02040503050406030204" pitchFamily="18" charset="0"/>
+                                      <a:cs typeface="Times New Roman" panose="02020603050405020304" pitchFamily="18" charset="0"/>
+                                    </a:rPr>
+                                  </m:ctrlPr>
+                                </m:mPr>
+                                <m:mr>
+                                  <m:e>
+                                    <m:sSub>
+                                      <m:sSubPr>
+                                        <m:ctrlPr>
+                                          <a:rPr lang="en-US" sz="800" b="0" i="1" smtClean="0">
+                                            <a:latin typeface="Cambria Math" panose="02040503050406030204" pitchFamily="18" charset="0"/>
+                                            <a:cs typeface="Times New Roman" panose="02020603050405020304" pitchFamily="18" charset="0"/>
+                                          </a:rPr>
+                                        </m:ctrlPr>
+                                      </m:sSubPr>
+                                      <m:e>
+                                        <m:r>
+                                          <a:rPr lang="en-US" sz="800" b="0" i="1" smtClean="0">
+                                            <a:latin typeface="Cambria Math" panose="02040503050406030204" pitchFamily="18" charset="0"/>
+                                            <a:cs typeface="Times New Roman" panose="02020603050405020304" pitchFamily="18" charset="0"/>
+                                          </a:rPr>
+                                          <m:t>𝑣</m:t>
+                                        </m:r>
+                                      </m:e>
+                                      <m:sub>
+                                        <m:r>
+                                          <a:rPr lang="en-US" sz="800" b="0" i="1" smtClean="0">
+                                            <a:latin typeface="Cambria Math" panose="02040503050406030204" pitchFamily="18" charset="0"/>
+                                            <a:cs typeface="Times New Roman" panose="02020603050405020304" pitchFamily="18" charset="0"/>
+                                          </a:rPr>
+                                          <m:t>𝑥</m:t>
+                                        </m:r>
+                                      </m:sub>
+                                    </m:sSub>
+                                  </m:e>
+                                  <m:e>
+                                    <m:sSub>
+                                      <m:sSubPr>
+                                        <m:ctrlPr>
+                                          <a:rPr lang="en-US" sz="800" b="0" i="1" smtClean="0">
+                                            <a:latin typeface="Cambria Math" panose="02040503050406030204" pitchFamily="18" charset="0"/>
+                                            <a:cs typeface="Times New Roman" panose="02020603050405020304" pitchFamily="18" charset="0"/>
+                                          </a:rPr>
+                                        </m:ctrlPr>
+                                      </m:sSubPr>
+                                      <m:e>
+                                        <m:r>
+                                          <a:rPr lang="en-US" sz="800" b="0" i="1" smtClean="0">
+                                            <a:latin typeface="Cambria Math" panose="02040503050406030204" pitchFamily="18" charset="0"/>
+                                            <a:cs typeface="Times New Roman" panose="02020603050405020304" pitchFamily="18" charset="0"/>
+                                          </a:rPr>
+                                          <m:t>𝑣</m:t>
+                                        </m:r>
+                                      </m:e>
+                                      <m:sub>
+                                        <m:r>
+                                          <a:rPr lang="en-US" sz="800" b="0" i="1" smtClean="0">
+                                            <a:latin typeface="Cambria Math" panose="02040503050406030204" pitchFamily="18" charset="0"/>
+                                            <a:cs typeface="Times New Roman" panose="02020603050405020304" pitchFamily="18" charset="0"/>
+                                          </a:rPr>
+                                          <m:t>𝑦</m:t>
+                                        </m:r>
+                                      </m:sub>
+                                    </m:sSub>
+                                  </m:e>
+                                  <m:e>
+                                    <m:sSub>
+                                      <m:sSubPr>
+                                        <m:ctrlPr>
+                                          <a:rPr lang="en-US" sz="800" b="0" i="1" smtClean="0">
+                                            <a:latin typeface="Cambria Math" panose="02040503050406030204" pitchFamily="18" charset="0"/>
+                                            <a:cs typeface="Times New Roman" panose="02020603050405020304" pitchFamily="18" charset="0"/>
+                                          </a:rPr>
+                                        </m:ctrlPr>
+                                      </m:sSubPr>
+                                      <m:e>
+                                        <m:r>
+                                          <a:rPr lang="en-US" sz="800" b="0" i="1" smtClean="0">
+                                            <a:latin typeface="Cambria Math" panose="02040503050406030204" pitchFamily="18" charset="0"/>
+                                            <a:cs typeface="Times New Roman" panose="02020603050405020304" pitchFamily="18" charset="0"/>
+                                          </a:rPr>
+                                          <m:t>𝑣</m:t>
+                                        </m:r>
+                                      </m:e>
+                                      <m:sub>
+                                        <m:r>
+                                          <a:rPr lang="en-US" sz="800" b="0" i="1" smtClean="0">
+                                            <a:latin typeface="Cambria Math" panose="02040503050406030204" pitchFamily="18" charset="0"/>
+                                            <a:cs typeface="Times New Roman" panose="02020603050405020304" pitchFamily="18" charset="0"/>
+                                          </a:rPr>
+                                          <m:t>𝑧</m:t>
+                                        </m:r>
+                                      </m:sub>
+                                    </m:sSub>
+                                  </m:e>
+                                </m:mr>
+                              </m:m>
+                            </m:e>
+                          </m:d>
+                        </m:e>
+                        <m:sup>
+                          <m:r>
+                            <a:rPr lang="en-US" sz="800" b="0" i="1" smtClean="0">
+                              <a:latin typeface="Cambria Math" panose="02040503050406030204" pitchFamily="18" charset="0"/>
+                              <a:cs typeface="Times New Roman" panose="02020603050405020304" pitchFamily="18" charset="0"/>
+                            </a:rPr>
+                            <m:t>𝑇</m:t>
+                          </m:r>
+                        </m:sup>
+                      </m:sSup>
+                      <m:r>
+                        <a:rPr lang="en-US" sz="800" b="0" i="1" smtClean="0">
+                          <a:latin typeface="Cambria Math" panose="02040503050406030204" pitchFamily="18" charset="0"/>
+                          <a:cs typeface="Times New Roman" panose="02020603050405020304" pitchFamily="18" charset="0"/>
+                        </a:rPr>
+                        <m:t>,  </m:t>
+                      </m:r>
+                      <m:sSub>
+                        <m:sSubPr>
+                          <m:ctrlPr>
+                            <a:rPr lang="en-US" sz="800" i="1">
+                              <a:latin typeface="Cambria Math" panose="02040503050406030204" pitchFamily="18" charset="0"/>
+                              <a:cs typeface="Times New Roman" panose="02020603050405020304" pitchFamily="18" charset="0"/>
+                            </a:rPr>
+                          </m:ctrlPr>
+                        </m:sSubPr>
+                        <m:e>
+                          <m:r>
+                            <a:rPr lang="en-US" sz="800" i="1">
+                              <a:latin typeface="Cambria Math" panose="02040503050406030204" pitchFamily="18" charset="0"/>
+                              <a:cs typeface="Times New Roman" panose="02020603050405020304" pitchFamily="18" charset="0"/>
+                            </a:rPr>
+                            <m:t>𝛿</m:t>
+                          </m:r>
+                        </m:e>
+                        <m:sub>
+                          <m:r>
+                            <m:rPr>
+                              <m:sty m:val="p"/>
+                            </m:rPr>
+                            <a:rPr lang="en-US" sz="800">
+                              <a:latin typeface="Cambria Math" panose="02040503050406030204" pitchFamily="18" charset="0"/>
+                              <a:cs typeface="Times New Roman" panose="02020603050405020304" pitchFamily="18" charset="0"/>
+                            </a:rPr>
+                            <m:t>x</m:t>
+                          </m:r>
+                        </m:sub>
+                      </m:sSub>
+                      <m:r>
+                        <a:rPr lang="en-US" sz="800" i="1">
+                          <a:latin typeface="Cambria Math" panose="02040503050406030204" pitchFamily="18" charset="0"/>
+                          <a:cs typeface="Times New Roman" panose="02020603050405020304" pitchFamily="18" charset="0"/>
+                        </a:rPr>
+                        <m:t>=</m:t>
+                      </m:r>
+                      <m:func>
+                        <m:funcPr>
+                          <m:ctrlPr>
+                            <a:rPr lang="en-US" sz="800" i="1">
+                              <a:latin typeface="Cambria Math" panose="02040503050406030204" pitchFamily="18" charset="0"/>
+                              <a:cs typeface="Times New Roman" panose="02020603050405020304" pitchFamily="18" charset="0"/>
+                            </a:rPr>
+                          </m:ctrlPr>
+                        </m:funcPr>
+                        <m:fName>
+                          <m:sSup>
+                            <m:sSupPr>
+                              <m:ctrlPr>
+                                <a:rPr lang="en-US" sz="800" i="1">
+                                  <a:latin typeface="Cambria Math" panose="02040503050406030204" pitchFamily="18" charset="0"/>
+                                  <a:cs typeface="Times New Roman" panose="02020603050405020304" pitchFamily="18" charset="0"/>
+                                </a:rPr>
+                              </m:ctrlPr>
+                            </m:sSupPr>
+                            <m:e>
+                              <m:r>
+                                <m:rPr>
+                                  <m:sty m:val="p"/>
+                                </m:rPr>
+                                <a:rPr lang="en-US" sz="800">
+                                  <a:latin typeface="Cambria Math" panose="02040503050406030204" pitchFamily="18" charset="0"/>
+                                  <a:cs typeface="Times New Roman" panose="02020603050405020304" pitchFamily="18" charset="0"/>
+                                </a:rPr>
+                                <m:t>tan</m:t>
+                              </m:r>
+                            </m:e>
+                            <m:sup>
+                              <m:r>
+                                <a:rPr lang="en-US" sz="800" i="1">
+                                  <a:latin typeface="Cambria Math" panose="02040503050406030204" pitchFamily="18" charset="0"/>
+                                  <a:cs typeface="Times New Roman" panose="02020603050405020304" pitchFamily="18" charset="0"/>
+                                </a:rPr>
+                                <m:t>−1</m:t>
+                              </m:r>
+                            </m:sup>
+                          </m:sSup>
+                        </m:fName>
+                        <m:e>
+                          <m:d>
+                            <m:dPr>
+                              <m:ctrlPr>
+                                <a:rPr lang="en-US" sz="800" i="1">
+                                  <a:latin typeface="Cambria Math" panose="02040503050406030204" pitchFamily="18" charset="0"/>
+                                  <a:cs typeface="Times New Roman" panose="02020603050405020304" pitchFamily="18" charset="0"/>
+                                </a:rPr>
+                              </m:ctrlPr>
+                            </m:dPr>
+                            <m:e>
+                              <m:f>
+                                <m:fPr>
+                                  <m:ctrlPr>
+                                    <a:rPr lang="en-US" sz="800" i="1">
+                                      <a:latin typeface="Cambria Math" panose="02040503050406030204" pitchFamily="18" charset="0"/>
+                                      <a:cs typeface="Times New Roman" panose="02020603050405020304" pitchFamily="18" charset="0"/>
+                                    </a:rPr>
+                                  </m:ctrlPr>
+                                </m:fPr>
+                                <m:num>
+                                  <m:sSub>
+                                    <m:sSubPr>
+                                      <m:ctrlPr>
+                                        <a:rPr lang="en-US" sz="800" i="1">
+                                          <a:latin typeface="Cambria Math" panose="02040503050406030204" pitchFamily="18" charset="0"/>
+                                          <a:cs typeface="Times New Roman" panose="02020603050405020304" pitchFamily="18" charset="0"/>
+                                        </a:rPr>
+                                      </m:ctrlPr>
+                                    </m:sSubPr>
+                                    <m:e>
+                                      <m:r>
+                                        <a:rPr lang="en-US" sz="800" i="1">
+                                          <a:latin typeface="Cambria Math" panose="02040503050406030204" pitchFamily="18" charset="0"/>
+                                          <a:cs typeface="Times New Roman" panose="02020603050405020304" pitchFamily="18" charset="0"/>
+                                        </a:rPr>
+                                        <m:t>𝑣</m:t>
+                                      </m:r>
+                                    </m:e>
+                                    <m:sub>
+                                      <m:r>
+                                        <m:rPr>
+                                          <m:sty m:val="p"/>
+                                        </m:rPr>
+                                        <a:rPr lang="en-US" sz="800">
+                                          <a:latin typeface="Cambria Math" panose="02040503050406030204" pitchFamily="18" charset="0"/>
+                                          <a:cs typeface="Times New Roman" panose="02020603050405020304" pitchFamily="18" charset="0"/>
+                                        </a:rPr>
+                                        <m:t>x</m:t>
+                                      </m:r>
+                                    </m:sub>
+                                  </m:sSub>
+                                </m:num>
+                                <m:den>
+                                  <m:sSub>
+                                    <m:sSubPr>
+                                      <m:ctrlPr>
+                                        <a:rPr lang="en-US" sz="800" i="1">
+                                          <a:latin typeface="Cambria Math" panose="02040503050406030204" pitchFamily="18" charset="0"/>
+                                          <a:cs typeface="Times New Roman" panose="02020603050405020304" pitchFamily="18" charset="0"/>
+                                        </a:rPr>
+                                      </m:ctrlPr>
+                                    </m:sSubPr>
+                                    <m:e>
+                                      <m:r>
+                                        <a:rPr lang="en-US" sz="800" i="1">
+                                          <a:latin typeface="Cambria Math" panose="02040503050406030204" pitchFamily="18" charset="0"/>
+                                          <a:cs typeface="Times New Roman" panose="02020603050405020304" pitchFamily="18" charset="0"/>
+                                        </a:rPr>
+                                        <m:t>𝑣</m:t>
+                                      </m:r>
+                                    </m:e>
+                                    <m:sub>
+                                      <m:r>
+                                        <m:rPr>
+                                          <m:sty m:val="p"/>
+                                        </m:rPr>
+                                        <a:rPr lang="en-US" sz="800">
+                                          <a:latin typeface="Cambria Math" panose="02040503050406030204" pitchFamily="18" charset="0"/>
+                                          <a:cs typeface="Times New Roman" panose="02020603050405020304" pitchFamily="18" charset="0"/>
+                                        </a:rPr>
+                                        <m:t>z</m:t>
+                                      </m:r>
+                                    </m:sub>
+                                  </m:sSub>
+                                </m:den>
+                              </m:f>
+                            </m:e>
+                          </m:d>
+                        </m:e>
+                      </m:func>
+                      <m:r>
+                        <a:rPr lang="en-US" sz="800" b="0" i="0" smtClean="0">
+                          <a:latin typeface="Cambria Math" panose="02040503050406030204" pitchFamily="18" charset="0"/>
+                          <a:cs typeface="Times New Roman" panose="02020603050405020304" pitchFamily="18" charset="0"/>
+                        </a:rPr>
+                        <m:t>,  </m:t>
+                      </m:r>
+                      <m:sSub>
+                        <m:sSubPr>
+                          <m:ctrlPr>
+                            <a:rPr lang="en-US" sz="800" i="1">
+                              <a:latin typeface="Cambria Math" panose="02040503050406030204" pitchFamily="18" charset="0"/>
+                              <a:cs typeface="Times New Roman" panose="02020603050405020304" pitchFamily="18" charset="0"/>
+                            </a:rPr>
+                          </m:ctrlPr>
+                        </m:sSubPr>
+                        <m:e>
+                          <m:r>
+                            <a:rPr lang="en-US" sz="800" i="1">
+                              <a:latin typeface="Cambria Math" panose="02040503050406030204" pitchFamily="18" charset="0"/>
+                              <a:cs typeface="Times New Roman" panose="02020603050405020304" pitchFamily="18" charset="0"/>
+                            </a:rPr>
+                            <m:t>𝛿</m:t>
+                          </m:r>
+                        </m:e>
+                        <m:sub>
+                          <m:r>
+                            <m:rPr>
+                              <m:sty m:val="p"/>
+                            </m:rPr>
+                            <a:rPr lang="en-US" sz="800" b="0" i="0" smtClean="0">
+                              <a:latin typeface="Cambria Math" panose="02040503050406030204" pitchFamily="18" charset="0"/>
+                              <a:cs typeface="Times New Roman" panose="02020603050405020304" pitchFamily="18" charset="0"/>
+                            </a:rPr>
+                            <m:t>y</m:t>
+                          </m:r>
+                        </m:sub>
+                      </m:sSub>
+                      <m:r>
+                        <a:rPr lang="en-US" sz="800" i="1">
+                          <a:latin typeface="Cambria Math" panose="02040503050406030204" pitchFamily="18" charset="0"/>
+                          <a:cs typeface="Times New Roman" panose="02020603050405020304" pitchFamily="18" charset="0"/>
+                        </a:rPr>
+                        <m:t>=</m:t>
+                      </m:r>
+                      <m:func>
+                        <m:funcPr>
+                          <m:ctrlPr>
+                            <a:rPr lang="en-US" sz="800" i="1">
+                              <a:latin typeface="Cambria Math" panose="02040503050406030204" pitchFamily="18" charset="0"/>
+                              <a:cs typeface="Times New Roman" panose="02020603050405020304" pitchFamily="18" charset="0"/>
+                            </a:rPr>
+                          </m:ctrlPr>
+                        </m:funcPr>
+                        <m:fName>
+                          <m:sSup>
+                            <m:sSupPr>
+                              <m:ctrlPr>
+                                <a:rPr lang="en-US" sz="800" i="1">
+                                  <a:latin typeface="Cambria Math" panose="02040503050406030204" pitchFamily="18" charset="0"/>
+                                  <a:cs typeface="Times New Roman" panose="02020603050405020304" pitchFamily="18" charset="0"/>
+                                </a:rPr>
+                              </m:ctrlPr>
+                            </m:sSupPr>
+                            <m:e>
+                              <m:r>
+                                <m:rPr>
+                                  <m:sty m:val="p"/>
+                                </m:rPr>
+                                <a:rPr lang="en-US" sz="800">
+                                  <a:latin typeface="Cambria Math" panose="02040503050406030204" pitchFamily="18" charset="0"/>
+                                  <a:cs typeface="Times New Roman" panose="02020603050405020304" pitchFamily="18" charset="0"/>
+                                </a:rPr>
+                                <m:t>tan</m:t>
+                              </m:r>
+                            </m:e>
+                            <m:sup>
+                              <m:r>
+                                <a:rPr lang="en-US" sz="800" i="1">
+                                  <a:latin typeface="Cambria Math" panose="02040503050406030204" pitchFamily="18" charset="0"/>
+                                  <a:cs typeface="Times New Roman" panose="02020603050405020304" pitchFamily="18" charset="0"/>
+                                </a:rPr>
+                                <m:t>−1</m:t>
+                              </m:r>
+                            </m:sup>
+                          </m:sSup>
+                        </m:fName>
+                        <m:e>
+                          <m:d>
+                            <m:dPr>
+                              <m:ctrlPr>
+                                <a:rPr lang="en-US" sz="800" i="1">
+                                  <a:latin typeface="Cambria Math" panose="02040503050406030204" pitchFamily="18" charset="0"/>
+                                  <a:cs typeface="Times New Roman" panose="02020603050405020304" pitchFamily="18" charset="0"/>
+                                </a:rPr>
+                              </m:ctrlPr>
+                            </m:dPr>
+                            <m:e>
+                              <m:f>
+                                <m:fPr>
+                                  <m:ctrlPr>
+                                    <a:rPr lang="en-US" sz="800" i="1">
+                                      <a:latin typeface="Cambria Math" panose="02040503050406030204" pitchFamily="18" charset="0"/>
+                                      <a:cs typeface="Times New Roman" panose="02020603050405020304" pitchFamily="18" charset="0"/>
+                                    </a:rPr>
+                                  </m:ctrlPr>
+                                </m:fPr>
+                                <m:num>
+                                  <m:sSub>
+                                    <m:sSubPr>
+                                      <m:ctrlPr>
+                                        <a:rPr lang="en-US" sz="800" i="1">
+                                          <a:latin typeface="Cambria Math" panose="02040503050406030204" pitchFamily="18" charset="0"/>
+                                          <a:cs typeface="Times New Roman" panose="02020603050405020304" pitchFamily="18" charset="0"/>
+                                        </a:rPr>
+                                      </m:ctrlPr>
+                                    </m:sSubPr>
+                                    <m:e>
+                                      <m:r>
+                                        <a:rPr lang="en-US" sz="800" i="1">
+                                          <a:latin typeface="Cambria Math" panose="02040503050406030204" pitchFamily="18" charset="0"/>
+                                          <a:cs typeface="Times New Roman" panose="02020603050405020304" pitchFamily="18" charset="0"/>
+                                        </a:rPr>
+                                        <m:t>𝑣</m:t>
+                                      </m:r>
+                                    </m:e>
+                                    <m:sub>
+                                      <m:r>
+                                        <m:rPr>
+                                          <m:sty m:val="p"/>
+                                        </m:rPr>
+                                        <a:rPr lang="en-US" sz="800" b="0" i="0" smtClean="0">
+                                          <a:latin typeface="Cambria Math" panose="02040503050406030204" pitchFamily="18" charset="0"/>
+                                          <a:cs typeface="Times New Roman" panose="02020603050405020304" pitchFamily="18" charset="0"/>
+                                        </a:rPr>
+                                        <m:t>y</m:t>
+                                      </m:r>
+                                    </m:sub>
+                                  </m:sSub>
+                                </m:num>
+                                <m:den>
+                                  <m:sSub>
+                                    <m:sSubPr>
+                                      <m:ctrlPr>
+                                        <a:rPr lang="en-US" sz="800" i="1">
+                                          <a:latin typeface="Cambria Math" panose="02040503050406030204" pitchFamily="18" charset="0"/>
+                                          <a:cs typeface="Times New Roman" panose="02020603050405020304" pitchFamily="18" charset="0"/>
+                                        </a:rPr>
+                                      </m:ctrlPr>
+                                    </m:sSubPr>
+                                    <m:e>
+                                      <m:r>
+                                        <a:rPr lang="en-US" sz="800" i="1">
+                                          <a:latin typeface="Cambria Math" panose="02040503050406030204" pitchFamily="18" charset="0"/>
+                                          <a:cs typeface="Times New Roman" panose="02020603050405020304" pitchFamily="18" charset="0"/>
+                                        </a:rPr>
+                                        <m:t>𝑣</m:t>
+                                      </m:r>
+                                    </m:e>
+                                    <m:sub>
+                                      <m:r>
+                                        <m:rPr>
+                                          <m:sty m:val="p"/>
+                                        </m:rPr>
+                                        <a:rPr lang="en-US" sz="800">
+                                          <a:latin typeface="Cambria Math" panose="02040503050406030204" pitchFamily="18" charset="0"/>
+                                          <a:cs typeface="Times New Roman" panose="02020603050405020304" pitchFamily="18" charset="0"/>
+                                        </a:rPr>
+                                        <m:t>z</m:t>
+                                      </m:r>
+                                    </m:sub>
+                                  </m:sSub>
+                                </m:den>
+                              </m:f>
+                            </m:e>
+                          </m:d>
+                        </m:e>
+                      </m:func>
+                    </m:oMath>
+                  </m:oMathPara>
+                </a14:m>
+                <a:endParaRPr lang="en-US" sz="800" dirty="0">
+                  <a:latin typeface="Times New Roman" panose="02020603050405020304" pitchFamily="18" charset="0"/>
+                  <a:cs typeface="Times New Roman" panose="02020603050405020304" pitchFamily="18" charset="0"/>
+                </a:endParaRPr>
+              </a:p>
+            </p:txBody>
+          </p:sp>
+        </mc:Choice>
+        <mc:Fallback>
+          <p:sp>
+            <p:nvSpPr>
+              <p:cNvPr id="44" name="TextBox 43">
+                <a:extLst>
+                  <a:ext uri="{FF2B5EF4-FFF2-40B4-BE49-F238E27FC236}">
+                    <a16:creationId xmlns:a16="http://schemas.microsoft.com/office/drawing/2014/main" id="{5D2FE379-F4A9-4C5F-A714-E1870FA4C4AF}"/>
+                  </a:ext>
+                </a:extLst>
+              </p:cNvPr>
+              <p:cNvSpPr txBox="1">
+                <a:spLocks noRot="1" noChangeAspect="1" noMove="1" noResize="1" noEditPoints="1" noAdjustHandles="1" noChangeArrowheads="1" noChangeShapeType="1" noTextEdit="1"/>
+              </p:cNvSpPr>
+              <p:nvPr/>
+            </p:nvSpPr>
+            <p:spPr>
+              <a:xfrm>
+                <a:off x="2943828" y="1825862"/>
+                <a:ext cx="2968954" cy="368947"/>
+              </a:xfrm>
+              <a:prstGeom prst="rect">
+                <a:avLst/>
+              </a:prstGeom>
+              <a:blipFill>
+                <a:blip r:embed="rId8"/>
+                <a:stretch>
+                  <a:fillRect/>
+                </a:stretch>
+              </a:blipFill>
+            </p:spPr>
+            <p:txBody>
+              <a:bodyPr/>
+              <a:lstStyle/>
+              <a:p>
+                <a:r>
+                  <a:rPr lang="en-US">
+                    <a:noFill/>
+                  </a:rPr>
+                  <a:t> </a:t>
+                </a:r>
+              </a:p>
+            </p:txBody>
+          </p:sp>
+        </mc:Fallback>
+      </mc:AlternateContent>
+    </p:spTree>
+    <p:extLst>
+      <p:ext uri="{BB962C8B-B14F-4D97-AF65-F5344CB8AC3E}">
+        <p14:creationId xmlns:p14="http://schemas.microsoft.com/office/powerpoint/2010/main" val="1938230230"/>
       </p:ext>
     </p:extLst>
   </p:cSld>

</xml_diff>

<commit_message>
Built normal force library - JB
</commit_message>
<xml_diff>
--- a/Documentation/rocketDiagrams.pptx
+++ b/Documentation/rocketDiagrams.pptx
@@ -260,7 +260,7 @@
           <a:p>
             <a:fld id="{06D363D2-934C-43C0-9ECF-5C42BB9FE542}" type="datetimeFigureOut">
               <a:rPr lang="en-US" smtClean="0"/>
-              <a:t>12/7/2020</a:t>
+              <a:t>12/8/2020</a:t>
             </a:fld>
             <a:endParaRPr lang="en-US"/>
           </a:p>
@@ -458,7 +458,7 @@
           <a:p>
             <a:fld id="{06D363D2-934C-43C0-9ECF-5C42BB9FE542}" type="datetimeFigureOut">
               <a:rPr lang="en-US" smtClean="0"/>
-              <a:t>12/7/2020</a:t>
+              <a:t>12/8/2020</a:t>
             </a:fld>
             <a:endParaRPr lang="en-US"/>
           </a:p>
@@ -666,7 +666,7 @@
           <a:p>
             <a:fld id="{06D363D2-934C-43C0-9ECF-5C42BB9FE542}" type="datetimeFigureOut">
               <a:rPr lang="en-US" smtClean="0"/>
-              <a:t>12/7/2020</a:t>
+              <a:t>12/8/2020</a:t>
             </a:fld>
             <a:endParaRPr lang="en-US"/>
           </a:p>
@@ -864,7 +864,7 @@
           <a:p>
             <a:fld id="{06D363D2-934C-43C0-9ECF-5C42BB9FE542}" type="datetimeFigureOut">
               <a:rPr lang="en-US" smtClean="0"/>
-              <a:t>12/7/2020</a:t>
+              <a:t>12/8/2020</a:t>
             </a:fld>
             <a:endParaRPr lang="en-US"/>
           </a:p>
@@ -1139,7 +1139,7 @@
           <a:p>
             <a:fld id="{06D363D2-934C-43C0-9ECF-5C42BB9FE542}" type="datetimeFigureOut">
               <a:rPr lang="en-US" smtClean="0"/>
-              <a:t>12/7/2020</a:t>
+              <a:t>12/8/2020</a:t>
             </a:fld>
             <a:endParaRPr lang="en-US"/>
           </a:p>
@@ -1404,7 +1404,7 @@
           <a:p>
             <a:fld id="{06D363D2-934C-43C0-9ECF-5C42BB9FE542}" type="datetimeFigureOut">
               <a:rPr lang="en-US" smtClean="0"/>
-              <a:t>12/7/2020</a:t>
+              <a:t>12/8/2020</a:t>
             </a:fld>
             <a:endParaRPr lang="en-US"/>
           </a:p>
@@ -1816,7 +1816,7 @@
           <a:p>
             <a:fld id="{06D363D2-934C-43C0-9ECF-5C42BB9FE542}" type="datetimeFigureOut">
               <a:rPr lang="en-US" smtClean="0"/>
-              <a:t>12/7/2020</a:t>
+              <a:t>12/8/2020</a:t>
             </a:fld>
             <a:endParaRPr lang="en-US"/>
           </a:p>
@@ -1957,7 +1957,7 @@
           <a:p>
             <a:fld id="{06D363D2-934C-43C0-9ECF-5C42BB9FE542}" type="datetimeFigureOut">
               <a:rPr lang="en-US" smtClean="0"/>
-              <a:t>12/7/2020</a:t>
+              <a:t>12/8/2020</a:t>
             </a:fld>
             <a:endParaRPr lang="en-US"/>
           </a:p>
@@ -2070,7 +2070,7 @@
           <a:p>
             <a:fld id="{06D363D2-934C-43C0-9ECF-5C42BB9FE542}" type="datetimeFigureOut">
               <a:rPr lang="en-US" smtClean="0"/>
-              <a:t>12/7/2020</a:t>
+              <a:t>12/8/2020</a:t>
             </a:fld>
             <a:endParaRPr lang="en-US"/>
           </a:p>
@@ -2381,7 +2381,7 @@
           <a:p>
             <a:fld id="{06D363D2-934C-43C0-9ECF-5C42BB9FE542}" type="datetimeFigureOut">
               <a:rPr lang="en-US" smtClean="0"/>
-              <a:t>12/7/2020</a:t>
+              <a:t>12/8/2020</a:t>
             </a:fld>
             <a:endParaRPr lang="en-US"/>
           </a:p>
@@ -2669,7 +2669,7 @@
           <a:p>
             <a:fld id="{06D363D2-934C-43C0-9ECF-5C42BB9FE542}" type="datetimeFigureOut">
               <a:rPr lang="en-US" smtClean="0"/>
-              <a:t>12/7/2020</a:t>
+              <a:t>12/8/2020</a:t>
             </a:fld>
             <a:endParaRPr lang="en-US"/>
           </a:p>
@@ -2910,7 +2910,7 @@
           <a:p>
             <a:fld id="{06D363D2-934C-43C0-9ECF-5C42BB9FE542}" type="datetimeFigureOut">
               <a:rPr lang="en-US" smtClean="0"/>
-              <a:t>12/7/2020</a:t>
+              <a:t>12/8/2020</a:t>
             </a:fld>
             <a:endParaRPr lang="en-US"/>
           </a:p>
@@ -3828,6 +3828,543 @@
           </mc:Fallback>
         </mc:AlternateContent>
       </p:grpSp>
+      <p:grpSp>
+        <p:nvGrpSpPr>
+          <p:cNvPr id="14" name="Group 13">
+            <a:extLst>
+              <a:ext uri="{FF2B5EF4-FFF2-40B4-BE49-F238E27FC236}">
+                <a16:creationId xmlns:a16="http://schemas.microsoft.com/office/drawing/2014/main" id="{29A40471-8FEF-49AF-9426-E81F09F3977D}"/>
+              </a:ext>
+            </a:extLst>
+          </p:cNvPr>
+          <p:cNvGrpSpPr/>
+          <p:nvPr/>
+        </p:nvGrpSpPr>
+        <p:grpSpPr>
+          <a:xfrm>
+            <a:off x="3417903" y="2979174"/>
+            <a:ext cx="5805984" cy="1697687"/>
+            <a:chOff x="3417903" y="2979174"/>
+            <a:chExt cx="5805984" cy="1697687"/>
+          </a:xfrm>
+        </p:grpSpPr>
+        <p:pic>
+          <p:nvPicPr>
+            <p:cNvPr id="2" name="Picture 1">
+              <a:extLst>
+                <a:ext uri="{FF2B5EF4-FFF2-40B4-BE49-F238E27FC236}">
+                  <a16:creationId xmlns:a16="http://schemas.microsoft.com/office/drawing/2014/main" id="{2685F743-AA21-4DE2-824B-A7954AB9F568}"/>
+                </a:ext>
+              </a:extLst>
+            </p:cNvPr>
+            <p:cNvPicPr>
+              <a:picLocks noChangeAspect="1"/>
+            </p:cNvPicPr>
+            <p:nvPr/>
+          </p:nvPicPr>
+          <p:blipFill>
+            <a:blip r:embed="rId5"/>
+            <a:stretch>
+              <a:fillRect/>
+            </a:stretch>
+          </p:blipFill>
+          <p:spPr>
+            <a:xfrm rot="996366">
+              <a:off x="3417903" y="3317557"/>
+              <a:ext cx="5805984" cy="1359304"/>
+            </a:xfrm>
+            <a:prstGeom prst="rect">
+              <a:avLst/>
+            </a:prstGeom>
+          </p:spPr>
+        </p:pic>
+        <p:cxnSp>
+          <p:nvCxnSpPr>
+            <p:cNvPr id="4" name="Straight Arrow Connector 3">
+              <a:extLst>
+                <a:ext uri="{FF2B5EF4-FFF2-40B4-BE49-F238E27FC236}">
+                  <a16:creationId xmlns:a16="http://schemas.microsoft.com/office/drawing/2014/main" id="{667A90A8-D8BC-4FBF-B032-9CA70E6E07DE}"/>
+                </a:ext>
+              </a:extLst>
+            </p:cNvPr>
+            <p:cNvCxnSpPr/>
+            <p:nvPr/>
+          </p:nvCxnSpPr>
+          <p:spPr>
+            <a:xfrm>
+              <a:off x="6277897" y="3962400"/>
+              <a:ext cx="1037303" cy="299884"/>
+            </a:xfrm>
+            <a:prstGeom prst="straightConnector1">
+              <a:avLst/>
+            </a:prstGeom>
+            <a:ln>
+              <a:solidFill>
+                <a:srgbClr val="00FF00"/>
+              </a:solidFill>
+              <a:tailEnd type="triangle"/>
+            </a:ln>
+          </p:spPr>
+          <p:style>
+            <a:lnRef idx="1">
+              <a:schemeClr val="accent1"/>
+            </a:lnRef>
+            <a:fillRef idx="0">
+              <a:schemeClr val="accent1"/>
+            </a:fillRef>
+            <a:effectRef idx="0">
+              <a:schemeClr val="accent1"/>
+            </a:effectRef>
+            <a:fontRef idx="minor">
+              <a:schemeClr val="tx1"/>
+            </a:fontRef>
+          </p:style>
+        </p:cxnSp>
+        <p:cxnSp>
+          <p:nvCxnSpPr>
+            <p:cNvPr id="6" name="Straight Arrow Connector 5">
+              <a:extLst>
+                <a:ext uri="{FF2B5EF4-FFF2-40B4-BE49-F238E27FC236}">
+                  <a16:creationId xmlns:a16="http://schemas.microsoft.com/office/drawing/2014/main" id="{DFDACA7B-37A5-494F-B1D2-5E4DD5CFEBB0}"/>
+                </a:ext>
+              </a:extLst>
+            </p:cNvPr>
+            <p:cNvCxnSpPr>
+              <a:cxnSpLocks/>
+            </p:cNvCxnSpPr>
+            <p:nvPr/>
+          </p:nvCxnSpPr>
+          <p:spPr>
+            <a:xfrm flipV="1">
+              <a:off x="6282813" y="3687097"/>
+              <a:ext cx="983226" cy="270387"/>
+            </a:xfrm>
+            <a:prstGeom prst="straightConnector1">
+              <a:avLst/>
+            </a:prstGeom>
+            <a:ln>
+              <a:solidFill>
+                <a:srgbClr val="0000FF"/>
+              </a:solidFill>
+              <a:tailEnd type="triangle"/>
+            </a:ln>
+          </p:spPr>
+          <p:style>
+            <a:lnRef idx="1">
+              <a:schemeClr val="accent1"/>
+            </a:lnRef>
+            <a:fillRef idx="0">
+              <a:schemeClr val="accent1"/>
+            </a:fillRef>
+            <a:effectRef idx="0">
+              <a:schemeClr val="accent1"/>
+            </a:effectRef>
+            <a:fontRef idx="minor">
+              <a:schemeClr val="tx1"/>
+            </a:fontRef>
+          </p:style>
+        </p:cxnSp>
+        <p:cxnSp>
+          <p:nvCxnSpPr>
+            <p:cNvPr id="13" name="Straight Arrow Connector 12">
+              <a:extLst>
+                <a:ext uri="{FF2B5EF4-FFF2-40B4-BE49-F238E27FC236}">
+                  <a16:creationId xmlns:a16="http://schemas.microsoft.com/office/drawing/2014/main" id="{6B1C927C-D3D6-4874-A0C1-82D02663C532}"/>
+                </a:ext>
+              </a:extLst>
+            </p:cNvPr>
+            <p:cNvCxnSpPr/>
+            <p:nvPr/>
+          </p:nvCxnSpPr>
+          <p:spPr>
+            <a:xfrm flipV="1">
+              <a:off x="6277897" y="2979174"/>
+              <a:ext cx="0" cy="983226"/>
+            </a:xfrm>
+            <a:prstGeom prst="straightConnector1">
+              <a:avLst/>
+            </a:prstGeom>
+            <a:ln>
+              <a:solidFill>
+                <a:srgbClr val="FF0000"/>
+              </a:solidFill>
+              <a:tailEnd type="triangle"/>
+            </a:ln>
+          </p:spPr>
+          <p:style>
+            <a:lnRef idx="1">
+              <a:schemeClr val="accent1"/>
+            </a:lnRef>
+            <a:fillRef idx="0">
+              <a:schemeClr val="accent1"/>
+            </a:fillRef>
+            <a:effectRef idx="0">
+              <a:schemeClr val="accent1"/>
+            </a:effectRef>
+            <a:fontRef idx="minor">
+              <a:schemeClr val="tx1"/>
+            </a:fontRef>
+          </p:style>
+        </p:cxnSp>
+      </p:grpSp>
+      <mc:AlternateContent xmlns:mc="http://schemas.openxmlformats.org/markup-compatibility/2006">
+        <mc:Choice xmlns:a14="http://schemas.microsoft.com/office/drawing/2010/main" Requires="a14">
+          <p:sp>
+            <p:nvSpPr>
+              <p:cNvPr id="18" name="TextBox 17">
+                <a:extLst>
+                  <a:ext uri="{FF2B5EF4-FFF2-40B4-BE49-F238E27FC236}">
+                    <a16:creationId xmlns:a16="http://schemas.microsoft.com/office/drawing/2014/main" id="{586AF218-7282-49DC-8B5E-B1C8459D1C9F}"/>
+                  </a:ext>
+                </a:extLst>
+              </p:cNvPr>
+              <p:cNvSpPr txBox="1"/>
+              <p:nvPr/>
+            </p:nvSpPr>
+            <p:spPr>
+              <a:xfrm>
+                <a:off x="6857756" y="4279063"/>
+                <a:ext cx="473784" cy="369332"/>
+              </a:xfrm>
+              <a:prstGeom prst="rect">
+                <a:avLst/>
+              </a:prstGeom>
+              <a:noFill/>
+            </p:spPr>
+            <p:txBody>
+              <a:bodyPr wrap="none" rtlCol="0">
+                <a:spAutoFit/>
+              </a:bodyPr>
+              <a:lstStyle/>
+              <a:p>
+                <a:pPr/>
+                <a14:m>
+                  <m:oMathPara xmlns:m="http://schemas.openxmlformats.org/officeDocument/2006/math">
+                    <m:oMathParaPr>
+                      <m:jc m:val="centerGroup"/>
+                    </m:oMathParaPr>
+                    <m:oMath xmlns:m="http://schemas.openxmlformats.org/officeDocument/2006/math">
+                      <m:sSub>
+                        <m:sSubPr>
+                          <m:ctrlPr>
+                            <a:rPr lang="en-US" b="0" i="1" smtClean="0">
+                              <a:solidFill>
+                                <a:schemeClr val="tx1"/>
+                              </a:solidFill>
+                              <a:latin typeface="Cambria Math" panose="02040503050406030204" pitchFamily="18" charset="0"/>
+                            </a:rPr>
+                          </m:ctrlPr>
+                        </m:sSubPr>
+                        <m:e>
+                          <m:r>
+                            <a:rPr lang="en-US" b="0" i="1" smtClean="0">
+                              <a:solidFill>
+                                <a:schemeClr val="tx1"/>
+                              </a:solidFill>
+                              <a:latin typeface="Cambria Math" panose="02040503050406030204" pitchFamily="18" charset="0"/>
+                            </a:rPr>
+                            <m:t>𝑥</m:t>
+                          </m:r>
+                        </m:e>
+                        <m:sub>
+                          <m:r>
+                            <a:rPr lang="en-US" b="0" i="1" smtClean="0">
+                              <a:solidFill>
+                                <a:schemeClr val="tx1"/>
+                              </a:solidFill>
+                              <a:latin typeface="Cambria Math" panose="02040503050406030204" pitchFamily="18" charset="0"/>
+                            </a:rPr>
+                            <m:t>𝑏</m:t>
+                          </m:r>
+                        </m:sub>
+                      </m:sSub>
+                    </m:oMath>
+                  </m:oMathPara>
+                </a14:m>
+                <a:endParaRPr lang="en-US" dirty="0">
+                  <a:solidFill>
+                    <a:schemeClr val="tx1"/>
+                  </a:solidFill>
+                </a:endParaRPr>
+              </a:p>
+            </p:txBody>
+          </p:sp>
+        </mc:Choice>
+        <mc:Fallback>
+          <p:sp>
+            <p:nvSpPr>
+              <p:cNvPr id="18" name="TextBox 17">
+                <a:extLst>
+                  <a:ext uri="{FF2B5EF4-FFF2-40B4-BE49-F238E27FC236}">
+                    <a16:creationId xmlns:a16="http://schemas.microsoft.com/office/drawing/2014/main" id="{586AF218-7282-49DC-8B5E-B1C8459D1C9F}"/>
+                  </a:ext>
+                </a:extLst>
+              </p:cNvPr>
+              <p:cNvSpPr txBox="1">
+                <a:spLocks noRot="1" noChangeAspect="1" noMove="1" noResize="1" noEditPoints="1" noAdjustHandles="1" noChangeArrowheads="1" noChangeShapeType="1" noTextEdit="1"/>
+              </p:cNvSpPr>
+              <p:nvPr/>
+            </p:nvSpPr>
+            <p:spPr>
+              <a:xfrm>
+                <a:off x="6857756" y="4279063"/>
+                <a:ext cx="473784" cy="369332"/>
+              </a:xfrm>
+              <a:prstGeom prst="rect">
+                <a:avLst/>
+              </a:prstGeom>
+              <a:blipFill>
+                <a:blip r:embed="rId6"/>
+                <a:stretch>
+                  <a:fillRect/>
+                </a:stretch>
+              </a:blipFill>
+            </p:spPr>
+            <p:txBody>
+              <a:bodyPr/>
+              <a:lstStyle/>
+              <a:p>
+                <a:r>
+                  <a:rPr lang="en-US">
+                    <a:noFill/>
+                  </a:rPr>
+                  <a:t> </a:t>
+                </a:r>
+              </a:p>
+            </p:txBody>
+          </p:sp>
+        </mc:Fallback>
+      </mc:AlternateContent>
+      <mc:AlternateContent xmlns:mc="http://schemas.openxmlformats.org/markup-compatibility/2006">
+        <mc:Choice xmlns:a14="http://schemas.microsoft.com/office/drawing/2010/main" Requires="a14">
+          <p:sp>
+            <p:nvSpPr>
+              <p:cNvPr id="20" name="TextBox 19">
+                <a:extLst>
+                  <a:ext uri="{FF2B5EF4-FFF2-40B4-BE49-F238E27FC236}">
+                    <a16:creationId xmlns:a16="http://schemas.microsoft.com/office/drawing/2014/main" id="{990FF088-E7A5-42CA-94A4-94ACF02814C6}"/>
+                  </a:ext>
+                </a:extLst>
+              </p:cNvPr>
+              <p:cNvSpPr txBox="1"/>
+              <p:nvPr/>
+            </p:nvSpPr>
+            <p:spPr>
+              <a:xfrm>
+                <a:off x="7025347" y="3605307"/>
+                <a:ext cx="475450" cy="369332"/>
+              </a:xfrm>
+              <a:prstGeom prst="rect">
+                <a:avLst/>
+              </a:prstGeom>
+              <a:noFill/>
+            </p:spPr>
+            <p:txBody>
+              <a:bodyPr wrap="none" rtlCol="0">
+                <a:spAutoFit/>
+              </a:bodyPr>
+              <a:lstStyle/>
+              <a:p>
+                <a:pPr/>
+                <a14:m>
+                  <m:oMathPara xmlns:m="http://schemas.openxmlformats.org/officeDocument/2006/math">
+                    <m:oMathParaPr>
+                      <m:jc m:val="centerGroup"/>
+                    </m:oMathParaPr>
+                    <m:oMath xmlns:m="http://schemas.openxmlformats.org/officeDocument/2006/math">
+                      <m:sSub>
+                        <m:sSubPr>
+                          <m:ctrlPr>
+                            <a:rPr lang="en-US" b="0" i="1" smtClean="0">
+                              <a:latin typeface="Cambria Math" panose="02040503050406030204" pitchFamily="18" charset="0"/>
+                            </a:rPr>
+                          </m:ctrlPr>
+                        </m:sSubPr>
+                        <m:e>
+                          <m:r>
+                            <a:rPr lang="en-US" b="0" i="1" smtClean="0">
+                              <a:latin typeface="Cambria Math" panose="02040503050406030204" pitchFamily="18" charset="0"/>
+                            </a:rPr>
+                            <m:t>𝑦</m:t>
+                          </m:r>
+                        </m:e>
+                        <m:sub>
+                          <m:r>
+                            <a:rPr lang="en-US" b="0" i="1" smtClean="0">
+                              <a:latin typeface="Cambria Math" panose="02040503050406030204" pitchFamily="18" charset="0"/>
+                            </a:rPr>
+                            <m:t>𝑏</m:t>
+                          </m:r>
+                        </m:sub>
+                      </m:sSub>
+                    </m:oMath>
+                  </m:oMathPara>
+                </a14:m>
+                <a:endParaRPr lang="en-US" dirty="0"/>
+              </a:p>
+            </p:txBody>
+          </p:sp>
+        </mc:Choice>
+        <mc:Fallback>
+          <p:sp>
+            <p:nvSpPr>
+              <p:cNvPr id="20" name="TextBox 19">
+                <a:extLst>
+                  <a:ext uri="{FF2B5EF4-FFF2-40B4-BE49-F238E27FC236}">
+                    <a16:creationId xmlns:a16="http://schemas.microsoft.com/office/drawing/2014/main" id="{990FF088-E7A5-42CA-94A4-94ACF02814C6}"/>
+                  </a:ext>
+                </a:extLst>
+              </p:cNvPr>
+              <p:cNvSpPr txBox="1">
+                <a:spLocks noRot="1" noChangeAspect="1" noMove="1" noResize="1" noEditPoints="1" noAdjustHandles="1" noChangeArrowheads="1" noChangeShapeType="1" noTextEdit="1"/>
+              </p:cNvSpPr>
+              <p:nvPr/>
+            </p:nvSpPr>
+            <p:spPr>
+              <a:xfrm>
+                <a:off x="7025347" y="3605307"/>
+                <a:ext cx="475450" cy="369332"/>
+              </a:xfrm>
+              <a:prstGeom prst="rect">
+                <a:avLst/>
+              </a:prstGeom>
+              <a:blipFill>
+                <a:blip r:embed="rId7"/>
+                <a:stretch>
+                  <a:fillRect b="-6557"/>
+                </a:stretch>
+              </a:blipFill>
+            </p:spPr>
+            <p:txBody>
+              <a:bodyPr/>
+              <a:lstStyle/>
+              <a:p>
+                <a:r>
+                  <a:rPr lang="en-US">
+                    <a:noFill/>
+                  </a:rPr>
+                  <a:t> </a:t>
+                </a:r>
+              </a:p>
+            </p:txBody>
+          </p:sp>
+        </mc:Fallback>
+      </mc:AlternateContent>
+      <mc:AlternateContent xmlns:mc="http://schemas.openxmlformats.org/markup-compatibility/2006">
+        <mc:Choice xmlns:a14="http://schemas.microsoft.com/office/drawing/2010/main" Requires="a14">
+          <p:sp>
+            <p:nvSpPr>
+              <p:cNvPr id="21" name="TextBox 20">
+                <a:extLst>
+                  <a:ext uri="{FF2B5EF4-FFF2-40B4-BE49-F238E27FC236}">
+                    <a16:creationId xmlns:a16="http://schemas.microsoft.com/office/drawing/2014/main" id="{C5276761-CE45-4F01-8602-D0FB640F6F7D}"/>
+                  </a:ext>
+                </a:extLst>
+              </p:cNvPr>
+              <p:cNvSpPr txBox="1"/>
+              <p:nvPr/>
+            </p:nvSpPr>
+            <p:spPr>
+              <a:xfrm>
+                <a:off x="5914104" y="2764308"/>
+                <a:ext cx="459165" cy="369332"/>
+              </a:xfrm>
+              <a:prstGeom prst="rect">
+                <a:avLst/>
+              </a:prstGeom>
+              <a:noFill/>
+            </p:spPr>
+            <p:txBody>
+              <a:bodyPr wrap="none" rtlCol="0">
+                <a:spAutoFit/>
+              </a:bodyPr>
+              <a:lstStyle/>
+              <a:p>
+                <a:pPr/>
+                <a14:m>
+                  <m:oMathPara xmlns:m="http://schemas.openxmlformats.org/officeDocument/2006/math">
+                    <m:oMathParaPr>
+                      <m:jc m:val="centerGroup"/>
+                    </m:oMathParaPr>
+                    <m:oMath xmlns:m="http://schemas.openxmlformats.org/officeDocument/2006/math">
+                      <m:sSub>
+                        <m:sSubPr>
+                          <m:ctrlPr>
+                            <a:rPr lang="en-US" b="0" i="1" smtClean="0">
+                              <a:latin typeface="Cambria Math" panose="02040503050406030204" pitchFamily="18" charset="0"/>
+                            </a:rPr>
+                          </m:ctrlPr>
+                        </m:sSubPr>
+                        <m:e>
+                          <m:r>
+                            <a:rPr lang="en-US" b="0" i="1" smtClean="0">
+                              <a:latin typeface="Cambria Math" panose="02040503050406030204" pitchFamily="18" charset="0"/>
+                            </a:rPr>
+                            <m:t>𝑧</m:t>
+                          </m:r>
+                        </m:e>
+                        <m:sub>
+                          <m:r>
+                            <a:rPr lang="en-US" b="0" i="1" smtClean="0">
+                              <a:latin typeface="Cambria Math" panose="02040503050406030204" pitchFamily="18" charset="0"/>
+                            </a:rPr>
+                            <m:t>𝑏</m:t>
+                          </m:r>
+                        </m:sub>
+                      </m:sSub>
+                    </m:oMath>
+                  </m:oMathPara>
+                </a14:m>
+                <a:endParaRPr lang="en-US" dirty="0"/>
+              </a:p>
+            </p:txBody>
+          </p:sp>
+        </mc:Choice>
+        <mc:Fallback>
+          <p:sp>
+            <p:nvSpPr>
+              <p:cNvPr id="21" name="TextBox 20">
+                <a:extLst>
+                  <a:ext uri="{FF2B5EF4-FFF2-40B4-BE49-F238E27FC236}">
+                    <a16:creationId xmlns:a16="http://schemas.microsoft.com/office/drawing/2014/main" id="{C5276761-CE45-4F01-8602-D0FB640F6F7D}"/>
+                  </a:ext>
+                </a:extLst>
+              </p:cNvPr>
+              <p:cNvSpPr txBox="1">
+                <a:spLocks noRot="1" noChangeAspect="1" noMove="1" noResize="1" noEditPoints="1" noAdjustHandles="1" noChangeArrowheads="1" noChangeShapeType="1" noTextEdit="1"/>
+              </p:cNvSpPr>
+              <p:nvPr/>
+            </p:nvSpPr>
+            <p:spPr>
+              <a:xfrm>
+                <a:off x="5914104" y="2764308"/>
+                <a:ext cx="459165" cy="369332"/>
+              </a:xfrm>
+              <a:prstGeom prst="rect">
+                <a:avLst/>
+              </a:prstGeom>
+              <a:blipFill>
+                <a:blip r:embed="rId8"/>
+                <a:stretch>
+                  <a:fillRect/>
+                </a:stretch>
+              </a:blipFill>
+            </p:spPr>
+            <p:txBody>
+              <a:bodyPr/>
+              <a:lstStyle/>
+              <a:p>
+                <a:r>
+                  <a:rPr lang="en-US">
+                    <a:noFill/>
+                  </a:rPr>
+                  <a:t> </a:t>
+                </a:r>
+              </a:p>
+            </p:txBody>
+          </p:sp>
+        </mc:Fallback>
+      </mc:AlternateContent>
     </p:spTree>
     <p:extLst>
       <p:ext uri="{BB962C8B-B14F-4D97-AF65-F5344CB8AC3E}">
@@ -4266,8 +4803,8 @@
             </a:fontRef>
           </p:style>
         </p:cxnSp>
-        <mc:AlternateContent xmlns:mc="http://schemas.openxmlformats.org/markup-compatibility/2006">
-          <mc:Choice xmlns:a14="http://schemas.microsoft.com/office/drawing/2010/main" Requires="a14">
+        <mc:AlternateContent xmlns:mc="http://schemas.openxmlformats.org/markup-compatibility/2006" xmlns:a14="http://schemas.microsoft.com/office/drawing/2010/main">
+          <mc:Choice Requires="a14">
             <p:sp>
               <p:nvSpPr>
                 <p:cNvPr id="27" name="TextBox 26">
@@ -4296,6 +4833,7 @@
                 </a:bodyPr>
                 <a:lstStyle/>
                 <a:p>
+                  <a:pPr/>
                   <a14:m>
                     <m:oMathPara xmlns:m="http://schemas.openxmlformats.org/officeDocument/2006/math">
                       <m:oMathParaPr>
@@ -4351,7 +4889,7 @@
               </p:txBody>
             </p:sp>
           </mc:Choice>
-          <mc:Fallback>
+          <mc:Fallback xmlns="">
             <p:sp>
               <p:nvSpPr>
                 <p:cNvPr id="27" name="TextBox 26">
@@ -4396,8 +4934,8 @@
             </p:sp>
           </mc:Fallback>
         </mc:AlternateContent>
-        <mc:AlternateContent xmlns:mc="http://schemas.openxmlformats.org/markup-compatibility/2006">
-          <mc:Choice xmlns:a14="http://schemas.microsoft.com/office/drawing/2010/main" Requires="a14">
+        <mc:AlternateContent xmlns:mc="http://schemas.openxmlformats.org/markup-compatibility/2006" xmlns:a14="http://schemas.microsoft.com/office/drawing/2010/main">
+          <mc:Choice Requires="a14">
             <p:sp>
               <p:nvSpPr>
                 <p:cNvPr id="28" name="TextBox 27">
@@ -4426,6 +4964,7 @@
                 </a:bodyPr>
                 <a:lstStyle/>
                 <a:p>
+                  <a:pPr/>
                   <a14:m>
                     <m:oMathPara xmlns:m="http://schemas.openxmlformats.org/officeDocument/2006/math">
                       <m:oMathParaPr>
@@ -4481,7 +5020,7 @@
               </p:txBody>
             </p:sp>
           </mc:Choice>
-          <mc:Fallback>
+          <mc:Fallback xmlns="">
             <p:sp>
               <p:nvSpPr>
                 <p:cNvPr id="28" name="TextBox 27">
@@ -4606,8 +5145,8 @@
             </a:p>
           </p:txBody>
         </p:sp>
-        <mc:AlternateContent xmlns:mc="http://schemas.openxmlformats.org/markup-compatibility/2006">
-          <mc:Choice xmlns:a14="http://schemas.microsoft.com/office/drawing/2010/main" Requires="a14">
+        <mc:AlternateContent xmlns:mc="http://schemas.openxmlformats.org/markup-compatibility/2006" xmlns:a14="http://schemas.microsoft.com/office/drawing/2010/main">
+          <mc:Choice Requires="a14">
             <p:sp>
               <p:nvSpPr>
                 <p:cNvPr id="31" name="TextBox 30">
@@ -4636,6 +5175,7 @@
                 </a:bodyPr>
                 <a:lstStyle/>
                 <a:p>
+                  <a:pPr/>
                   <a14:m>
                     <m:oMathPara xmlns:m="http://schemas.openxmlformats.org/officeDocument/2006/math">
                       <m:oMathParaPr>
@@ -4663,7 +5203,7 @@
               </p:txBody>
             </p:sp>
           </mc:Choice>
-          <mc:Fallback>
+          <mc:Fallback xmlns="">
             <p:sp>
               <p:nvSpPr>
                 <p:cNvPr id="31" name="TextBox 30">
@@ -4708,8 +5248,8 @@
             </p:sp>
           </mc:Fallback>
         </mc:AlternateContent>
-        <mc:AlternateContent xmlns:mc="http://schemas.openxmlformats.org/markup-compatibility/2006">
-          <mc:Choice xmlns:a14="http://schemas.microsoft.com/office/drawing/2010/main" Requires="a14">
+        <mc:AlternateContent xmlns:mc="http://schemas.openxmlformats.org/markup-compatibility/2006" xmlns:a14="http://schemas.microsoft.com/office/drawing/2010/main">
+          <mc:Choice Requires="a14">
             <p:sp>
               <p:nvSpPr>
                 <p:cNvPr id="32" name="TextBox 31">
@@ -4738,6 +5278,7 @@
                 </a:bodyPr>
                 <a:lstStyle/>
                 <a:p>
+                  <a:pPr/>
                   <a14:m>
                     <m:oMathPara xmlns:m="http://schemas.openxmlformats.org/officeDocument/2006/math">
                       <m:oMathParaPr>
@@ -4765,7 +5306,7 @@
               </p:txBody>
             </p:sp>
           </mc:Choice>
-          <mc:Fallback>
+          <mc:Fallback xmlns="">
             <p:sp>
               <p:nvSpPr>
                 <p:cNvPr id="32" name="TextBox 31">
@@ -4810,8 +5351,8 @@
             </p:sp>
           </mc:Fallback>
         </mc:AlternateContent>
-        <mc:AlternateContent xmlns:mc="http://schemas.openxmlformats.org/markup-compatibility/2006">
-          <mc:Choice xmlns:a14="http://schemas.microsoft.com/office/drawing/2010/main" Requires="a14">
+        <mc:AlternateContent xmlns:mc="http://schemas.openxmlformats.org/markup-compatibility/2006" xmlns:a14="http://schemas.microsoft.com/office/drawing/2010/main">
+          <mc:Choice Requires="a14">
             <p:sp>
               <p:nvSpPr>
                 <p:cNvPr id="33" name="TextBox 32">
@@ -4840,6 +5381,7 @@
                 </a:bodyPr>
                 <a:lstStyle/>
                 <a:p>
+                  <a:pPr/>
                   <a14:m>
                     <m:oMathPara xmlns:m="http://schemas.openxmlformats.org/officeDocument/2006/math">
                       <m:oMathParaPr>
@@ -4867,7 +5409,7 @@
               </p:txBody>
             </p:sp>
           </mc:Choice>
-          <mc:Fallback>
+          <mc:Fallback xmlns="">
             <p:sp>
               <p:nvSpPr>
                 <p:cNvPr id="33" name="TextBox 32">
@@ -5262,8 +5804,8 @@
           </p:style>
         </p:cxnSp>
       </p:grpSp>
-      <mc:AlternateContent xmlns:mc="http://schemas.openxmlformats.org/markup-compatibility/2006">
-        <mc:Choice xmlns:a14="http://schemas.microsoft.com/office/drawing/2010/main" Requires="a14">
+      <mc:AlternateContent xmlns:mc="http://schemas.openxmlformats.org/markup-compatibility/2006" xmlns:a14="http://schemas.microsoft.com/office/drawing/2010/main">
+        <mc:Choice Requires="a14">
           <p:sp>
             <p:nvSpPr>
               <p:cNvPr id="42" name="TextBox 41">
@@ -5423,7 +5965,7 @@
             </p:txBody>
           </p:sp>
         </mc:Choice>
-        <mc:Fallback>
+        <mc:Fallback xmlns="">
           <p:sp>
             <p:nvSpPr>
               <p:cNvPr id="42" name="TextBox 41">
@@ -5468,8 +6010,8 @@
           </p:sp>
         </mc:Fallback>
       </mc:AlternateContent>
-      <mc:AlternateContent xmlns:mc="http://schemas.openxmlformats.org/markup-compatibility/2006">
-        <mc:Choice xmlns:a14="http://schemas.microsoft.com/office/drawing/2010/main" Requires="a14">
+      <mc:AlternateContent xmlns:mc="http://schemas.openxmlformats.org/markup-compatibility/2006" xmlns:a14="http://schemas.microsoft.com/office/drawing/2010/main">
+        <mc:Choice Requires="a14">
           <p:sp>
             <p:nvSpPr>
               <p:cNvPr id="44" name="TextBox 43">
@@ -6032,7 +6574,7 @@
             </p:txBody>
           </p:sp>
         </mc:Choice>
-        <mc:Fallback>
+        <mc:Fallback xmlns="">
           <p:sp>
             <p:nvSpPr>
               <p:cNvPr id="44" name="TextBox 43">

</xml_diff>

<commit_message>
Updated aerodynamics library and vehicle plot method - JB
</commit_message>
<xml_diff>
--- a/Documentation/rocketDiagrams.pptx
+++ b/Documentation/rocketDiagrams.pptx
@@ -263,7 +263,7 @@
           <a:p>
             <a:fld id="{06D363D2-934C-43C0-9ECF-5C42BB9FE542}" type="datetimeFigureOut">
               <a:rPr lang="en-US" smtClean="0"/>
-              <a:t>12/9/2020</a:t>
+              <a:t>12/14/2020</a:t>
             </a:fld>
             <a:endParaRPr lang="en-US"/>
           </a:p>
@@ -461,7 +461,7 @@
           <a:p>
             <a:fld id="{06D363D2-934C-43C0-9ECF-5C42BB9FE542}" type="datetimeFigureOut">
               <a:rPr lang="en-US" smtClean="0"/>
-              <a:t>12/9/2020</a:t>
+              <a:t>12/14/2020</a:t>
             </a:fld>
             <a:endParaRPr lang="en-US"/>
           </a:p>
@@ -669,7 +669,7 @@
           <a:p>
             <a:fld id="{06D363D2-934C-43C0-9ECF-5C42BB9FE542}" type="datetimeFigureOut">
               <a:rPr lang="en-US" smtClean="0"/>
-              <a:t>12/9/2020</a:t>
+              <a:t>12/14/2020</a:t>
             </a:fld>
             <a:endParaRPr lang="en-US"/>
           </a:p>
@@ -867,7 +867,7 @@
           <a:p>
             <a:fld id="{06D363D2-934C-43C0-9ECF-5C42BB9FE542}" type="datetimeFigureOut">
               <a:rPr lang="en-US" smtClean="0"/>
-              <a:t>12/9/2020</a:t>
+              <a:t>12/14/2020</a:t>
             </a:fld>
             <a:endParaRPr lang="en-US"/>
           </a:p>
@@ -1142,7 +1142,7 @@
           <a:p>
             <a:fld id="{06D363D2-934C-43C0-9ECF-5C42BB9FE542}" type="datetimeFigureOut">
               <a:rPr lang="en-US" smtClean="0"/>
-              <a:t>12/9/2020</a:t>
+              <a:t>12/14/2020</a:t>
             </a:fld>
             <a:endParaRPr lang="en-US"/>
           </a:p>
@@ -1407,7 +1407,7 @@
           <a:p>
             <a:fld id="{06D363D2-934C-43C0-9ECF-5C42BB9FE542}" type="datetimeFigureOut">
               <a:rPr lang="en-US" smtClean="0"/>
-              <a:t>12/9/2020</a:t>
+              <a:t>12/14/2020</a:t>
             </a:fld>
             <a:endParaRPr lang="en-US"/>
           </a:p>
@@ -1819,7 +1819,7 @@
           <a:p>
             <a:fld id="{06D363D2-934C-43C0-9ECF-5C42BB9FE542}" type="datetimeFigureOut">
               <a:rPr lang="en-US" smtClean="0"/>
-              <a:t>12/9/2020</a:t>
+              <a:t>12/14/2020</a:t>
             </a:fld>
             <a:endParaRPr lang="en-US"/>
           </a:p>
@@ -1960,7 +1960,7 @@
           <a:p>
             <a:fld id="{06D363D2-934C-43C0-9ECF-5C42BB9FE542}" type="datetimeFigureOut">
               <a:rPr lang="en-US" smtClean="0"/>
-              <a:t>12/9/2020</a:t>
+              <a:t>12/14/2020</a:t>
             </a:fld>
             <a:endParaRPr lang="en-US"/>
           </a:p>
@@ -2073,7 +2073,7 @@
           <a:p>
             <a:fld id="{06D363D2-934C-43C0-9ECF-5C42BB9FE542}" type="datetimeFigureOut">
               <a:rPr lang="en-US" smtClean="0"/>
-              <a:t>12/9/2020</a:t>
+              <a:t>12/14/2020</a:t>
             </a:fld>
             <a:endParaRPr lang="en-US"/>
           </a:p>
@@ -2384,7 +2384,7 @@
           <a:p>
             <a:fld id="{06D363D2-934C-43C0-9ECF-5C42BB9FE542}" type="datetimeFigureOut">
               <a:rPr lang="en-US" smtClean="0"/>
-              <a:t>12/9/2020</a:t>
+              <a:t>12/14/2020</a:t>
             </a:fld>
             <a:endParaRPr lang="en-US"/>
           </a:p>
@@ -2672,7 +2672,7 @@
           <a:p>
             <a:fld id="{06D363D2-934C-43C0-9ECF-5C42BB9FE542}" type="datetimeFigureOut">
               <a:rPr lang="en-US" smtClean="0"/>
-              <a:t>12/9/2020</a:t>
+              <a:t>12/14/2020</a:t>
             </a:fld>
             <a:endParaRPr lang="en-US"/>
           </a:p>
@@ -2913,7 +2913,7 @@
           <a:p>
             <a:fld id="{06D363D2-934C-43C0-9ECF-5C42BB9FE542}" type="datetimeFigureOut">
               <a:rPr lang="en-US" smtClean="0"/>
-              <a:t>12/9/2020</a:t>
+              <a:t>12/14/2020</a:t>
             </a:fld>
             <a:endParaRPr lang="en-US"/>
           </a:p>
@@ -3831,12 +3831,216 @@
           </mc:Fallback>
         </mc:AlternateContent>
       </p:grpSp>
+      <p:pic>
+        <p:nvPicPr>
+          <p:cNvPr id="2" name="Picture 1">
+            <a:extLst>
+              <a:ext uri="{FF2B5EF4-FFF2-40B4-BE49-F238E27FC236}">
+                <a16:creationId xmlns:a16="http://schemas.microsoft.com/office/drawing/2014/main" id="{2685F743-AA21-4DE2-824B-A7954AB9F568}"/>
+              </a:ext>
+            </a:extLst>
+          </p:cNvPr>
+          <p:cNvPicPr>
+            <a:picLocks noChangeAspect="1"/>
+          </p:cNvPicPr>
+          <p:nvPr/>
+        </p:nvPicPr>
+        <p:blipFill>
+          <a:blip r:embed="rId5"/>
+          <a:stretch>
+            <a:fillRect/>
+          </a:stretch>
+        </p:blipFill>
+        <p:spPr>
+          <a:xfrm rot="996366">
+            <a:off x="3417903" y="3317557"/>
+            <a:ext cx="5805984" cy="1359304"/>
+          </a:xfrm>
+          <a:prstGeom prst="rect">
+            <a:avLst/>
+          </a:prstGeom>
+        </p:spPr>
+      </p:pic>
+      <p:cxnSp>
+        <p:nvCxnSpPr>
+          <p:cNvPr id="5" name="Straight Arrow Connector 4">
+            <a:extLst>
+              <a:ext uri="{FF2B5EF4-FFF2-40B4-BE49-F238E27FC236}">
+                <a16:creationId xmlns:a16="http://schemas.microsoft.com/office/drawing/2014/main" id="{933B2688-0B2E-414D-B486-43C7AEB7F8E2}"/>
+              </a:ext>
+            </a:extLst>
+          </p:cNvPr>
+          <p:cNvCxnSpPr/>
+          <p:nvPr/>
+        </p:nvCxnSpPr>
+        <p:spPr>
+          <a:xfrm flipH="1" flipV="1">
+            <a:off x="9037041" y="4785544"/>
+            <a:ext cx="1018804" cy="320040"/>
+          </a:xfrm>
+          <a:prstGeom prst="straightConnector1">
+            <a:avLst/>
+          </a:prstGeom>
+          <a:ln w="38100">
+            <a:solidFill>
+              <a:srgbClr val="00FFFF"/>
+            </a:solidFill>
+            <a:prstDash val="dash"/>
+            <a:tailEnd type="triangle"/>
+          </a:ln>
+        </p:spPr>
+        <p:style>
+          <a:lnRef idx="1">
+            <a:schemeClr val="accent1"/>
+          </a:lnRef>
+          <a:fillRef idx="0">
+            <a:schemeClr val="accent1"/>
+          </a:fillRef>
+          <a:effectRef idx="0">
+            <a:schemeClr val="accent1"/>
+          </a:effectRef>
+          <a:fontRef idx="minor">
+            <a:schemeClr val="tx1"/>
+          </a:fontRef>
+        </p:style>
+      </p:cxnSp>
+      <p:cxnSp>
+        <p:nvCxnSpPr>
+          <p:cNvPr id="12" name="Straight Arrow Connector 11">
+            <a:extLst>
+              <a:ext uri="{FF2B5EF4-FFF2-40B4-BE49-F238E27FC236}">
+                <a16:creationId xmlns:a16="http://schemas.microsoft.com/office/drawing/2014/main" id="{FD4A185D-7F79-40BC-ADEE-049882856A14}"/>
+              </a:ext>
+            </a:extLst>
+          </p:cNvPr>
+          <p:cNvCxnSpPr/>
+          <p:nvPr/>
+        </p:nvCxnSpPr>
+        <p:spPr>
+          <a:xfrm>
+            <a:off x="6277897" y="3997209"/>
+            <a:ext cx="0" cy="1108375"/>
+          </a:xfrm>
+          <a:prstGeom prst="straightConnector1">
+            <a:avLst/>
+          </a:prstGeom>
+          <a:ln w="38100">
+            <a:solidFill>
+              <a:srgbClr val="00FFFF"/>
+            </a:solidFill>
+            <a:prstDash val="dash"/>
+            <a:tailEnd type="triangle"/>
+          </a:ln>
+        </p:spPr>
+        <p:style>
+          <a:lnRef idx="1">
+            <a:schemeClr val="accent1"/>
+          </a:lnRef>
+          <a:fillRef idx="0">
+            <a:schemeClr val="accent1"/>
+          </a:fillRef>
+          <a:effectRef idx="0">
+            <a:schemeClr val="accent1"/>
+          </a:effectRef>
+          <a:fontRef idx="minor">
+            <a:schemeClr val="tx1"/>
+          </a:fontRef>
+        </p:style>
+      </p:cxnSp>
+      <p:cxnSp>
+        <p:nvCxnSpPr>
+          <p:cNvPr id="26" name="Straight Arrow Connector 25">
+            <a:extLst>
+              <a:ext uri="{FF2B5EF4-FFF2-40B4-BE49-F238E27FC236}">
+                <a16:creationId xmlns:a16="http://schemas.microsoft.com/office/drawing/2014/main" id="{770D7937-8769-4884-8373-0B7CE4C7F4A2}"/>
+              </a:ext>
+            </a:extLst>
+          </p:cNvPr>
+          <p:cNvCxnSpPr>
+            <a:cxnSpLocks/>
+          </p:cNvCxnSpPr>
+          <p:nvPr/>
+        </p:nvCxnSpPr>
+        <p:spPr>
+          <a:xfrm flipH="1" flipV="1">
+            <a:off x="2982433" y="3289671"/>
+            <a:ext cx="3883798" cy="841932"/>
+          </a:xfrm>
+          <a:prstGeom prst="straightConnector1">
+            <a:avLst/>
+          </a:prstGeom>
+          <a:ln>
+            <a:solidFill>
+              <a:srgbClr val="FF00FF"/>
+            </a:solidFill>
+            <a:headEnd type="oval" w="lg" len="lg"/>
+            <a:tailEnd type="triangle"/>
+          </a:ln>
+        </p:spPr>
+        <p:style>
+          <a:lnRef idx="1">
+            <a:schemeClr val="accent1"/>
+          </a:lnRef>
+          <a:fillRef idx="0">
+            <a:schemeClr val="accent1"/>
+          </a:fillRef>
+          <a:effectRef idx="0">
+            <a:schemeClr val="accent1"/>
+          </a:effectRef>
+          <a:fontRef idx="minor">
+            <a:schemeClr val="tx1"/>
+          </a:fontRef>
+        </p:style>
+      </p:cxnSp>
+      <p:cxnSp>
+        <p:nvCxnSpPr>
+          <p:cNvPr id="17" name="Straight Arrow Connector 16">
+            <a:extLst>
+              <a:ext uri="{FF2B5EF4-FFF2-40B4-BE49-F238E27FC236}">
+                <a16:creationId xmlns:a16="http://schemas.microsoft.com/office/drawing/2014/main" id="{F45243EE-3434-48A6-82D6-3D6346A16B32}"/>
+              </a:ext>
+            </a:extLst>
+          </p:cNvPr>
+          <p:cNvCxnSpPr/>
+          <p:nvPr/>
+        </p:nvCxnSpPr>
+        <p:spPr>
+          <a:xfrm>
+            <a:off x="6858644" y="4134557"/>
+            <a:ext cx="1465928" cy="274320"/>
+          </a:xfrm>
+          <a:prstGeom prst="straightConnector1">
+            <a:avLst/>
+          </a:prstGeom>
+          <a:ln w="38100">
+            <a:solidFill>
+              <a:srgbClr val="00FFFF"/>
+            </a:solidFill>
+            <a:prstDash val="dash"/>
+            <a:tailEnd type="triangle"/>
+          </a:ln>
+        </p:spPr>
+        <p:style>
+          <a:lnRef idx="1">
+            <a:schemeClr val="accent1"/>
+          </a:lnRef>
+          <a:fillRef idx="0">
+            <a:schemeClr val="accent1"/>
+          </a:fillRef>
+          <a:effectRef idx="0">
+            <a:schemeClr val="accent1"/>
+          </a:effectRef>
+          <a:fontRef idx="minor">
+            <a:schemeClr val="tx1"/>
+          </a:fontRef>
+        </p:style>
+      </p:cxnSp>
       <p:grpSp>
         <p:nvGrpSpPr>
-          <p:cNvPr id="14" name="Group 13">
+          <p:cNvPr id="27" name="Group 26">
             <a:extLst>
               <a:ext uri="{FF2B5EF4-FFF2-40B4-BE49-F238E27FC236}">
-                <a16:creationId xmlns:a16="http://schemas.microsoft.com/office/drawing/2014/main" id="{29A40471-8FEF-49AF-9426-E81F09F3977D}"/>
+                <a16:creationId xmlns:a16="http://schemas.microsoft.com/office/drawing/2014/main" id="{91BDC94C-A88F-467D-B4CE-382E59D863DD}"/>
               </a:ext>
             </a:extLst>
           </p:cNvPr>
@@ -3845,179 +4049,529 @@
         </p:nvGrpSpPr>
         <p:grpSpPr>
           <a:xfrm>
-            <a:off x="3417903" y="2979174"/>
-            <a:ext cx="5805984" cy="1697687"/>
-            <a:chOff x="3417903" y="2979174"/>
-            <a:chExt cx="5805984" cy="1697687"/>
+            <a:off x="5914104" y="2764308"/>
+            <a:ext cx="1586693" cy="1884087"/>
+            <a:chOff x="5914104" y="2764308"/>
+            <a:chExt cx="1586693" cy="1884087"/>
           </a:xfrm>
         </p:grpSpPr>
-        <p:pic>
-          <p:nvPicPr>
-            <p:cNvPr id="2" name="Picture 1">
+        <p:grpSp>
+          <p:nvGrpSpPr>
+            <p:cNvPr id="19" name="Group 18">
               <a:extLst>
                 <a:ext uri="{FF2B5EF4-FFF2-40B4-BE49-F238E27FC236}">
-                  <a16:creationId xmlns:a16="http://schemas.microsoft.com/office/drawing/2014/main" id="{2685F743-AA21-4DE2-824B-A7954AB9F568}"/>
+                  <a16:creationId xmlns:a16="http://schemas.microsoft.com/office/drawing/2014/main" id="{B5C654E4-2100-426B-99F1-0312BF2316AC}"/>
                 </a:ext>
               </a:extLst>
             </p:cNvPr>
-            <p:cNvPicPr>
-              <a:picLocks noChangeAspect="1"/>
-            </p:cNvPicPr>
+            <p:cNvGrpSpPr/>
             <p:nvPr/>
-          </p:nvPicPr>
-          <p:blipFill>
-            <a:blip r:embed="rId5"/>
-            <a:stretch>
-              <a:fillRect/>
-            </a:stretch>
-          </p:blipFill>
-          <p:spPr>
-            <a:xfrm rot="996366">
-              <a:off x="3417903" y="3317557"/>
-              <a:ext cx="5805984" cy="1359304"/>
+          </p:nvGrpSpPr>
+          <p:grpSpPr>
+            <a:xfrm>
+              <a:off x="6277897" y="2979174"/>
+              <a:ext cx="1037303" cy="1283110"/>
+              <a:chOff x="6277897" y="2979174"/>
+              <a:chExt cx="1037303" cy="1283110"/>
             </a:xfrm>
-            <a:prstGeom prst="rect">
-              <a:avLst/>
-            </a:prstGeom>
-          </p:spPr>
-        </p:pic>
-        <p:cxnSp>
-          <p:nvCxnSpPr>
-            <p:cNvPr id="4" name="Straight Arrow Connector 3">
-              <a:extLst>
-                <a:ext uri="{FF2B5EF4-FFF2-40B4-BE49-F238E27FC236}">
-                  <a16:creationId xmlns:a16="http://schemas.microsoft.com/office/drawing/2014/main" id="{667A90A8-D8BC-4FBF-B032-9CA70E6E07DE}"/>
-                </a:ext>
-              </a:extLst>
-            </p:cNvPr>
-            <p:cNvCxnSpPr/>
-            <p:nvPr/>
-          </p:nvCxnSpPr>
-          <p:spPr>
-            <a:xfrm>
-              <a:off x="6277897" y="3962400"/>
-              <a:ext cx="1037303" cy="299884"/>
-            </a:xfrm>
-            <a:prstGeom prst="straightConnector1">
-              <a:avLst/>
-            </a:prstGeom>
-            <a:ln>
-              <a:solidFill>
-                <a:srgbClr val="00FF00"/>
-              </a:solidFill>
-              <a:tailEnd type="triangle"/>
-            </a:ln>
-          </p:spPr>
-          <p:style>
-            <a:lnRef idx="1">
-              <a:schemeClr val="accent1"/>
-            </a:lnRef>
-            <a:fillRef idx="0">
-              <a:schemeClr val="accent1"/>
-            </a:fillRef>
-            <a:effectRef idx="0">
-              <a:schemeClr val="accent1"/>
-            </a:effectRef>
-            <a:fontRef idx="minor">
-              <a:schemeClr val="tx1"/>
-            </a:fontRef>
-          </p:style>
-        </p:cxnSp>
-        <p:cxnSp>
-          <p:nvCxnSpPr>
-            <p:cNvPr id="6" name="Straight Arrow Connector 5">
-              <a:extLst>
-                <a:ext uri="{FF2B5EF4-FFF2-40B4-BE49-F238E27FC236}">
-                  <a16:creationId xmlns:a16="http://schemas.microsoft.com/office/drawing/2014/main" id="{DFDACA7B-37A5-494F-B1D2-5E4DD5CFEBB0}"/>
-                </a:ext>
-              </a:extLst>
-            </p:cNvPr>
-            <p:cNvCxnSpPr>
-              <a:cxnSpLocks/>
-            </p:cNvCxnSpPr>
-            <p:nvPr/>
-          </p:nvCxnSpPr>
-          <p:spPr>
-            <a:xfrm flipV="1">
-              <a:off x="6282813" y="3687097"/>
-              <a:ext cx="983226" cy="270387"/>
-            </a:xfrm>
-            <a:prstGeom prst="straightConnector1">
-              <a:avLst/>
-            </a:prstGeom>
-            <a:ln>
-              <a:solidFill>
-                <a:srgbClr val="0000FF"/>
-              </a:solidFill>
-              <a:tailEnd type="triangle"/>
-            </a:ln>
-          </p:spPr>
-          <p:style>
-            <a:lnRef idx="1">
-              <a:schemeClr val="accent1"/>
-            </a:lnRef>
-            <a:fillRef idx="0">
-              <a:schemeClr val="accent1"/>
-            </a:fillRef>
-            <a:effectRef idx="0">
-              <a:schemeClr val="accent1"/>
-            </a:effectRef>
-            <a:fontRef idx="minor">
-              <a:schemeClr val="tx1"/>
-            </a:fontRef>
-          </p:style>
-        </p:cxnSp>
-        <p:cxnSp>
-          <p:nvCxnSpPr>
-            <p:cNvPr id="13" name="Straight Arrow Connector 12">
-              <a:extLst>
-                <a:ext uri="{FF2B5EF4-FFF2-40B4-BE49-F238E27FC236}">
-                  <a16:creationId xmlns:a16="http://schemas.microsoft.com/office/drawing/2014/main" id="{6B1C927C-D3D6-4874-A0C1-82D02663C532}"/>
-                </a:ext>
-              </a:extLst>
-            </p:cNvPr>
-            <p:cNvCxnSpPr/>
-            <p:nvPr/>
-          </p:nvCxnSpPr>
-          <p:spPr>
-            <a:xfrm flipV="1">
-              <a:off x="6277897" y="2979174"/>
-              <a:ext cx="0" cy="983226"/>
-            </a:xfrm>
-            <a:prstGeom prst="straightConnector1">
-              <a:avLst/>
-            </a:prstGeom>
-            <a:ln>
-              <a:solidFill>
-                <a:srgbClr val="FF0000"/>
-              </a:solidFill>
-              <a:tailEnd type="triangle"/>
-            </a:ln>
-          </p:spPr>
-          <p:style>
-            <a:lnRef idx="1">
-              <a:schemeClr val="accent1"/>
-            </a:lnRef>
-            <a:fillRef idx="0">
-              <a:schemeClr val="accent1"/>
-            </a:fillRef>
-            <a:effectRef idx="0">
-              <a:schemeClr val="accent1"/>
-            </a:effectRef>
-            <a:fontRef idx="minor">
-              <a:schemeClr val="tx1"/>
-            </a:fontRef>
-          </p:style>
-        </p:cxnSp>
+          </p:grpSpPr>
+          <p:cxnSp>
+            <p:nvCxnSpPr>
+              <p:cNvPr id="4" name="Straight Arrow Connector 3">
+                <a:extLst>
+                  <a:ext uri="{FF2B5EF4-FFF2-40B4-BE49-F238E27FC236}">
+                    <a16:creationId xmlns:a16="http://schemas.microsoft.com/office/drawing/2014/main" id="{667A90A8-D8BC-4FBF-B032-9CA70E6E07DE}"/>
+                  </a:ext>
+                </a:extLst>
+              </p:cNvPr>
+              <p:cNvCxnSpPr/>
+              <p:nvPr/>
+            </p:nvCxnSpPr>
+            <p:spPr>
+              <a:xfrm>
+                <a:off x="6277897" y="3962400"/>
+                <a:ext cx="1037303" cy="299884"/>
+              </a:xfrm>
+              <a:prstGeom prst="straightConnector1">
+                <a:avLst/>
+              </a:prstGeom>
+              <a:ln w="15875">
+                <a:solidFill>
+                  <a:srgbClr val="00FF00"/>
+                </a:solidFill>
+                <a:tailEnd type="triangle"/>
+              </a:ln>
+            </p:spPr>
+            <p:style>
+              <a:lnRef idx="1">
+                <a:schemeClr val="accent1"/>
+              </a:lnRef>
+              <a:fillRef idx="0">
+                <a:schemeClr val="accent1"/>
+              </a:fillRef>
+              <a:effectRef idx="0">
+                <a:schemeClr val="accent1"/>
+              </a:effectRef>
+              <a:fontRef idx="minor">
+                <a:schemeClr val="tx1"/>
+              </a:fontRef>
+            </p:style>
+          </p:cxnSp>
+          <p:cxnSp>
+            <p:nvCxnSpPr>
+              <p:cNvPr id="6" name="Straight Arrow Connector 5">
+                <a:extLst>
+                  <a:ext uri="{FF2B5EF4-FFF2-40B4-BE49-F238E27FC236}">
+                    <a16:creationId xmlns:a16="http://schemas.microsoft.com/office/drawing/2014/main" id="{DFDACA7B-37A5-494F-B1D2-5E4DD5CFEBB0}"/>
+                  </a:ext>
+                </a:extLst>
+              </p:cNvPr>
+              <p:cNvCxnSpPr>
+                <a:cxnSpLocks/>
+              </p:cNvCxnSpPr>
+              <p:nvPr/>
+            </p:nvCxnSpPr>
+            <p:spPr>
+              <a:xfrm flipV="1">
+                <a:off x="6282813" y="3687097"/>
+                <a:ext cx="983226" cy="270387"/>
+              </a:xfrm>
+              <a:prstGeom prst="straightConnector1">
+                <a:avLst/>
+              </a:prstGeom>
+              <a:ln w="15875">
+                <a:solidFill>
+                  <a:srgbClr val="0000FF"/>
+                </a:solidFill>
+                <a:tailEnd type="triangle"/>
+              </a:ln>
+            </p:spPr>
+            <p:style>
+              <a:lnRef idx="1">
+                <a:schemeClr val="accent1"/>
+              </a:lnRef>
+              <a:fillRef idx="0">
+                <a:schemeClr val="accent1"/>
+              </a:fillRef>
+              <a:effectRef idx="0">
+                <a:schemeClr val="accent1"/>
+              </a:effectRef>
+              <a:fontRef idx="minor">
+                <a:schemeClr val="tx1"/>
+              </a:fontRef>
+            </p:style>
+          </p:cxnSp>
+          <p:cxnSp>
+            <p:nvCxnSpPr>
+              <p:cNvPr id="13" name="Straight Arrow Connector 12">
+                <a:extLst>
+                  <a:ext uri="{FF2B5EF4-FFF2-40B4-BE49-F238E27FC236}">
+                    <a16:creationId xmlns:a16="http://schemas.microsoft.com/office/drawing/2014/main" id="{6B1C927C-D3D6-4874-A0C1-82D02663C532}"/>
+                  </a:ext>
+                </a:extLst>
+              </p:cNvPr>
+              <p:cNvCxnSpPr/>
+              <p:nvPr/>
+            </p:nvCxnSpPr>
+            <p:spPr>
+              <a:xfrm flipV="1">
+                <a:off x="6277897" y="2979174"/>
+                <a:ext cx="0" cy="983226"/>
+              </a:xfrm>
+              <a:prstGeom prst="straightConnector1">
+                <a:avLst/>
+              </a:prstGeom>
+              <a:ln w="15875">
+                <a:solidFill>
+                  <a:srgbClr val="FF0000"/>
+                </a:solidFill>
+                <a:headEnd type="oval" w="lg" len="lg"/>
+                <a:tailEnd type="triangle"/>
+              </a:ln>
+            </p:spPr>
+            <p:style>
+              <a:lnRef idx="1">
+                <a:schemeClr val="accent1"/>
+              </a:lnRef>
+              <a:fillRef idx="0">
+                <a:schemeClr val="accent1"/>
+              </a:fillRef>
+              <a:effectRef idx="0">
+                <a:schemeClr val="accent1"/>
+              </a:effectRef>
+              <a:fontRef idx="minor">
+                <a:schemeClr val="tx1"/>
+              </a:fontRef>
+            </p:style>
+          </p:cxnSp>
+        </p:grpSp>
+        <mc:AlternateContent xmlns:mc="http://schemas.openxmlformats.org/markup-compatibility/2006">
+          <mc:Choice xmlns:a14="http://schemas.microsoft.com/office/drawing/2010/main" Requires="a14">
+            <p:sp>
+              <p:nvSpPr>
+                <p:cNvPr id="18" name="TextBox 17">
+                  <a:extLst>
+                    <a:ext uri="{FF2B5EF4-FFF2-40B4-BE49-F238E27FC236}">
+                      <a16:creationId xmlns:a16="http://schemas.microsoft.com/office/drawing/2014/main" id="{586AF218-7282-49DC-8B5E-B1C8459D1C9F}"/>
+                    </a:ext>
+                  </a:extLst>
+                </p:cNvPr>
+                <p:cNvSpPr txBox="1"/>
+                <p:nvPr/>
+              </p:nvSpPr>
+              <p:spPr>
+                <a:xfrm>
+                  <a:off x="6848231" y="4279063"/>
+                  <a:ext cx="473784" cy="369332"/>
+                </a:xfrm>
+                <a:prstGeom prst="rect">
+                  <a:avLst/>
+                </a:prstGeom>
+                <a:noFill/>
+              </p:spPr>
+              <p:txBody>
+                <a:bodyPr wrap="none" rtlCol="0">
+                  <a:spAutoFit/>
+                </a:bodyPr>
+                <a:lstStyle/>
+                <a:p>
+                  <a:pPr/>
+                  <a14:m>
+                    <m:oMathPara xmlns:m="http://schemas.openxmlformats.org/officeDocument/2006/math">
+                      <m:oMathParaPr>
+                        <m:jc m:val="centerGroup"/>
+                      </m:oMathParaPr>
+                      <m:oMath xmlns:m="http://schemas.openxmlformats.org/officeDocument/2006/math">
+                        <m:sSub>
+                          <m:sSubPr>
+                            <m:ctrlPr>
+                              <a:rPr lang="en-US" b="0" i="1" smtClean="0">
+                                <a:solidFill>
+                                  <a:schemeClr val="tx1"/>
+                                </a:solidFill>
+                                <a:latin typeface="Cambria Math" panose="02040503050406030204" pitchFamily="18" charset="0"/>
+                              </a:rPr>
+                            </m:ctrlPr>
+                          </m:sSubPr>
+                          <m:e>
+                            <m:r>
+                              <a:rPr lang="en-US" b="0" i="1" smtClean="0">
+                                <a:solidFill>
+                                  <a:schemeClr val="tx1"/>
+                                </a:solidFill>
+                                <a:latin typeface="Cambria Math" panose="02040503050406030204" pitchFamily="18" charset="0"/>
+                              </a:rPr>
+                              <m:t>𝑥</m:t>
+                            </m:r>
+                          </m:e>
+                          <m:sub>
+                            <m:r>
+                              <a:rPr lang="en-US" b="0" i="1" smtClean="0">
+                                <a:solidFill>
+                                  <a:schemeClr val="tx1"/>
+                                </a:solidFill>
+                                <a:latin typeface="Cambria Math" panose="02040503050406030204" pitchFamily="18" charset="0"/>
+                              </a:rPr>
+                              <m:t>𝑏</m:t>
+                            </m:r>
+                          </m:sub>
+                        </m:sSub>
+                      </m:oMath>
+                    </m:oMathPara>
+                  </a14:m>
+                  <a:endParaRPr lang="en-US" dirty="0">
+                    <a:solidFill>
+                      <a:schemeClr val="tx1"/>
+                    </a:solidFill>
+                  </a:endParaRPr>
+                </a:p>
+              </p:txBody>
+            </p:sp>
+          </mc:Choice>
+          <mc:Fallback>
+            <p:sp>
+              <p:nvSpPr>
+                <p:cNvPr id="18" name="TextBox 17">
+                  <a:extLst>
+                    <a:ext uri="{FF2B5EF4-FFF2-40B4-BE49-F238E27FC236}">
+                      <a16:creationId xmlns:a16="http://schemas.microsoft.com/office/drawing/2014/main" id="{586AF218-7282-49DC-8B5E-B1C8459D1C9F}"/>
+                    </a:ext>
+                  </a:extLst>
+                </p:cNvPr>
+                <p:cNvSpPr txBox="1">
+                  <a:spLocks noRot="1" noChangeAspect="1" noMove="1" noResize="1" noEditPoints="1" noAdjustHandles="1" noChangeArrowheads="1" noChangeShapeType="1" noTextEdit="1"/>
+                </p:cNvSpPr>
+                <p:nvPr/>
+              </p:nvSpPr>
+              <p:spPr>
+                <a:xfrm>
+                  <a:off x="6848231" y="4279063"/>
+                  <a:ext cx="473784" cy="369332"/>
+                </a:xfrm>
+                <a:prstGeom prst="rect">
+                  <a:avLst/>
+                </a:prstGeom>
+                <a:blipFill>
+                  <a:blip r:embed="rId6"/>
+                  <a:stretch>
+                    <a:fillRect/>
+                  </a:stretch>
+                </a:blipFill>
+              </p:spPr>
+              <p:txBody>
+                <a:bodyPr/>
+                <a:lstStyle/>
+                <a:p>
+                  <a:r>
+                    <a:rPr lang="en-US">
+                      <a:noFill/>
+                    </a:rPr>
+                    <a:t> </a:t>
+                  </a:r>
+                </a:p>
+              </p:txBody>
+            </p:sp>
+          </mc:Fallback>
+        </mc:AlternateContent>
+        <mc:AlternateContent xmlns:mc="http://schemas.openxmlformats.org/markup-compatibility/2006">
+          <mc:Choice xmlns:a14="http://schemas.microsoft.com/office/drawing/2010/main" Requires="a14">
+            <p:sp>
+              <p:nvSpPr>
+                <p:cNvPr id="20" name="TextBox 19">
+                  <a:extLst>
+                    <a:ext uri="{FF2B5EF4-FFF2-40B4-BE49-F238E27FC236}">
+                      <a16:creationId xmlns:a16="http://schemas.microsoft.com/office/drawing/2014/main" id="{990FF088-E7A5-42CA-94A4-94ACF02814C6}"/>
+                    </a:ext>
+                  </a:extLst>
+                </p:cNvPr>
+                <p:cNvSpPr txBox="1"/>
+                <p:nvPr/>
+              </p:nvSpPr>
+              <p:spPr>
+                <a:xfrm>
+                  <a:off x="7025347" y="3605307"/>
+                  <a:ext cx="475450" cy="369332"/>
+                </a:xfrm>
+                <a:prstGeom prst="rect">
+                  <a:avLst/>
+                </a:prstGeom>
+                <a:noFill/>
+              </p:spPr>
+              <p:txBody>
+                <a:bodyPr wrap="none" rtlCol="0">
+                  <a:spAutoFit/>
+                </a:bodyPr>
+                <a:lstStyle/>
+                <a:p>
+                  <a:pPr/>
+                  <a14:m>
+                    <m:oMathPara xmlns:m="http://schemas.openxmlformats.org/officeDocument/2006/math">
+                      <m:oMathParaPr>
+                        <m:jc m:val="centerGroup"/>
+                      </m:oMathParaPr>
+                      <m:oMath xmlns:m="http://schemas.openxmlformats.org/officeDocument/2006/math">
+                        <m:sSub>
+                          <m:sSubPr>
+                            <m:ctrlPr>
+                              <a:rPr lang="en-US" b="0" i="1" smtClean="0">
+                                <a:latin typeface="Cambria Math" panose="02040503050406030204" pitchFamily="18" charset="0"/>
+                              </a:rPr>
+                            </m:ctrlPr>
+                          </m:sSubPr>
+                          <m:e>
+                            <m:r>
+                              <a:rPr lang="en-US" b="0" i="1" smtClean="0">
+                                <a:latin typeface="Cambria Math" panose="02040503050406030204" pitchFamily="18" charset="0"/>
+                              </a:rPr>
+                              <m:t>𝑦</m:t>
+                            </m:r>
+                          </m:e>
+                          <m:sub>
+                            <m:r>
+                              <a:rPr lang="en-US" b="0" i="1" smtClean="0">
+                                <a:latin typeface="Cambria Math" panose="02040503050406030204" pitchFamily="18" charset="0"/>
+                              </a:rPr>
+                              <m:t>𝑏</m:t>
+                            </m:r>
+                          </m:sub>
+                        </m:sSub>
+                      </m:oMath>
+                    </m:oMathPara>
+                  </a14:m>
+                  <a:endParaRPr lang="en-US" dirty="0"/>
+                </a:p>
+              </p:txBody>
+            </p:sp>
+          </mc:Choice>
+          <mc:Fallback>
+            <p:sp>
+              <p:nvSpPr>
+                <p:cNvPr id="20" name="TextBox 19">
+                  <a:extLst>
+                    <a:ext uri="{FF2B5EF4-FFF2-40B4-BE49-F238E27FC236}">
+                      <a16:creationId xmlns:a16="http://schemas.microsoft.com/office/drawing/2014/main" id="{990FF088-E7A5-42CA-94A4-94ACF02814C6}"/>
+                    </a:ext>
+                  </a:extLst>
+                </p:cNvPr>
+                <p:cNvSpPr txBox="1">
+                  <a:spLocks noRot="1" noChangeAspect="1" noMove="1" noResize="1" noEditPoints="1" noAdjustHandles="1" noChangeArrowheads="1" noChangeShapeType="1" noTextEdit="1"/>
+                </p:cNvSpPr>
+                <p:nvPr/>
+              </p:nvSpPr>
+              <p:spPr>
+                <a:xfrm>
+                  <a:off x="7025347" y="3605307"/>
+                  <a:ext cx="475450" cy="369332"/>
+                </a:xfrm>
+                <a:prstGeom prst="rect">
+                  <a:avLst/>
+                </a:prstGeom>
+                <a:blipFill>
+                  <a:blip r:embed="rId7"/>
+                  <a:stretch>
+                    <a:fillRect b="-6557"/>
+                  </a:stretch>
+                </a:blipFill>
+              </p:spPr>
+              <p:txBody>
+                <a:bodyPr/>
+                <a:lstStyle/>
+                <a:p>
+                  <a:r>
+                    <a:rPr lang="en-US">
+                      <a:noFill/>
+                    </a:rPr>
+                    <a:t> </a:t>
+                  </a:r>
+                </a:p>
+              </p:txBody>
+            </p:sp>
+          </mc:Fallback>
+        </mc:AlternateContent>
+        <mc:AlternateContent xmlns:mc="http://schemas.openxmlformats.org/markup-compatibility/2006">
+          <mc:Choice xmlns:a14="http://schemas.microsoft.com/office/drawing/2010/main" Requires="a14">
+            <p:sp>
+              <p:nvSpPr>
+                <p:cNvPr id="21" name="TextBox 20">
+                  <a:extLst>
+                    <a:ext uri="{FF2B5EF4-FFF2-40B4-BE49-F238E27FC236}">
+                      <a16:creationId xmlns:a16="http://schemas.microsoft.com/office/drawing/2014/main" id="{C5276761-CE45-4F01-8602-D0FB640F6F7D}"/>
+                    </a:ext>
+                  </a:extLst>
+                </p:cNvPr>
+                <p:cNvSpPr txBox="1"/>
+                <p:nvPr/>
+              </p:nvSpPr>
+              <p:spPr>
+                <a:xfrm>
+                  <a:off x="5914104" y="2764308"/>
+                  <a:ext cx="459165" cy="369332"/>
+                </a:xfrm>
+                <a:prstGeom prst="rect">
+                  <a:avLst/>
+                </a:prstGeom>
+                <a:noFill/>
+              </p:spPr>
+              <p:txBody>
+                <a:bodyPr wrap="none" rtlCol="0">
+                  <a:spAutoFit/>
+                </a:bodyPr>
+                <a:lstStyle/>
+                <a:p>
+                  <a:pPr/>
+                  <a14:m>
+                    <m:oMathPara xmlns:m="http://schemas.openxmlformats.org/officeDocument/2006/math">
+                      <m:oMathParaPr>
+                        <m:jc m:val="centerGroup"/>
+                      </m:oMathParaPr>
+                      <m:oMath xmlns:m="http://schemas.openxmlformats.org/officeDocument/2006/math">
+                        <m:sSub>
+                          <m:sSubPr>
+                            <m:ctrlPr>
+                              <a:rPr lang="en-US" b="0" i="1" smtClean="0">
+                                <a:latin typeface="Cambria Math" panose="02040503050406030204" pitchFamily="18" charset="0"/>
+                              </a:rPr>
+                            </m:ctrlPr>
+                          </m:sSubPr>
+                          <m:e>
+                            <m:r>
+                              <a:rPr lang="en-US" b="0" i="1" smtClean="0">
+                                <a:latin typeface="Cambria Math" panose="02040503050406030204" pitchFamily="18" charset="0"/>
+                              </a:rPr>
+                              <m:t>𝑧</m:t>
+                            </m:r>
+                          </m:e>
+                          <m:sub>
+                            <m:r>
+                              <a:rPr lang="en-US" b="0" i="1" smtClean="0">
+                                <a:latin typeface="Cambria Math" panose="02040503050406030204" pitchFamily="18" charset="0"/>
+                              </a:rPr>
+                              <m:t>𝑏</m:t>
+                            </m:r>
+                          </m:sub>
+                        </m:sSub>
+                      </m:oMath>
+                    </m:oMathPara>
+                  </a14:m>
+                  <a:endParaRPr lang="en-US" dirty="0"/>
+                </a:p>
+              </p:txBody>
+            </p:sp>
+          </mc:Choice>
+          <mc:Fallback>
+            <p:sp>
+              <p:nvSpPr>
+                <p:cNvPr id="21" name="TextBox 20">
+                  <a:extLst>
+                    <a:ext uri="{FF2B5EF4-FFF2-40B4-BE49-F238E27FC236}">
+                      <a16:creationId xmlns:a16="http://schemas.microsoft.com/office/drawing/2014/main" id="{C5276761-CE45-4F01-8602-D0FB640F6F7D}"/>
+                    </a:ext>
+                  </a:extLst>
+                </p:cNvPr>
+                <p:cNvSpPr txBox="1">
+                  <a:spLocks noRot="1" noChangeAspect="1" noMove="1" noResize="1" noEditPoints="1" noAdjustHandles="1" noChangeArrowheads="1" noChangeShapeType="1" noTextEdit="1"/>
+                </p:cNvSpPr>
+                <p:nvPr/>
+              </p:nvSpPr>
+              <p:spPr>
+                <a:xfrm>
+                  <a:off x="5914104" y="2764308"/>
+                  <a:ext cx="459165" cy="369332"/>
+                </a:xfrm>
+                <a:prstGeom prst="rect">
+                  <a:avLst/>
+                </a:prstGeom>
+                <a:blipFill>
+                  <a:blip r:embed="rId8"/>
+                  <a:stretch>
+                    <a:fillRect/>
+                  </a:stretch>
+                </a:blipFill>
+              </p:spPr>
+              <p:txBody>
+                <a:bodyPr/>
+                <a:lstStyle/>
+                <a:p>
+                  <a:r>
+                    <a:rPr lang="en-US">
+                      <a:noFill/>
+                    </a:rPr>
+                    <a:t> </a:t>
+                  </a:r>
+                </a:p>
+              </p:txBody>
+            </p:sp>
+          </mc:Fallback>
+        </mc:AlternateContent>
       </p:grpSp>
-      <mc:AlternateContent xmlns:mc="http://schemas.openxmlformats.org/markup-compatibility/2006" xmlns:a14="http://schemas.microsoft.com/office/drawing/2010/main">
-        <mc:Choice Requires="a14">
+      <mc:AlternateContent xmlns:mc="http://schemas.openxmlformats.org/markup-compatibility/2006">
+        <mc:Choice xmlns:a14="http://schemas.microsoft.com/office/drawing/2010/main" Requires="a14">
           <p:sp>
             <p:nvSpPr>
-              <p:cNvPr id="18" name="TextBox 17">
+              <p:cNvPr id="28" name="TextBox 27">
                 <a:extLst>
                   <a:ext uri="{FF2B5EF4-FFF2-40B4-BE49-F238E27FC236}">
-                    <a16:creationId xmlns:a16="http://schemas.microsoft.com/office/drawing/2014/main" id="{586AF218-7282-49DC-8B5E-B1C8459D1C9F}"/>
+                    <a16:creationId xmlns:a16="http://schemas.microsoft.com/office/drawing/2014/main" id="{84B086EA-8424-4FC5-A6FB-49B2C8924B51}"/>
                   </a:ext>
                 </a:extLst>
               </p:cNvPr>
@@ -4026,8 +4580,8 @@
             </p:nvSpPr>
             <p:spPr>
               <a:xfrm>
-                <a:off x="6857756" y="4279063"/>
-                <a:ext cx="473784" cy="369332"/>
+                <a:off x="9611732" y="5010420"/>
+                <a:ext cx="545149" cy="402931"/>
               </a:xfrm>
               <a:prstGeom prst="rect">
                 <a:avLst/>
@@ -4035,12 +4589,11 @@
               <a:noFill/>
             </p:spPr>
             <p:txBody>
-              <a:bodyPr wrap="none" rtlCol="0">
+              <a:bodyPr wrap="square" rtlCol="0">
                 <a:spAutoFit/>
               </a:bodyPr>
               <a:lstStyle/>
               <a:p>
-                <a:pPr/>
                 <a14:m>
                   <m:oMathPara xmlns:m="http://schemas.openxmlformats.org/officeDocument/2006/math">
                     <m:oMathParaPr>
@@ -4051,55 +4604,54 @@
                         <m:sSubPr>
                           <m:ctrlPr>
                             <a:rPr lang="en-US" b="0" i="1" smtClean="0">
-                              <a:solidFill>
-                                <a:schemeClr val="tx1"/>
-                              </a:solidFill>
                               <a:latin typeface="Cambria Math" panose="02040503050406030204" pitchFamily="18" charset="0"/>
                             </a:rPr>
                           </m:ctrlPr>
                         </m:sSubPr>
                         <m:e>
-                          <m:r>
-                            <a:rPr lang="en-US" b="0" i="1" smtClean="0">
-                              <a:solidFill>
-                                <a:schemeClr val="tx1"/>
-                              </a:solidFill>
-                              <a:latin typeface="Cambria Math" panose="02040503050406030204" pitchFamily="18" charset="0"/>
-                            </a:rPr>
-                            <m:t>𝑥</m:t>
-                          </m:r>
+                          <m:acc>
+                            <m:accPr>
+                              <m:chr m:val="⃗"/>
+                              <m:ctrlPr>
+                                <a:rPr lang="en-US" b="0" i="1" smtClean="0">
+                                  <a:latin typeface="Cambria Math" panose="02040503050406030204" pitchFamily="18" charset="0"/>
+                                </a:rPr>
+                              </m:ctrlPr>
+                            </m:accPr>
+                            <m:e>
+                              <m:r>
+                                <a:rPr lang="en-US" b="0" i="1" smtClean="0">
+                                  <a:latin typeface="Cambria Math" panose="02040503050406030204" pitchFamily="18" charset="0"/>
+                                </a:rPr>
+                                <m:t>𝐹</m:t>
+                              </m:r>
+                            </m:e>
+                          </m:acc>
                         </m:e>
                         <m:sub>
                           <m:r>
                             <a:rPr lang="en-US" b="0" i="1" smtClean="0">
-                              <a:solidFill>
-                                <a:schemeClr val="tx1"/>
-                              </a:solidFill>
                               <a:latin typeface="Cambria Math" panose="02040503050406030204" pitchFamily="18" charset="0"/>
                             </a:rPr>
-                            <m:t>𝑏</m:t>
+                            <m:t>𝑡h</m:t>
                           </m:r>
                         </m:sub>
                       </m:sSub>
                     </m:oMath>
                   </m:oMathPara>
                 </a14:m>
-                <a:endParaRPr lang="en-US" dirty="0">
-                  <a:solidFill>
-                    <a:schemeClr val="tx1"/>
-                  </a:solidFill>
-                </a:endParaRPr>
+                <a:endParaRPr lang="en-US" dirty="0"/>
               </a:p>
             </p:txBody>
           </p:sp>
         </mc:Choice>
-        <mc:Fallback xmlns="">
+        <mc:Fallback>
           <p:sp>
             <p:nvSpPr>
-              <p:cNvPr id="18" name="TextBox 17">
+              <p:cNvPr id="28" name="TextBox 27">
                 <a:extLst>
                   <a:ext uri="{FF2B5EF4-FFF2-40B4-BE49-F238E27FC236}">
-                    <a16:creationId xmlns:a16="http://schemas.microsoft.com/office/drawing/2014/main" id="{586AF218-7282-49DC-8B5E-B1C8459D1C9F}"/>
+                    <a16:creationId xmlns:a16="http://schemas.microsoft.com/office/drawing/2014/main" id="{84B086EA-8424-4FC5-A6FB-49B2C8924B51}"/>
                   </a:ext>
                 </a:extLst>
               </p:cNvPr>
@@ -4110,16 +4662,16 @@
             </p:nvSpPr>
             <p:spPr>
               <a:xfrm>
-                <a:off x="6857756" y="4279063"/>
-                <a:ext cx="473784" cy="369332"/>
+                <a:off x="9611732" y="5010420"/>
+                <a:ext cx="545149" cy="402931"/>
               </a:xfrm>
               <a:prstGeom prst="rect">
                 <a:avLst/>
               </a:prstGeom>
               <a:blipFill>
-                <a:blip r:embed="rId6"/>
+                <a:blip r:embed="rId9"/>
                 <a:stretch>
-                  <a:fillRect/>
+                  <a:fillRect t="-22727" r="-17978"/>
                 </a:stretch>
               </a:blipFill>
             </p:spPr>
@@ -4138,14 +4690,14 @@
           </p:sp>
         </mc:Fallback>
       </mc:AlternateContent>
-      <mc:AlternateContent xmlns:mc="http://schemas.openxmlformats.org/markup-compatibility/2006" xmlns:a14="http://schemas.microsoft.com/office/drawing/2010/main">
-        <mc:Choice Requires="a14">
+      <mc:AlternateContent xmlns:mc="http://schemas.openxmlformats.org/markup-compatibility/2006">
+        <mc:Choice xmlns:a14="http://schemas.microsoft.com/office/drawing/2010/main" Requires="a14">
           <p:sp>
             <p:nvSpPr>
-              <p:cNvPr id="20" name="TextBox 19">
+              <p:cNvPr id="29" name="TextBox 28">
                 <a:extLst>
                   <a:ext uri="{FF2B5EF4-FFF2-40B4-BE49-F238E27FC236}">
-                    <a16:creationId xmlns:a16="http://schemas.microsoft.com/office/drawing/2014/main" id="{990FF088-E7A5-42CA-94A4-94ACF02814C6}"/>
+                    <a16:creationId xmlns:a16="http://schemas.microsoft.com/office/drawing/2014/main" id="{4FACF4E5-DEDE-4EB9-A6F3-5627ECD1AA50}"/>
                   </a:ext>
                 </a:extLst>
               </p:cNvPr>
@@ -4154,8 +4706,8 @@
             </p:nvSpPr>
             <p:spPr>
               <a:xfrm>
-                <a:off x="7025347" y="3605307"/>
-                <a:ext cx="475450" cy="369332"/>
+                <a:off x="5802754" y="4860909"/>
+                <a:ext cx="545149" cy="431849"/>
               </a:xfrm>
               <a:prstGeom prst="rect">
                 <a:avLst/>
@@ -4163,12 +4715,11 @@
               <a:noFill/>
             </p:spPr>
             <p:txBody>
-              <a:bodyPr wrap="none" rtlCol="0">
+              <a:bodyPr wrap="square" rtlCol="0">
                 <a:spAutoFit/>
               </a:bodyPr>
               <a:lstStyle/>
               <a:p>
-                <a:pPr/>
                 <a14:m>
                   <m:oMathPara xmlns:m="http://schemas.openxmlformats.org/officeDocument/2006/math">
                     <m:oMathParaPr>
@@ -4184,19 +4735,31 @@
                           </m:ctrlPr>
                         </m:sSubPr>
                         <m:e>
-                          <m:r>
-                            <a:rPr lang="en-US" b="0" i="1" smtClean="0">
-                              <a:latin typeface="Cambria Math" panose="02040503050406030204" pitchFamily="18" charset="0"/>
-                            </a:rPr>
-                            <m:t>𝑦</m:t>
-                          </m:r>
+                          <m:acc>
+                            <m:accPr>
+                              <m:chr m:val="⃗"/>
+                              <m:ctrlPr>
+                                <a:rPr lang="en-US" b="0" i="1" smtClean="0">
+                                  <a:latin typeface="Cambria Math" panose="02040503050406030204" pitchFamily="18" charset="0"/>
+                                </a:rPr>
+                              </m:ctrlPr>
+                            </m:accPr>
+                            <m:e>
+                              <m:r>
+                                <a:rPr lang="en-US" b="0" i="1" smtClean="0">
+                                  <a:latin typeface="Cambria Math" panose="02040503050406030204" pitchFamily="18" charset="0"/>
+                                </a:rPr>
+                                <m:t>𝐹</m:t>
+                              </m:r>
+                            </m:e>
+                          </m:acc>
                         </m:e>
                         <m:sub>
                           <m:r>
                             <a:rPr lang="en-US" b="0" i="1" smtClean="0">
                               <a:latin typeface="Cambria Math" panose="02040503050406030204" pitchFamily="18" charset="0"/>
                             </a:rPr>
-                            <m:t>𝑏</m:t>
+                            <m:t>𝑔</m:t>
                           </m:r>
                         </m:sub>
                       </m:sSub>
@@ -4208,13 +4771,13 @@
             </p:txBody>
           </p:sp>
         </mc:Choice>
-        <mc:Fallback xmlns="">
+        <mc:Fallback>
           <p:sp>
             <p:nvSpPr>
-              <p:cNvPr id="20" name="TextBox 19">
+              <p:cNvPr id="29" name="TextBox 28">
                 <a:extLst>
                   <a:ext uri="{FF2B5EF4-FFF2-40B4-BE49-F238E27FC236}">
-                    <a16:creationId xmlns:a16="http://schemas.microsoft.com/office/drawing/2014/main" id="{990FF088-E7A5-42CA-94A4-94ACF02814C6}"/>
+                    <a16:creationId xmlns:a16="http://schemas.microsoft.com/office/drawing/2014/main" id="{4FACF4E5-DEDE-4EB9-A6F3-5627ECD1AA50}"/>
                   </a:ext>
                 </a:extLst>
               </p:cNvPr>
@@ -4225,16 +4788,16 @@
             </p:nvSpPr>
             <p:spPr>
               <a:xfrm>
-                <a:off x="7025347" y="3605307"/>
-                <a:ext cx="475450" cy="369332"/>
+                <a:off x="5802754" y="4860909"/>
+                <a:ext cx="545149" cy="431849"/>
               </a:xfrm>
               <a:prstGeom prst="rect">
                 <a:avLst/>
               </a:prstGeom>
               <a:blipFill>
-                <a:blip r:embed="rId7"/>
+                <a:blip r:embed="rId10"/>
                 <a:stretch>
-                  <a:fillRect b="-6557"/>
+                  <a:fillRect t="-19718" r="-26966" b="-4225"/>
                 </a:stretch>
               </a:blipFill>
             </p:spPr>
@@ -4253,14 +4816,14 @@
           </p:sp>
         </mc:Fallback>
       </mc:AlternateContent>
-      <mc:AlternateContent xmlns:mc="http://schemas.openxmlformats.org/markup-compatibility/2006" xmlns:a14="http://schemas.microsoft.com/office/drawing/2010/main">
-        <mc:Choice Requires="a14">
+      <mc:AlternateContent xmlns:mc="http://schemas.openxmlformats.org/markup-compatibility/2006">
+        <mc:Choice xmlns:a14="http://schemas.microsoft.com/office/drawing/2010/main" Requires="a14">
           <p:sp>
             <p:nvSpPr>
-              <p:cNvPr id="21" name="TextBox 20">
+              <p:cNvPr id="30" name="TextBox 29">
                 <a:extLst>
                   <a:ext uri="{FF2B5EF4-FFF2-40B4-BE49-F238E27FC236}">
-                    <a16:creationId xmlns:a16="http://schemas.microsoft.com/office/drawing/2014/main" id="{C5276761-CE45-4F01-8602-D0FB640F6F7D}"/>
+                    <a16:creationId xmlns:a16="http://schemas.microsoft.com/office/drawing/2014/main" id="{D84A6ED8-63C4-47BD-A087-D22F7FF43520}"/>
                   </a:ext>
                 </a:extLst>
               </p:cNvPr>
@@ -4269,8 +4832,8 @@
             </p:nvSpPr>
             <p:spPr>
               <a:xfrm>
-                <a:off x="5914104" y="2764308"/>
-                <a:ext cx="459165" cy="369332"/>
+                <a:off x="7836372" y="3887355"/>
+                <a:ext cx="545149" cy="402931"/>
               </a:xfrm>
               <a:prstGeom prst="rect">
                 <a:avLst/>
@@ -4278,12 +4841,11 @@
               <a:noFill/>
             </p:spPr>
             <p:txBody>
-              <a:bodyPr wrap="none" rtlCol="0">
+              <a:bodyPr wrap="square" rtlCol="0">
                 <a:spAutoFit/>
               </a:bodyPr>
               <a:lstStyle/>
               <a:p>
-                <a:pPr/>
                 <a14:m>
                   <m:oMathPara xmlns:m="http://schemas.openxmlformats.org/officeDocument/2006/math">
                     <m:oMathParaPr>
@@ -4299,19 +4861,31 @@
                           </m:ctrlPr>
                         </m:sSubPr>
                         <m:e>
-                          <m:r>
-                            <a:rPr lang="en-US" b="0" i="1" smtClean="0">
-                              <a:latin typeface="Cambria Math" panose="02040503050406030204" pitchFamily="18" charset="0"/>
-                            </a:rPr>
-                            <m:t>𝑧</m:t>
-                          </m:r>
+                          <m:acc>
+                            <m:accPr>
+                              <m:chr m:val="⃗"/>
+                              <m:ctrlPr>
+                                <a:rPr lang="en-US" b="0" i="1" smtClean="0">
+                                  <a:latin typeface="Cambria Math" panose="02040503050406030204" pitchFamily="18" charset="0"/>
+                                </a:rPr>
+                              </m:ctrlPr>
+                            </m:accPr>
+                            <m:e>
+                              <m:r>
+                                <a:rPr lang="en-US" b="0" i="1" smtClean="0">
+                                  <a:latin typeface="Cambria Math" panose="02040503050406030204" pitchFamily="18" charset="0"/>
+                                </a:rPr>
+                                <m:t>𝐹</m:t>
+                              </m:r>
+                            </m:e>
+                          </m:acc>
                         </m:e>
                         <m:sub>
                           <m:r>
                             <a:rPr lang="en-US" b="0" i="1" smtClean="0">
                               <a:latin typeface="Cambria Math" panose="02040503050406030204" pitchFamily="18" charset="0"/>
                             </a:rPr>
-                            <m:t>𝑏</m:t>
+                            <m:t>𝑎</m:t>
                           </m:r>
                         </m:sub>
                       </m:sSub>
@@ -4323,13 +4897,13 @@
             </p:txBody>
           </p:sp>
         </mc:Choice>
-        <mc:Fallback xmlns="">
+        <mc:Fallback>
           <p:sp>
             <p:nvSpPr>
-              <p:cNvPr id="21" name="TextBox 20">
+              <p:cNvPr id="30" name="TextBox 29">
                 <a:extLst>
                   <a:ext uri="{FF2B5EF4-FFF2-40B4-BE49-F238E27FC236}">
-                    <a16:creationId xmlns:a16="http://schemas.microsoft.com/office/drawing/2014/main" id="{C5276761-CE45-4F01-8602-D0FB640F6F7D}"/>
+                    <a16:creationId xmlns:a16="http://schemas.microsoft.com/office/drawing/2014/main" id="{D84A6ED8-63C4-47BD-A087-D22F7FF43520}"/>
                   </a:ext>
                 </a:extLst>
               </p:cNvPr>
@@ -4340,16 +4914,16 @@
             </p:nvSpPr>
             <p:spPr>
               <a:xfrm>
-                <a:off x="5914104" y="2764308"/>
-                <a:ext cx="459165" cy="369332"/>
+                <a:off x="7836372" y="3887355"/>
+                <a:ext cx="545149" cy="402931"/>
               </a:xfrm>
               <a:prstGeom prst="rect">
                 <a:avLst/>
               </a:prstGeom>
               <a:blipFill>
-                <a:blip r:embed="rId8"/>
+                <a:blip r:embed="rId11"/>
                 <a:stretch>
-                  <a:fillRect/>
+                  <a:fillRect t="-22727" r="-25556"/>
                 </a:stretch>
               </a:blipFill>
             </p:spPr>
@@ -5098,8 +5672,8 @@
             </p:style>
           </p:cxnSp>
         </p:grpSp>
-        <mc:AlternateContent xmlns:mc="http://schemas.openxmlformats.org/markup-compatibility/2006">
-          <mc:Choice xmlns:a14="http://schemas.microsoft.com/office/drawing/2010/main" Requires="a14">
+        <mc:AlternateContent xmlns:mc="http://schemas.openxmlformats.org/markup-compatibility/2006" xmlns:a14="http://schemas.microsoft.com/office/drawing/2010/main">
+          <mc:Choice Requires="a14">
             <p:sp>
               <p:nvSpPr>
                 <p:cNvPr id="18" name="TextBox 17">
@@ -5181,7 +5755,7 @@
               </p:txBody>
             </p:sp>
           </mc:Choice>
-          <mc:Fallback>
+          <mc:Fallback xmlns="">
             <p:sp>
               <p:nvSpPr>
                 <p:cNvPr id="18" name="TextBox 17">
@@ -5226,8 +5800,8 @@
             </p:sp>
           </mc:Fallback>
         </mc:AlternateContent>
-        <mc:AlternateContent xmlns:mc="http://schemas.openxmlformats.org/markup-compatibility/2006">
-          <mc:Choice xmlns:a14="http://schemas.microsoft.com/office/drawing/2010/main" Requires="a14">
+        <mc:AlternateContent xmlns:mc="http://schemas.openxmlformats.org/markup-compatibility/2006" xmlns:a14="http://schemas.microsoft.com/office/drawing/2010/main">
+          <mc:Choice Requires="a14">
             <p:sp>
               <p:nvSpPr>
                 <p:cNvPr id="20" name="TextBox 19">
@@ -5296,7 +5870,7 @@
               </p:txBody>
             </p:sp>
           </mc:Choice>
-          <mc:Fallback>
+          <mc:Fallback xmlns="">
             <p:sp>
               <p:nvSpPr>
                 <p:cNvPr id="20" name="TextBox 19">
@@ -5341,8 +5915,8 @@
             </p:sp>
           </mc:Fallback>
         </mc:AlternateContent>
-        <mc:AlternateContent xmlns:mc="http://schemas.openxmlformats.org/markup-compatibility/2006">
-          <mc:Choice xmlns:a14="http://schemas.microsoft.com/office/drawing/2010/main" Requires="a14">
+        <mc:AlternateContent xmlns:mc="http://schemas.openxmlformats.org/markup-compatibility/2006" xmlns:a14="http://schemas.microsoft.com/office/drawing/2010/main">
+          <mc:Choice Requires="a14">
             <p:sp>
               <p:nvSpPr>
                 <p:cNvPr id="21" name="TextBox 20">
@@ -5411,7 +5985,7 @@
               </p:txBody>
             </p:sp>
           </mc:Choice>
-          <mc:Fallback>
+          <mc:Fallback xmlns="">
             <p:sp>
               <p:nvSpPr>
                 <p:cNvPr id="21" name="TextBox 20">
@@ -5638,8 +6212,8 @@
             </a:p>
           </p:txBody>
         </p:sp>
-        <mc:AlternateContent xmlns:mc="http://schemas.openxmlformats.org/markup-compatibility/2006">
-          <mc:Choice xmlns:a14="http://schemas.microsoft.com/office/drawing/2010/main" Requires="a14">
+        <mc:AlternateContent xmlns:mc="http://schemas.openxmlformats.org/markup-compatibility/2006" xmlns:a14="http://schemas.microsoft.com/office/drawing/2010/main">
+          <mc:Choice Requires="a14">
             <p:sp>
               <p:nvSpPr>
                 <p:cNvPr id="26" name="TextBox 25">
@@ -5689,7 +6263,7 @@
               </p:txBody>
             </p:sp>
           </mc:Choice>
-          <mc:Fallback>
+          <mc:Fallback xmlns="">
             <p:sp>
               <p:nvSpPr>
                 <p:cNvPr id="26" name="TextBox 25">
@@ -6038,8 +6612,8 @@
               </p:style>
             </p:cxnSp>
           </p:grpSp>
-          <mc:AlternateContent xmlns:mc="http://schemas.openxmlformats.org/markup-compatibility/2006">
-            <mc:Choice xmlns:a14="http://schemas.microsoft.com/office/drawing/2010/main" Requires="a14">
+          <mc:AlternateContent xmlns:mc="http://schemas.openxmlformats.org/markup-compatibility/2006" xmlns:a14="http://schemas.microsoft.com/office/drawing/2010/main">
+            <mc:Choice Requires="a14">
               <p:sp>
                 <p:nvSpPr>
                   <p:cNvPr id="47" name="TextBox 46">
@@ -6068,6 +6642,7 @@
                   </a:bodyPr>
                   <a:lstStyle/>
                   <a:p>
+                    <a:pPr/>
                     <a14:m>
                       <m:oMathPara xmlns:m="http://schemas.openxmlformats.org/officeDocument/2006/math">
                         <m:oMathParaPr>
@@ -6107,7 +6682,7 @@
                 </p:txBody>
               </p:sp>
             </mc:Choice>
-            <mc:Fallback>
+            <mc:Fallback xmlns="">
               <p:sp>
                 <p:nvSpPr>
                   <p:cNvPr id="47" name="TextBox 46">
@@ -6436,8 +7011,8 @@
               </p:style>
             </p:cxnSp>
           </p:grpSp>
-          <mc:AlternateContent xmlns:mc="http://schemas.openxmlformats.org/markup-compatibility/2006">
-            <mc:Choice xmlns:a14="http://schemas.microsoft.com/office/drawing/2010/main" Requires="a14">
+          <mc:AlternateContent xmlns:mc="http://schemas.openxmlformats.org/markup-compatibility/2006" xmlns:a14="http://schemas.microsoft.com/office/drawing/2010/main">
+            <mc:Choice Requires="a14">
               <p:sp>
                 <p:nvSpPr>
                   <p:cNvPr id="48" name="TextBox 47">
@@ -6466,6 +7041,7 @@
                   </a:bodyPr>
                   <a:lstStyle/>
                   <a:p>
+                    <a:pPr/>
                     <a14:m>
                       <m:oMathPara xmlns:m="http://schemas.openxmlformats.org/officeDocument/2006/math">
                         <m:oMathParaPr>
@@ -6505,7 +7081,7 @@
                 </p:txBody>
               </p:sp>
             </mc:Choice>
-            <mc:Fallback>
+            <mc:Fallback xmlns="">
               <p:sp>
                 <p:nvSpPr>
                   <p:cNvPr id="48" name="TextBox 47">
@@ -6552,8 +7128,8 @@
           </mc:AlternateContent>
         </p:grpSp>
       </p:grpSp>
-      <mc:AlternateContent xmlns:mc="http://schemas.openxmlformats.org/markup-compatibility/2006">
-        <mc:Choice xmlns:a14="http://schemas.microsoft.com/office/drawing/2010/main" Requires="a14">
+      <mc:AlternateContent xmlns:mc="http://schemas.openxmlformats.org/markup-compatibility/2006" xmlns:a14="http://schemas.microsoft.com/office/drawing/2010/main">
+        <mc:Choice Requires="a14">
           <p:sp>
             <p:nvSpPr>
               <p:cNvPr id="52" name="TextBox 51">
@@ -6582,6 +7158,7 @@
               </a:bodyPr>
               <a:lstStyle/>
               <a:p>
+                <a:pPr/>
                 <a14:m>
                   <m:oMathPara xmlns:m="http://schemas.openxmlformats.org/officeDocument/2006/math">
                     <m:oMathParaPr>
@@ -6633,7 +7210,7 @@
             </p:txBody>
           </p:sp>
         </mc:Choice>
-        <mc:Fallback>
+        <mc:Fallback xmlns="">
           <p:sp>
             <p:nvSpPr>
               <p:cNvPr id="52" name="TextBox 51">
@@ -6698,8 +7275,8 @@
             <a:chExt cx="2653353" cy="1714799"/>
           </a:xfrm>
         </p:grpSpPr>
-        <mc:AlternateContent xmlns:mc="http://schemas.openxmlformats.org/markup-compatibility/2006">
-          <mc:Choice xmlns:a14="http://schemas.microsoft.com/office/drawing/2010/main" Requires="a14">
+        <mc:AlternateContent xmlns:mc="http://schemas.openxmlformats.org/markup-compatibility/2006" xmlns:a14="http://schemas.microsoft.com/office/drawing/2010/main">
+          <mc:Choice Requires="a14">
             <p:sp>
               <p:nvSpPr>
                 <p:cNvPr id="54" name="TextBox 53">
@@ -6728,6 +7305,7 @@
                 </a:bodyPr>
                 <a:lstStyle/>
                 <a:p>
+                  <a:pPr/>
                   <a14:m>
                     <m:oMathPara xmlns:m="http://schemas.openxmlformats.org/officeDocument/2006/math">
                       <m:oMathParaPr>
@@ -6767,7 +7345,7 @@
               </p:txBody>
             </p:sp>
           </mc:Choice>
-          <mc:Fallback>
+          <mc:Fallback xmlns="">
             <p:sp>
               <p:nvSpPr>
                 <p:cNvPr id="54" name="TextBox 53">
@@ -6940,8 +7518,8 @@
             </a:fontRef>
           </p:style>
         </p:cxnSp>
-        <mc:AlternateContent xmlns:mc="http://schemas.openxmlformats.org/markup-compatibility/2006">
-          <mc:Choice xmlns:a14="http://schemas.microsoft.com/office/drawing/2010/main" Requires="a14">
+        <mc:AlternateContent xmlns:mc="http://schemas.openxmlformats.org/markup-compatibility/2006" xmlns:a14="http://schemas.microsoft.com/office/drawing/2010/main">
+          <mc:Choice Requires="a14">
             <p:sp>
               <p:nvSpPr>
                 <p:cNvPr id="58" name="TextBox 57">
@@ -7023,7 +7601,7 @@
               </p:txBody>
             </p:sp>
           </mc:Choice>
-          <mc:Fallback>
+          <mc:Fallback xmlns="">
             <p:sp>
               <p:nvSpPr>
                 <p:cNvPr id="58" name="TextBox 57">
@@ -7068,8 +7646,8 @@
             </p:sp>
           </mc:Fallback>
         </mc:AlternateContent>
-        <mc:AlternateContent xmlns:mc="http://schemas.openxmlformats.org/markup-compatibility/2006">
-          <mc:Choice xmlns:a14="http://schemas.microsoft.com/office/drawing/2010/main" Requires="a14">
+        <mc:AlternateContent xmlns:mc="http://schemas.openxmlformats.org/markup-compatibility/2006" xmlns:a14="http://schemas.microsoft.com/office/drawing/2010/main">
+          <mc:Choice Requires="a14">
             <p:sp>
               <p:nvSpPr>
                 <p:cNvPr id="59" name="TextBox 58">
@@ -7138,7 +7716,7 @@
               </p:txBody>
             </p:sp>
           </mc:Choice>
-          <mc:Fallback>
+          <mc:Fallback xmlns="">
             <p:sp>
               <p:nvSpPr>
                 <p:cNvPr id="59" name="TextBox 58">
@@ -7183,8 +7761,8 @@
             </p:sp>
           </mc:Fallback>
         </mc:AlternateContent>
-        <mc:AlternateContent xmlns:mc="http://schemas.openxmlformats.org/markup-compatibility/2006">
-          <mc:Choice xmlns:a14="http://schemas.microsoft.com/office/drawing/2010/main" Requires="a14">
+        <mc:AlternateContent xmlns:mc="http://schemas.openxmlformats.org/markup-compatibility/2006" xmlns:a14="http://schemas.microsoft.com/office/drawing/2010/main">
+          <mc:Choice Requires="a14">
             <p:sp>
               <p:nvSpPr>
                 <p:cNvPr id="60" name="TextBox 59">
@@ -7253,7 +7831,7 @@
               </p:txBody>
             </p:sp>
           </mc:Choice>
-          <mc:Fallback>
+          <mc:Fallback xmlns="">
             <p:sp>
               <p:nvSpPr>
                 <p:cNvPr id="60" name="TextBox 59">
@@ -7344,8 +7922,8 @@
             </a:fontRef>
           </p:style>
         </p:cxnSp>
-        <mc:AlternateContent xmlns:mc="http://schemas.openxmlformats.org/markup-compatibility/2006">
-          <mc:Choice xmlns:a14="http://schemas.microsoft.com/office/drawing/2010/main" Requires="a14">
+        <mc:AlternateContent xmlns:mc="http://schemas.openxmlformats.org/markup-compatibility/2006" xmlns:a14="http://schemas.microsoft.com/office/drawing/2010/main">
+          <mc:Choice Requires="a14">
             <p:sp>
               <p:nvSpPr>
                 <p:cNvPr id="62" name="TextBox 61">
@@ -7374,6 +7952,7 @@
                 </a:bodyPr>
                 <a:lstStyle/>
                 <a:p>
+                  <a:pPr/>
                   <a14:m>
                     <m:oMathPara xmlns:m="http://schemas.openxmlformats.org/officeDocument/2006/math">
                       <m:oMathParaPr>
@@ -7425,7 +8004,7 @@
               </p:txBody>
             </p:sp>
           </mc:Choice>
-          <mc:Fallback>
+          <mc:Fallback xmlns="">
             <p:sp>
               <p:nvSpPr>
                 <p:cNvPr id="62" name="TextBox 61">
@@ -8004,8 +8583,8 @@
             </a:fontRef>
           </p:style>
         </p:cxnSp>
-        <mc:AlternateContent xmlns:mc="http://schemas.openxmlformats.org/markup-compatibility/2006">
-          <mc:Choice xmlns:a14="http://schemas.microsoft.com/office/drawing/2010/main" Requires="a14">
+        <mc:AlternateContent xmlns:mc="http://schemas.openxmlformats.org/markup-compatibility/2006" xmlns:a14="http://schemas.microsoft.com/office/drawing/2010/main">
+          <mc:Choice Requires="a14">
             <p:sp>
               <p:nvSpPr>
                 <p:cNvPr id="75" name="TextBox 74">
@@ -8034,6 +8613,7 @@
                 </a:bodyPr>
                 <a:lstStyle/>
                 <a:p>
+                  <a:pPr/>
                   <a14:m>
                     <m:oMathPara xmlns:m="http://schemas.openxmlformats.org/officeDocument/2006/math">
                       <m:oMathParaPr>
@@ -8073,7 +8653,7 @@
               </p:txBody>
             </p:sp>
           </mc:Choice>
-          <mc:Fallback>
+          <mc:Fallback xmlns="">
             <p:sp>
               <p:nvSpPr>
                 <p:cNvPr id="75" name="TextBox 74">
@@ -8118,8 +8698,8 @@
             </p:sp>
           </mc:Fallback>
         </mc:AlternateContent>
-        <mc:AlternateContent xmlns:mc="http://schemas.openxmlformats.org/markup-compatibility/2006">
-          <mc:Choice xmlns:a14="http://schemas.microsoft.com/office/drawing/2010/main" Requires="a14">
+        <mc:AlternateContent xmlns:mc="http://schemas.openxmlformats.org/markup-compatibility/2006" xmlns:a14="http://schemas.microsoft.com/office/drawing/2010/main">
+          <mc:Choice Requires="a14">
             <p:sp>
               <p:nvSpPr>
                 <p:cNvPr id="76" name="TextBox 75">
@@ -8148,6 +8728,7 @@
                 </a:bodyPr>
                 <a:lstStyle/>
                 <a:p>
+                  <a:pPr/>
                   <a14:m>
                     <m:oMathPara xmlns:m="http://schemas.openxmlformats.org/officeDocument/2006/math">
                       <m:oMathParaPr>
@@ -8187,7 +8768,7 @@
               </p:txBody>
             </p:sp>
           </mc:Choice>
-          <mc:Fallback>
+          <mc:Fallback xmlns="">
             <p:sp>
               <p:nvSpPr>
                 <p:cNvPr id="76" name="TextBox 75">
@@ -8232,8 +8813,8 @@
             </p:sp>
           </mc:Fallback>
         </mc:AlternateContent>
-        <mc:AlternateContent xmlns:mc="http://schemas.openxmlformats.org/markup-compatibility/2006">
-          <mc:Choice xmlns:a14="http://schemas.microsoft.com/office/drawing/2010/main" Requires="a14">
+        <mc:AlternateContent xmlns:mc="http://schemas.openxmlformats.org/markup-compatibility/2006" xmlns:a14="http://schemas.microsoft.com/office/drawing/2010/main">
+          <mc:Choice Requires="a14">
             <p:sp>
               <p:nvSpPr>
                 <p:cNvPr id="77" name="TextBox 76">
@@ -8262,6 +8843,7 @@
                 </a:bodyPr>
                 <a:lstStyle/>
                 <a:p>
+                  <a:pPr/>
                   <a14:m>
                     <m:oMathPara xmlns:m="http://schemas.openxmlformats.org/officeDocument/2006/math">
                       <m:oMathParaPr>
@@ -8390,6 +8972,7 @@
                   <a:endParaRPr lang="en-US" sz="1200" b="0" dirty="0"/>
                 </a:p>
                 <a:p>
+                  <a:pPr/>
                   <a14:m>
                     <m:oMathPara xmlns:m="http://schemas.openxmlformats.org/officeDocument/2006/math">
                       <m:oMathParaPr>
@@ -8520,7 +9103,7 @@
               </p:txBody>
             </p:sp>
           </mc:Choice>
-          <mc:Fallback>
+          <mc:Fallback xmlns="">
             <p:sp>
               <p:nvSpPr>
                 <p:cNvPr id="77" name="TextBox 76">
@@ -8616,8 +9199,8 @@
             <a:chExt cx="2653353" cy="1714799"/>
           </a:xfrm>
         </p:grpSpPr>
-        <mc:AlternateContent xmlns:mc="http://schemas.openxmlformats.org/markup-compatibility/2006">
-          <mc:Choice xmlns:a14="http://schemas.microsoft.com/office/drawing/2010/main" Requires="a14">
+        <mc:AlternateContent xmlns:mc="http://schemas.openxmlformats.org/markup-compatibility/2006" xmlns:a14="http://schemas.microsoft.com/office/drawing/2010/main">
+          <mc:Choice Requires="a14">
             <p:sp>
               <p:nvSpPr>
                 <p:cNvPr id="40" name="TextBox 39">
@@ -8646,6 +9229,7 @@
                 </a:bodyPr>
                 <a:lstStyle/>
                 <a:p>
+                  <a:pPr/>
                   <a14:m>
                     <m:oMathPara xmlns:m="http://schemas.openxmlformats.org/officeDocument/2006/math">
                       <m:oMathParaPr>
@@ -8685,7 +9269,7 @@
               </p:txBody>
             </p:sp>
           </mc:Choice>
-          <mc:Fallback>
+          <mc:Fallback xmlns="">
             <p:sp>
               <p:nvSpPr>
                 <p:cNvPr id="40" name="TextBox 39">
@@ -8858,8 +9442,8 @@
             </a:fontRef>
           </p:style>
         </p:cxnSp>
-        <mc:AlternateContent xmlns:mc="http://schemas.openxmlformats.org/markup-compatibility/2006">
-          <mc:Choice xmlns:a14="http://schemas.microsoft.com/office/drawing/2010/main" Requires="a14">
+        <mc:AlternateContent xmlns:mc="http://schemas.openxmlformats.org/markup-compatibility/2006" xmlns:a14="http://schemas.microsoft.com/office/drawing/2010/main">
+          <mc:Choice Requires="a14">
             <p:sp>
               <p:nvSpPr>
                 <p:cNvPr id="4" name="TextBox 3">
@@ -8941,7 +9525,7 @@
               </p:txBody>
             </p:sp>
           </mc:Choice>
-          <mc:Fallback>
+          <mc:Fallback xmlns="">
             <p:sp>
               <p:nvSpPr>
                 <p:cNvPr id="4" name="TextBox 3">
@@ -8986,8 +9570,8 @@
             </p:sp>
           </mc:Fallback>
         </mc:AlternateContent>
-        <mc:AlternateContent xmlns:mc="http://schemas.openxmlformats.org/markup-compatibility/2006">
-          <mc:Choice xmlns:a14="http://schemas.microsoft.com/office/drawing/2010/main" Requires="a14">
+        <mc:AlternateContent xmlns:mc="http://schemas.openxmlformats.org/markup-compatibility/2006" xmlns:a14="http://schemas.microsoft.com/office/drawing/2010/main">
+          <mc:Choice Requires="a14">
             <p:sp>
               <p:nvSpPr>
                 <p:cNvPr id="5" name="TextBox 4">
@@ -9056,7 +9640,7 @@
               </p:txBody>
             </p:sp>
           </mc:Choice>
-          <mc:Fallback>
+          <mc:Fallback xmlns="">
             <p:sp>
               <p:nvSpPr>
                 <p:cNvPr id="5" name="TextBox 4">
@@ -9101,8 +9685,8 @@
             </p:sp>
           </mc:Fallback>
         </mc:AlternateContent>
-        <mc:AlternateContent xmlns:mc="http://schemas.openxmlformats.org/markup-compatibility/2006">
-          <mc:Choice xmlns:a14="http://schemas.microsoft.com/office/drawing/2010/main" Requires="a14">
+        <mc:AlternateContent xmlns:mc="http://schemas.openxmlformats.org/markup-compatibility/2006" xmlns:a14="http://schemas.microsoft.com/office/drawing/2010/main">
+          <mc:Choice Requires="a14">
             <p:sp>
               <p:nvSpPr>
                 <p:cNvPr id="6" name="TextBox 5">
@@ -9171,7 +9755,7 @@
               </p:txBody>
             </p:sp>
           </mc:Choice>
-          <mc:Fallback>
+          <mc:Fallback xmlns="">
             <p:sp>
               <p:nvSpPr>
                 <p:cNvPr id="6" name="TextBox 5">
@@ -9262,8 +9846,8 @@
             </a:fontRef>
           </p:style>
         </p:cxnSp>
-        <mc:AlternateContent xmlns:mc="http://schemas.openxmlformats.org/markup-compatibility/2006">
-          <mc:Choice xmlns:a14="http://schemas.microsoft.com/office/drawing/2010/main" Requires="a14">
+        <mc:AlternateContent xmlns:mc="http://schemas.openxmlformats.org/markup-compatibility/2006" xmlns:a14="http://schemas.microsoft.com/office/drawing/2010/main">
+          <mc:Choice Requires="a14">
             <p:sp>
               <p:nvSpPr>
                 <p:cNvPr id="15" name="TextBox 14">
@@ -9292,6 +9876,7 @@
                 </a:bodyPr>
                 <a:lstStyle/>
                 <a:p>
+                  <a:pPr/>
                   <a14:m>
                     <m:oMathPara xmlns:m="http://schemas.openxmlformats.org/officeDocument/2006/math">
                       <m:oMathParaPr>
@@ -9343,7 +9928,7 @@
               </p:txBody>
             </p:sp>
           </mc:Choice>
-          <mc:Fallback>
+          <mc:Fallback xmlns="">
             <p:sp>
               <p:nvSpPr>
                 <p:cNvPr id="15" name="TextBox 14">
@@ -9922,8 +10507,8 @@
             </a:fontRef>
           </p:style>
         </p:cxnSp>
-        <mc:AlternateContent xmlns:mc="http://schemas.openxmlformats.org/markup-compatibility/2006">
-          <mc:Choice xmlns:a14="http://schemas.microsoft.com/office/drawing/2010/main" Requires="a14">
+        <mc:AlternateContent xmlns:mc="http://schemas.openxmlformats.org/markup-compatibility/2006" xmlns:a14="http://schemas.microsoft.com/office/drawing/2010/main">
+          <mc:Choice Requires="a14">
             <p:sp>
               <p:nvSpPr>
                 <p:cNvPr id="38" name="TextBox 37">
@@ -9952,6 +10537,7 @@
                 </a:bodyPr>
                 <a:lstStyle/>
                 <a:p>
+                  <a:pPr/>
                   <a14:m>
                     <m:oMathPara xmlns:m="http://schemas.openxmlformats.org/officeDocument/2006/math">
                       <m:oMathParaPr>
@@ -9991,7 +10577,7 @@
               </p:txBody>
             </p:sp>
           </mc:Choice>
-          <mc:Fallback>
+          <mc:Fallback xmlns="">
             <p:sp>
               <p:nvSpPr>
                 <p:cNvPr id="38" name="TextBox 37">
@@ -10036,8 +10622,8 @@
             </p:sp>
           </mc:Fallback>
         </mc:AlternateContent>
-        <mc:AlternateContent xmlns:mc="http://schemas.openxmlformats.org/markup-compatibility/2006">
-          <mc:Choice xmlns:a14="http://schemas.microsoft.com/office/drawing/2010/main" Requires="a14">
+        <mc:AlternateContent xmlns:mc="http://schemas.openxmlformats.org/markup-compatibility/2006" xmlns:a14="http://schemas.microsoft.com/office/drawing/2010/main">
+          <mc:Choice Requires="a14">
             <p:sp>
               <p:nvSpPr>
                 <p:cNvPr id="41" name="TextBox 40">
@@ -10066,6 +10652,7 @@
                 </a:bodyPr>
                 <a:lstStyle/>
                 <a:p>
+                  <a:pPr/>
                   <a14:m>
                     <m:oMathPara xmlns:m="http://schemas.openxmlformats.org/officeDocument/2006/math">
                       <m:oMathParaPr>
@@ -10105,7 +10692,7 @@
               </p:txBody>
             </p:sp>
           </mc:Choice>
-          <mc:Fallback>
+          <mc:Fallback xmlns="">
             <p:sp>
               <p:nvSpPr>
                 <p:cNvPr id="41" name="TextBox 40">
@@ -10150,8 +10737,8 @@
             </p:sp>
           </mc:Fallback>
         </mc:AlternateContent>
-        <mc:AlternateContent xmlns:mc="http://schemas.openxmlformats.org/markup-compatibility/2006">
-          <mc:Choice xmlns:a14="http://schemas.microsoft.com/office/drawing/2010/main" Requires="a14">
+        <mc:AlternateContent xmlns:mc="http://schemas.openxmlformats.org/markup-compatibility/2006" xmlns:a14="http://schemas.microsoft.com/office/drawing/2010/main">
+          <mc:Choice Requires="a14">
             <p:sp>
               <p:nvSpPr>
                 <p:cNvPr id="42" name="TextBox 41">
@@ -10180,6 +10767,7 @@
                 </a:bodyPr>
                 <a:lstStyle/>
                 <a:p>
+                  <a:pPr/>
                   <a14:m>
                     <m:oMathPara xmlns:m="http://schemas.openxmlformats.org/officeDocument/2006/math">
                       <m:oMathParaPr>
@@ -10308,6 +10896,7 @@
                   <a:endParaRPr lang="en-US" sz="1200" b="0" dirty="0"/>
                 </a:p>
                 <a:p>
+                  <a:pPr/>
                   <a14:m>
                     <m:oMathPara xmlns:m="http://schemas.openxmlformats.org/officeDocument/2006/math">
                       <m:oMathParaPr>
@@ -10438,7 +11027,7 @@
               </p:txBody>
             </p:sp>
           </mc:Choice>
-          <mc:Fallback>
+          <mc:Fallback xmlns="">
             <p:sp>
               <p:nvSpPr>
                 <p:cNvPr id="42" name="TextBox 41">
@@ -12896,8 +13485,8 @@
           </a:fontRef>
         </p:style>
       </p:cxnSp>
-      <mc:AlternateContent xmlns:mc="http://schemas.openxmlformats.org/markup-compatibility/2006">
-        <mc:Choice xmlns:a14="http://schemas.microsoft.com/office/drawing/2010/main" Requires="a14">
+      <mc:AlternateContent xmlns:mc="http://schemas.openxmlformats.org/markup-compatibility/2006" xmlns:a14="http://schemas.microsoft.com/office/drawing/2010/main">
+        <mc:Choice Requires="a14">
           <p:sp>
             <p:nvSpPr>
               <p:cNvPr id="7" name="TextBox 6">
@@ -12926,6 +13515,7 @@
               </a:bodyPr>
               <a:lstStyle/>
               <a:p>
+                <a:pPr/>
                 <a14:m>
                   <m:oMathPara xmlns:m="http://schemas.openxmlformats.org/officeDocument/2006/math">
                     <m:oMathParaPr>
@@ -12946,7 +13536,7 @@
             </p:txBody>
           </p:sp>
         </mc:Choice>
-        <mc:Fallback>
+        <mc:Fallback xmlns="">
           <p:sp>
             <p:nvSpPr>
               <p:cNvPr id="7" name="TextBox 6">
@@ -12991,8 +13581,8 @@
           </p:sp>
         </mc:Fallback>
       </mc:AlternateContent>
-      <mc:AlternateContent xmlns:mc="http://schemas.openxmlformats.org/markup-compatibility/2006">
-        <mc:Choice xmlns:a14="http://schemas.microsoft.com/office/drawing/2010/main" Requires="a14">
+      <mc:AlternateContent xmlns:mc="http://schemas.openxmlformats.org/markup-compatibility/2006" xmlns:a14="http://schemas.microsoft.com/office/drawing/2010/main">
+        <mc:Choice Requires="a14">
           <p:sp>
             <p:nvSpPr>
               <p:cNvPr id="8" name="TextBox 7">
@@ -13021,6 +13611,7 @@
               </a:bodyPr>
               <a:lstStyle/>
               <a:p>
+                <a:pPr/>
                 <a14:m>
                   <m:oMathPara xmlns:m="http://schemas.openxmlformats.org/officeDocument/2006/math">
                     <m:oMathParaPr>
@@ -13041,7 +13632,7 @@
             </p:txBody>
           </p:sp>
         </mc:Choice>
-        <mc:Fallback>
+        <mc:Fallback xmlns="">
           <p:sp>
             <p:nvSpPr>
               <p:cNvPr id="8" name="TextBox 7">
@@ -13086,8 +13677,8 @@
           </p:sp>
         </mc:Fallback>
       </mc:AlternateContent>
-      <mc:AlternateContent xmlns:mc="http://schemas.openxmlformats.org/markup-compatibility/2006">
-        <mc:Choice xmlns:a14="http://schemas.microsoft.com/office/drawing/2010/main" Requires="a14">
+      <mc:AlternateContent xmlns:mc="http://schemas.openxmlformats.org/markup-compatibility/2006" xmlns:a14="http://schemas.microsoft.com/office/drawing/2010/main">
+        <mc:Choice Requires="a14">
           <p:sp>
             <p:nvSpPr>
               <p:cNvPr id="9" name="TextBox 8">
@@ -13116,6 +13707,7 @@
               </a:bodyPr>
               <a:lstStyle/>
               <a:p>
+                <a:pPr/>
                 <a14:m>
                   <m:oMathPara xmlns:m="http://schemas.openxmlformats.org/officeDocument/2006/math">
                     <m:oMathParaPr>
@@ -13230,7 +13822,7 @@
             </p:txBody>
           </p:sp>
         </mc:Choice>
-        <mc:Fallback>
+        <mc:Fallback xmlns="">
           <p:sp>
             <p:nvSpPr>
               <p:cNvPr id="9" name="TextBox 8">
@@ -13275,8 +13867,8 @@
           </p:sp>
         </mc:Fallback>
       </mc:AlternateContent>
-      <mc:AlternateContent xmlns:mc="http://schemas.openxmlformats.org/markup-compatibility/2006">
-        <mc:Choice xmlns:a14="http://schemas.microsoft.com/office/drawing/2010/main" Requires="a14">
+      <mc:AlternateContent xmlns:mc="http://schemas.openxmlformats.org/markup-compatibility/2006" xmlns:a14="http://schemas.microsoft.com/office/drawing/2010/main">
+        <mc:Choice Requires="a14">
           <p:sp>
             <p:nvSpPr>
               <p:cNvPr id="10" name="TextBox 9">
@@ -13305,6 +13897,7 @@
               </a:bodyPr>
               <a:lstStyle/>
               <a:p>
+                <a:pPr/>
                 <a14:m>
                   <m:oMathPara xmlns:m="http://schemas.openxmlformats.org/officeDocument/2006/math">
                     <m:oMathParaPr>
@@ -13469,7 +14062,7 @@
             </p:txBody>
           </p:sp>
         </mc:Choice>
-        <mc:Fallback>
+        <mc:Fallback xmlns="">
           <p:sp>
             <p:nvSpPr>
               <p:cNvPr id="10" name="TextBox 9">
@@ -13514,8 +14107,8 @@
           </p:sp>
         </mc:Fallback>
       </mc:AlternateContent>
-      <mc:AlternateContent xmlns:mc="http://schemas.openxmlformats.org/markup-compatibility/2006">
-        <mc:Choice xmlns:a14="http://schemas.microsoft.com/office/drawing/2010/main" Requires="a14">
+      <mc:AlternateContent xmlns:mc="http://schemas.openxmlformats.org/markup-compatibility/2006" xmlns:a14="http://schemas.microsoft.com/office/drawing/2010/main">
+        <mc:Choice Requires="a14">
           <p:sp>
             <p:nvSpPr>
               <p:cNvPr id="11" name="TextBox 10">
@@ -13544,6 +14137,7 @@
               </a:bodyPr>
               <a:lstStyle/>
               <a:p>
+                <a:pPr/>
                 <a14:m>
                   <m:oMathPara xmlns:m="http://schemas.openxmlformats.org/officeDocument/2006/math">
                     <m:oMathParaPr>
@@ -13621,7 +14215,7 @@
             </p:txBody>
           </p:sp>
         </mc:Choice>
-        <mc:Fallback>
+        <mc:Fallback xmlns="">
           <p:sp>
             <p:nvSpPr>
               <p:cNvPr id="11" name="TextBox 10">

</xml_diff>

<commit_message>
Finished animation function - JB
</commit_message>
<xml_diff>
--- a/Documentation/rocketDiagrams.pptx
+++ b/Documentation/rocketDiagrams.pptx
@@ -263,7 +263,7 @@
           <a:p>
             <a:fld id="{06D363D2-934C-43C0-9ECF-5C42BB9FE542}" type="datetimeFigureOut">
               <a:rPr lang="en-US" smtClean="0"/>
-              <a:t>12/14/2020</a:t>
+              <a:t>12/15/2020</a:t>
             </a:fld>
             <a:endParaRPr lang="en-US"/>
           </a:p>
@@ -461,7 +461,7 @@
           <a:p>
             <a:fld id="{06D363D2-934C-43C0-9ECF-5C42BB9FE542}" type="datetimeFigureOut">
               <a:rPr lang="en-US" smtClean="0"/>
-              <a:t>12/14/2020</a:t>
+              <a:t>12/15/2020</a:t>
             </a:fld>
             <a:endParaRPr lang="en-US"/>
           </a:p>
@@ -669,7 +669,7 @@
           <a:p>
             <a:fld id="{06D363D2-934C-43C0-9ECF-5C42BB9FE542}" type="datetimeFigureOut">
               <a:rPr lang="en-US" smtClean="0"/>
-              <a:t>12/14/2020</a:t>
+              <a:t>12/15/2020</a:t>
             </a:fld>
             <a:endParaRPr lang="en-US"/>
           </a:p>
@@ -867,7 +867,7 @@
           <a:p>
             <a:fld id="{06D363D2-934C-43C0-9ECF-5C42BB9FE542}" type="datetimeFigureOut">
               <a:rPr lang="en-US" smtClean="0"/>
-              <a:t>12/14/2020</a:t>
+              <a:t>12/15/2020</a:t>
             </a:fld>
             <a:endParaRPr lang="en-US"/>
           </a:p>
@@ -1142,7 +1142,7 @@
           <a:p>
             <a:fld id="{06D363D2-934C-43C0-9ECF-5C42BB9FE542}" type="datetimeFigureOut">
               <a:rPr lang="en-US" smtClean="0"/>
-              <a:t>12/14/2020</a:t>
+              <a:t>12/15/2020</a:t>
             </a:fld>
             <a:endParaRPr lang="en-US"/>
           </a:p>
@@ -1407,7 +1407,7 @@
           <a:p>
             <a:fld id="{06D363D2-934C-43C0-9ECF-5C42BB9FE542}" type="datetimeFigureOut">
               <a:rPr lang="en-US" smtClean="0"/>
-              <a:t>12/14/2020</a:t>
+              <a:t>12/15/2020</a:t>
             </a:fld>
             <a:endParaRPr lang="en-US"/>
           </a:p>
@@ -1819,7 +1819,7 @@
           <a:p>
             <a:fld id="{06D363D2-934C-43C0-9ECF-5C42BB9FE542}" type="datetimeFigureOut">
               <a:rPr lang="en-US" smtClean="0"/>
-              <a:t>12/14/2020</a:t>
+              <a:t>12/15/2020</a:t>
             </a:fld>
             <a:endParaRPr lang="en-US"/>
           </a:p>
@@ -1960,7 +1960,7 @@
           <a:p>
             <a:fld id="{06D363D2-934C-43C0-9ECF-5C42BB9FE542}" type="datetimeFigureOut">
               <a:rPr lang="en-US" smtClean="0"/>
-              <a:t>12/14/2020</a:t>
+              <a:t>12/15/2020</a:t>
             </a:fld>
             <a:endParaRPr lang="en-US"/>
           </a:p>
@@ -2073,7 +2073,7 @@
           <a:p>
             <a:fld id="{06D363D2-934C-43C0-9ECF-5C42BB9FE542}" type="datetimeFigureOut">
               <a:rPr lang="en-US" smtClean="0"/>
-              <a:t>12/14/2020</a:t>
+              <a:t>12/15/2020</a:t>
             </a:fld>
             <a:endParaRPr lang="en-US"/>
           </a:p>
@@ -2384,7 +2384,7 @@
           <a:p>
             <a:fld id="{06D363D2-934C-43C0-9ECF-5C42BB9FE542}" type="datetimeFigureOut">
               <a:rPr lang="en-US" smtClean="0"/>
-              <a:t>12/14/2020</a:t>
+              <a:t>12/15/2020</a:t>
             </a:fld>
             <a:endParaRPr lang="en-US"/>
           </a:p>
@@ -2672,7 +2672,7 @@
           <a:p>
             <a:fld id="{06D363D2-934C-43C0-9ECF-5C42BB9FE542}" type="datetimeFigureOut">
               <a:rPr lang="en-US" smtClean="0"/>
-              <a:t>12/14/2020</a:t>
+              <a:t>12/15/2020</a:t>
             </a:fld>
             <a:endParaRPr lang="en-US"/>
           </a:p>
@@ -2913,7 +2913,7 @@
           <a:p>
             <a:fld id="{06D363D2-934C-43C0-9ECF-5C42BB9FE542}" type="datetimeFigureOut">
               <a:rPr lang="en-US" smtClean="0"/>
-              <a:t>12/14/2020</a:t>
+              <a:t>12/15/2020</a:t>
             </a:fld>
             <a:endParaRPr lang="en-US"/>
           </a:p>
@@ -3374,7 +3374,7 @@
             </a:prstGeom>
             <a:ln w="28575">
               <a:solidFill>
-                <a:srgbClr val="00FF00"/>
+                <a:srgbClr val="FF0000"/>
               </a:solidFill>
               <a:prstDash val="solid"/>
               <a:tailEnd type="triangle" w="lg" len="lg"/>
@@ -3419,7 +3419,7 @@
             </a:prstGeom>
             <a:ln w="28575">
               <a:solidFill>
-                <a:srgbClr val="0000FF"/>
+                <a:srgbClr val="00FF00"/>
               </a:solidFill>
               <a:prstDash val="solid"/>
               <a:tailEnd type="triangle" w="lg" len="lg"/>
@@ -3464,7 +3464,7 @@
             </a:prstGeom>
             <a:ln w="28575">
               <a:solidFill>
-                <a:srgbClr val="FF0000"/>
+                <a:srgbClr val="0000FF"/>
               </a:solidFill>
               <a:prstDash val="solid"/>
               <a:tailEnd type="triangle" w="lg" len="lg"/>
@@ -3947,94 +3947,6 @@
           </a:fontRef>
         </p:style>
       </p:cxnSp>
-      <p:cxnSp>
-        <p:nvCxnSpPr>
-          <p:cNvPr id="26" name="Straight Arrow Connector 25">
-            <a:extLst>
-              <a:ext uri="{FF2B5EF4-FFF2-40B4-BE49-F238E27FC236}">
-                <a16:creationId xmlns:a16="http://schemas.microsoft.com/office/drawing/2014/main" id="{770D7937-8769-4884-8373-0B7CE4C7F4A2}"/>
-              </a:ext>
-            </a:extLst>
-          </p:cNvPr>
-          <p:cNvCxnSpPr>
-            <a:cxnSpLocks/>
-          </p:cNvCxnSpPr>
-          <p:nvPr/>
-        </p:nvCxnSpPr>
-        <p:spPr>
-          <a:xfrm flipH="1" flipV="1">
-            <a:off x="2982433" y="3289671"/>
-            <a:ext cx="3883798" cy="841932"/>
-          </a:xfrm>
-          <a:prstGeom prst="straightConnector1">
-            <a:avLst/>
-          </a:prstGeom>
-          <a:ln>
-            <a:solidFill>
-              <a:srgbClr val="FF00FF"/>
-            </a:solidFill>
-            <a:headEnd type="oval" w="lg" len="lg"/>
-            <a:tailEnd type="triangle"/>
-          </a:ln>
-        </p:spPr>
-        <p:style>
-          <a:lnRef idx="1">
-            <a:schemeClr val="accent1"/>
-          </a:lnRef>
-          <a:fillRef idx="0">
-            <a:schemeClr val="accent1"/>
-          </a:fillRef>
-          <a:effectRef idx="0">
-            <a:schemeClr val="accent1"/>
-          </a:effectRef>
-          <a:fontRef idx="minor">
-            <a:schemeClr val="tx1"/>
-          </a:fontRef>
-        </p:style>
-      </p:cxnSp>
-      <p:cxnSp>
-        <p:nvCxnSpPr>
-          <p:cNvPr id="17" name="Straight Arrow Connector 16">
-            <a:extLst>
-              <a:ext uri="{FF2B5EF4-FFF2-40B4-BE49-F238E27FC236}">
-                <a16:creationId xmlns:a16="http://schemas.microsoft.com/office/drawing/2014/main" id="{F45243EE-3434-48A6-82D6-3D6346A16B32}"/>
-              </a:ext>
-            </a:extLst>
-          </p:cNvPr>
-          <p:cNvCxnSpPr/>
-          <p:nvPr/>
-        </p:nvCxnSpPr>
-        <p:spPr>
-          <a:xfrm>
-            <a:off x="6858644" y="4134557"/>
-            <a:ext cx="1465928" cy="274320"/>
-          </a:xfrm>
-          <a:prstGeom prst="straightConnector1">
-            <a:avLst/>
-          </a:prstGeom>
-          <a:ln w="38100">
-            <a:solidFill>
-              <a:srgbClr val="00FFFF"/>
-            </a:solidFill>
-            <a:prstDash val="dash"/>
-            <a:tailEnd type="triangle"/>
-          </a:ln>
-        </p:spPr>
-        <p:style>
-          <a:lnRef idx="1">
-            <a:schemeClr val="accent1"/>
-          </a:lnRef>
-          <a:fillRef idx="0">
-            <a:schemeClr val="accent1"/>
-          </a:fillRef>
-          <a:effectRef idx="0">
-            <a:schemeClr val="accent1"/>
-          </a:effectRef>
-          <a:fontRef idx="minor">
-            <a:schemeClr val="tx1"/>
-          </a:fontRef>
-        </p:style>
-      </p:cxnSp>
       <p:grpSp>
         <p:nvGrpSpPr>
           <p:cNvPr id="27" name="Group 26">
@@ -4077,48 +3989,6 @@
           </p:grpSpPr>
           <p:cxnSp>
             <p:nvCxnSpPr>
-              <p:cNvPr id="4" name="Straight Arrow Connector 3">
-                <a:extLst>
-                  <a:ext uri="{FF2B5EF4-FFF2-40B4-BE49-F238E27FC236}">
-                    <a16:creationId xmlns:a16="http://schemas.microsoft.com/office/drawing/2014/main" id="{667A90A8-D8BC-4FBF-B032-9CA70E6E07DE}"/>
-                  </a:ext>
-                </a:extLst>
-              </p:cNvPr>
-              <p:cNvCxnSpPr/>
-              <p:nvPr/>
-            </p:nvCxnSpPr>
-            <p:spPr>
-              <a:xfrm>
-                <a:off x="6277897" y="3962400"/>
-                <a:ext cx="1037303" cy="299884"/>
-              </a:xfrm>
-              <a:prstGeom prst="straightConnector1">
-                <a:avLst/>
-              </a:prstGeom>
-              <a:ln w="15875">
-                <a:solidFill>
-                  <a:srgbClr val="00FF00"/>
-                </a:solidFill>
-                <a:tailEnd type="triangle"/>
-              </a:ln>
-            </p:spPr>
-            <p:style>
-              <a:lnRef idx="1">
-                <a:schemeClr val="accent1"/>
-              </a:lnRef>
-              <a:fillRef idx="0">
-                <a:schemeClr val="accent1"/>
-              </a:fillRef>
-              <a:effectRef idx="0">
-                <a:schemeClr val="accent1"/>
-              </a:effectRef>
-              <a:fontRef idx="minor">
-                <a:schemeClr val="tx1"/>
-              </a:fontRef>
-            </p:style>
-          </p:cxnSp>
-          <p:cxnSp>
-            <p:nvCxnSpPr>
               <p:cNvPr id="6" name="Straight Arrow Connector 5">
                 <a:extLst>
                   <a:ext uri="{FF2B5EF4-FFF2-40B4-BE49-F238E27FC236}">
@@ -4141,7 +4011,7 @@
               </a:prstGeom>
               <a:ln w="15875">
                 <a:solidFill>
-                  <a:srgbClr val="0000FF"/>
+                  <a:srgbClr val="00FF00"/>
                 </a:solidFill>
                 <a:tailEnd type="triangle"/>
               </a:ln>
@@ -4183,6 +4053,49 @@
               </a:prstGeom>
               <a:ln w="15875">
                 <a:solidFill>
+                  <a:srgbClr val="0000FF"/>
+                </a:solidFill>
+                <a:headEnd type="none" w="med" len="med"/>
+                <a:tailEnd type="triangle" w="med" len="med"/>
+              </a:ln>
+            </p:spPr>
+            <p:style>
+              <a:lnRef idx="1">
+                <a:schemeClr val="accent1"/>
+              </a:lnRef>
+              <a:fillRef idx="0">
+                <a:schemeClr val="accent1"/>
+              </a:fillRef>
+              <a:effectRef idx="0">
+                <a:schemeClr val="accent1"/>
+              </a:effectRef>
+              <a:fontRef idx="minor">
+                <a:schemeClr val="tx1"/>
+              </a:fontRef>
+            </p:style>
+          </p:cxnSp>
+          <p:cxnSp>
+            <p:nvCxnSpPr>
+              <p:cNvPr id="4" name="Straight Arrow Connector 3">
+                <a:extLst>
+                  <a:ext uri="{FF2B5EF4-FFF2-40B4-BE49-F238E27FC236}">
+                    <a16:creationId xmlns:a16="http://schemas.microsoft.com/office/drawing/2014/main" id="{667A90A8-D8BC-4FBF-B032-9CA70E6E07DE}"/>
+                  </a:ext>
+                </a:extLst>
+              </p:cNvPr>
+              <p:cNvCxnSpPr/>
+              <p:nvPr/>
+            </p:nvCxnSpPr>
+            <p:spPr>
+              <a:xfrm>
+                <a:off x="6277897" y="3962400"/>
+                <a:ext cx="1037303" cy="299884"/>
+              </a:xfrm>
+              <a:prstGeom prst="straightConnector1">
+                <a:avLst/>
+              </a:prstGeom>
+              <a:ln w="15875">
+                <a:solidFill>
                   <a:srgbClr val="FF0000"/>
                 </a:solidFill>
                 <a:headEnd type="oval" w="lg" len="lg"/>
@@ -4205,8 +4118,8 @@
             </p:style>
           </p:cxnSp>
         </p:grpSp>
-        <mc:AlternateContent xmlns:mc="http://schemas.openxmlformats.org/markup-compatibility/2006">
-          <mc:Choice xmlns:a14="http://schemas.microsoft.com/office/drawing/2010/main" Requires="a14">
+        <mc:AlternateContent xmlns:mc="http://schemas.openxmlformats.org/markup-compatibility/2006" xmlns:a14="http://schemas.microsoft.com/office/drawing/2010/main">
+          <mc:Choice Requires="a14">
             <p:sp>
               <p:nvSpPr>
                 <p:cNvPr id="18" name="TextBox 17">
@@ -4288,7 +4201,7 @@
               </p:txBody>
             </p:sp>
           </mc:Choice>
-          <mc:Fallback>
+          <mc:Fallback xmlns="">
             <p:sp>
               <p:nvSpPr>
                 <p:cNvPr id="18" name="TextBox 17">
@@ -4333,8 +4246,8 @@
             </p:sp>
           </mc:Fallback>
         </mc:AlternateContent>
-        <mc:AlternateContent xmlns:mc="http://schemas.openxmlformats.org/markup-compatibility/2006">
-          <mc:Choice xmlns:a14="http://schemas.microsoft.com/office/drawing/2010/main" Requires="a14">
+        <mc:AlternateContent xmlns:mc="http://schemas.openxmlformats.org/markup-compatibility/2006" xmlns:a14="http://schemas.microsoft.com/office/drawing/2010/main">
+          <mc:Choice Requires="a14">
             <p:sp>
               <p:nvSpPr>
                 <p:cNvPr id="20" name="TextBox 19">
@@ -4403,7 +4316,7 @@
               </p:txBody>
             </p:sp>
           </mc:Choice>
-          <mc:Fallback>
+          <mc:Fallback xmlns="">
             <p:sp>
               <p:nvSpPr>
                 <p:cNvPr id="20" name="TextBox 19">
@@ -4448,8 +4361,8 @@
             </p:sp>
           </mc:Fallback>
         </mc:AlternateContent>
-        <mc:AlternateContent xmlns:mc="http://schemas.openxmlformats.org/markup-compatibility/2006">
-          <mc:Choice xmlns:a14="http://schemas.microsoft.com/office/drawing/2010/main" Requires="a14">
+        <mc:AlternateContent xmlns:mc="http://schemas.openxmlformats.org/markup-compatibility/2006" xmlns:a14="http://schemas.microsoft.com/office/drawing/2010/main">
+          <mc:Choice Requires="a14">
             <p:sp>
               <p:nvSpPr>
                 <p:cNvPr id="21" name="TextBox 20">
@@ -4518,7 +4431,7 @@
               </p:txBody>
             </p:sp>
           </mc:Choice>
-          <mc:Fallback>
+          <mc:Fallback xmlns="">
             <p:sp>
               <p:nvSpPr>
                 <p:cNvPr id="21" name="TextBox 20">
@@ -4564,8 +4477,8 @@
           </mc:Fallback>
         </mc:AlternateContent>
       </p:grpSp>
-      <mc:AlternateContent xmlns:mc="http://schemas.openxmlformats.org/markup-compatibility/2006">
-        <mc:Choice xmlns:a14="http://schemas.microsoft.com/office/drawing/2010/main" Requires="a14">
+      <mc:AlternateContent xmlns:mc="http://schemas.openxmlformats.org/markup-compatibility/2006" xmlns:a14="http://schemas.microsoft.com/office/drawing/2010/main">
+        <mc:Choice Requires="a14">
           <p:sp>
             <p:nvSpPr>
               <p:cNvPr id="28" name="TextBox 27">
@@ -4594,6 +4507,7 @@
               </a:bodyPr>
               <a:lstStyle/>
               <a:p>
+                <a:pPr/>
                 <a14:m>
                   <m:oMathPara xmlns:m="http://schemas.openxmlformats.org/officeDocument/2006/math">
                     <m:oMathParaPr>
@@ -4645,7 +4559,7 @@
             </p:txBody>
           </p:sp>
         </mc:Choice>
-        <mc:Fallback>
+        <mc:Fallback xmlns="">
           <p:sp>
             <p:nvSpPr>
               <p:cNvPr id="28" name="TextBox 27">
@@ -4690,8 +4604,8 @@
           </p:sp>
         </mc:Fallback>
       </mc:AlternateContent>
-      <mc:AlternateContent xmlns:mc="http://schemas.openxmlformats.org/markup-compatibility/2006">
-        <mc:Choice xmlns:a14="http://schemas.microsoft.com/office/drawing/2010/main" Requires="a14">
+      <mc:AlternateContent xmlns:mc="http://schemas.openxmlformats.org/markup-compatibility/2006" xmlns:a14="http://schemas.microsoft.com/office/drawing/2010/main">
+        <mc:Choice Requires="a14">
           <p:sp>
             <p:nvSpPr>
               <p:cNvPr id="29" name="TextBox 28">
@@ -4720,6 +4634,7 @@
               </a:bodyPr>
               <a:lstStyle/>
               <a:p>
+                <a:pPr/>
                 <a14:m>
                   <m:oMathPara xmlns:m="http://schemas.openxmlformats.org/officeDocument/2006/math">
                     <m:oMathParaPr>
@@ -4771,7 +4686,7 @@
             </p:txBody>
           </p:sp>
         </mc:Choice>
-        <mc:Fallback>
+        <mc:Fallback xmlns="">
           <p:sp>
             <p:nvSpPr>
               <p:cNvPr id="29" name="TextBox 28">
@@ -4816,8 +4731,8 @@
           </p:sp>
         </mc:Fallback>
       </mc:AlternateContent>
-      <mc:AlternateContent xmlns:mc="http://schemas.openxmlformats.org/markup-compatibility/2006">
-        <mc:Choice xmlns:a14="http://schemas.microsoft.com/office/drawing/2010/main" Requires="a14">
+      <mc:AlternateContent xmlns:mc="http://schemas.openxmlformats.org/markup-compatibility/2006" xmlns:a14="http://schemas.microsoft.com/office/drawing/2010/main">
+        <mc:Choice Requires="a14">
           <p:sp>
             <p:nvSpPr>
               <p:cNvPr id="30" name="TextBox 29">
@@ -4846,6 +4761,7 @@
               </a:bodyPr>
               <a:lstStyle/>
               <a:p>
+                <a:pPr/>
                 <a14:m>
                   <m:oMathPara xmlns:m="http://schemas.openxmlformats.org/officeDocument/2006/math">
                     <m:oMathParaPr>
@@ -4897,7 +4813,7 @@
             </p:txBody>
           </p:sp>
         </mc:Choice>
-        <mc:Fallback>
+        <mc:Fallback xmlns="">
           <p:sp>
             <p:nvSpPr>
               <p:cNvPr id="30" name="TextBox 29">
@@ -4942,6 +4858,94 @@
           </p:sp>
         </mc:Fallback>
       </mc:AlternateContent>
+      <p:cxnSp>
+        <p:nvCxnSpPr>
+          <p:cNvPr id="17" name="Straight Arrow Connector 16">
+            <a:extLst>
+              <a:ext uri="{FF2B5EF4-FFF2-40B4-BE49-F238E27FC236}">
+                <a16:creationId xmlns:a16="http://schemas.microsoft.com/office/drawing/2014/main" id="{F45243EE-3434-48A6-82D6-3D6346A16B32}"/>
+              </a:ext>
+            </a:extLst>
+          </p:cNvPr>
+          <p:cNvCxnSpPr/>
+          <p:nvPr/>
+        </p:nvCxnSpPr>
+        <p:spPr>
+          <a:xfrm>
+            <a:off x="6858644" y="4134557"/>
+            <a:ext cx="1465928" cy="274320"/>
+          </a:xfrm>
+          <a:prstGeom prst="straightConnector1">
+            <a:avLst/>
+          </a:prstGeom>
+          <a:ln w="38100">
+            <a:solidFill>
+              <a:srgbClr val="00FFFF"/>
+            </a:solidFill>
+            <a:prstDash val="dash"/>
+            <a:tailEnd type="triangle"/>
+          </a:ln>
+        </p:spPr>
+        <p:style>
+          <a:lnRef idx="1">
+            <a:schemeClr val="accent1"/>
+          </a:lnRef>
+          <a:fillRef idx="0">
+            <a:schemeClr val="accent1"/>
+          </a:fillRef>
+          <a:effectRef idx="0">
+            <a:schemeClr val="accent1"/>
+          </a:effectRef>
+          <a:fontRef idx="minor">
+            <a:schemeClr val="tx1"/>
+          </a:fontRef>
+        </p:style>
+      </p:cxnSp>
+      <p:cxnSp>
+        <p:nvCxnSpPr>
+          <p:cNvPr id="26" name="Straight Arrow Connector 25">
+            <a:extLst>
+              <a:ext uri="{FF2B5EF4-FFF2-40B4-BE49-F238E27FC236}">
+                <a16:creationId xmlns:a16="http://schemas.microsoft.com/office/drawing/2014/main" id="{770D7937-8769-4884-8373-0B7CE4C7F4A2}"/>
+              </a:ext>
+            </a:extLst>
+          </p:cNvPr>
+          <p:cNvCxnSpPr>
+            <a:cxnSpLocks/>
+          </p:cNvCxnSpPr>
+          <p:nvPr/>
+        </p:nvCxnSpPr>
+        <p:spPr>
+          <a:xfrm flipH="1" flipV="1">
+            <a:off x="2982433" y="3289671"/>
+            <a:ext cx="3883798" cy="841932"/>
+          </a:xfrm>
+          <a:prstGeom prst="straightConnector1">
+            <a:avLst/>
+          </a:prstGeom>
+          <a:ln>
+            <a:solidFill>
+              <a:srgbClr val="FF00FF"/>
+            </a:solidFill>
+            <a:headEnd type="oval" w="lg" len="lg"/>
+            <a:tailEnd type="triangle"/>
+          </a:ln>
+        </p:spPr>
+        <p:style>
+          <a:lnRef idx="1">
+            <a:schemeClr val="accent1"/>
+          </a:lnRef>
+          <a:fillRef idx="0">
+            <a:schemeClr val="accent1"/>
+          </a:fillRef>
+          <a:effectRef idx="0">
+            <a:schemeClr val="accent1"/>
+          </a:effectRef>
+          <a:fontRef idx="minor">
+            <a:schemeClr val="tx1"/>
+          </a:fontRef>
+        </p:style>
+      </p:cxnSp>
     </p:spTree>
     <p:extLst>
       <p:ext uri="{BB962C8B-B14F-4D97-AF65-F5344CB8AC3E}">

</xml_diff>